<commit_message>
Präsentation angepasst, neue Screenshots von Sekretariat
</commit_message>
<xml_diff>
--- a/01_Verstehen_und_Festlegen_des_Nutzungskontext/Sekretariat/Personas_Template_UX.pptx
+++ b/01_Verstehen_und_Festlegen_des_Nutzungskontext/Sekretariat/Personas_Template_UX.pptx
@@ -1,24 +1,24 @@
 
 <file path=ppt/presentation.xml><?xml version="1.0" encoding="utf-8"?>
-<p:presentation xmlns:a="http://schemas.openxmlformats.org/drawingml/2006/main" xmlns:r="http://schemas.openxmlformats.org/officeDocument/2006/relationships" xmlns:p="http://schemas.openxmlformats.org/presentationml/2006/main" xmlns:m="http://schemas.openxmlformats.org/officeDocument/2006/math" xmlns:a14="http://schemas.microsoft.com/office/drawing/2010/main">
+<p:presentation xmlns:a="http://schemas.openxmlformats.org/drawingml/2006/main" xmlns:r="http://schemas.openxmlformats.org/officeDocument/2006/relationships" xmlns:p="http://schemas.openxmlformats.org/presentationml/2006/main">
   <p:sldMasterIdLst>
-    <p:sldMasterId id="2147483648" r:id="rId5"/>
+    <p:sldMasterId id="2147483648" r:id="rId1"/>
   </p:sldMasterIdLst>
   <p:notesMasterIdLst>
-    <p:notesMasterId r:id="rId7"/>
+    <p:notesMasterId r:id="rId11"/>
   </p:notesMasterIdLst>
   <p:sldIdLst>
-    <p:sldId id="256" r:id="rId8"/>
-    <p:sldId id="257" r:id="rId9"/>
-    <p:sldId id="258" r:id="rId10"/>
-    <p:sldId id="259" r:id="rId11"/>
-    <p:sldId id="260" r:id="rId12"/>
-    <p:sldId id="261" r:id="rId13"/>
-    <p:sldId id="262" r:id="rId14"/>
-    <p:sldId id="263" r:id="rId15"/>
-    <p:sldId id="264" r:id="rId16"/>
+    <p:sldId id="256" r:id="rId2"/>
+    <p:sldId id="257" r:id="rId3"/>
+    <p:sldId id="258" r:id="rId4"/>
+    <p:sldId id="259" r:id="rId5"/>
+    <p:sldId id="260" r:id="rId6"/>
+    <p:sldId id="261" r:id="rId7"/>
+    <p:sldId id="262" r:id="rId8"/>
+    <p:sldId id="263" r:id="rId9"/>
+    <p:sldId id="264" r:id="rId10"/>
   </p:sldIdLst>
-  <p:sldSz cx="9144000" cy="6858000"/>
+  <p:sldSz cx="9144000" cy="6858000" type="screen4x3"/>
   <p:notesSz cx="6858000" cy="9144000"/>
   <p:defaultTextStyle>
     <a:defPPr marL="0" marR="0" indent="0" algn="l" defTabSz="914400" rtl="0" fontAlgn="auto" latinLnBrk="1" hangingPunct="0">
@@ -36,7 +36,7 @@
       <a:buFontTx/>
       <a:buNone/>
       <a:tabLst/>
-      <a:defRPr b="0" baseline="0" cap="none" i="0" spc="0" strike="noStrike" sz="1800" u="none" kumimoji="0" normalizeH="0">
+      <a:defRPr kumimoji="0" sz="1800" b="0" i="0" u="none" strike="noStrike" cap="none" spc="0" normalizeH="0" baseline="0">
         <a:ln>
           <a:noFill/>
         </a:ln>
@@ -62,7 +62,7 @@
       <a:buFontTx/>
       <a:buNone/>
       <a:tabLst/>
-      <a:defRPr b="0" baseline="0" cap="none" i="0" spc="0" strike="noStrike" sz="1800" u="none" kumimoji="0" normalizeH="0">
+      <a:defRPr kumimoji="0" sz="1800" b="0" i="0" u="none" strike="noStrike" cap="none" spc="0" normalizeH="0" baseline="0">
         <a:ln>
           <a:noFill/>
         </a:ln>
@@ -92,7 +92,7 @@
       <a:buFontTx/>
       <a:buNone/>
       <a:tabLst/>
-      <a:defRPr b="0" baseline="0" cap="none" i="0" spc="0" strike="noStrike" sz="1800" u="none" kumimoji="0" normalizeH="0">
+      <a:defRPr kumimoji="0" sz="1800" b="0" i="0" u="none" strike="noStrike" cap="none" spc="0" normalizeH="0" baseline="0">
         <a:ln>
           <a:noFill/>
         </a:ln>
@@ -122,7 +122,7 @@
       <a:buFontTx/>
       <a:buNone/>
       <a:tabLst/>
-      <a:defRPr b="0" baseline="0" cap="none" i="0" spc="0" strike="noStrike" sz="1800" u="none" kumimoji="0" normalizeH="0">
+      <a:defRPr kumimoji="0" sz="1800" b="0" i="0" u="none" strike="noStrike" cap="none" spc="0" normalizeH="0" baseline="0">
         <a:ln>
           <a:noFill/>
         </a:ln>
@@ -152,7 +152,7 @@
       <a:buFontTx/>
       <a:buNone/>
       <a:tabLst/>
-      <a:defRPr b="0" baseline="0" cap="none" i="0" spc="0" strike="noStrike" sz="1800" u="none" kumimoji="0" normalizeH="0">
+      <a:defRPr kumimoji="0" sz="1800" b="0" i="0" u="none" strike="noStrike" cap="none" spc="0" normalizeH="0" baseline="0">
         <a:ln>
           <a:noFill/>
         </a:ln>
@@ -182,7 +182,7 @@
       <a:buFontTx/>
       <a:buNone/>
       <a:tabLst/>
-      <a:defRPr b="0" baseline="0" cap="none" i="0" spc="0" strike="noStrike" sz="1800" u="none" kumimoji="0" normalizeH="0">
+      <a:defRPr kumimoji="0" sz="1800" b="0" i="0" u="none" strike="noStrike" cap="none" spc="0" normalizeH="0" baseline="0">
         <a:ln>
           <a:noFill/>
         </a:ln>
@@ -212,7 +212,7 @@
       <a:buFontTx/>
       <a:buNone/>
       <a:tabLst/>
-      <a:defRPr b="0" baseline="0" cap="none" i="0" spc="0" strike="noStrike" sz="1800" u="none" kumimoji="0" normalizeH="0">
+      <a:defRPr kumimoji="0" sz="1800" b="0" i="0" u="none" strike="noStrike" cap="none" spc="0" normalizeH="0" baseline="0">
         <a:ln>
           <a:noFill/>
         </a:ln>
@@ -242,7 +242,7 @@
       <a:buFontTx/>
       <a:buNone/>
       <a:tabLst/>
-      <a:defRPr b="0" baseline="0" cap="none" i="0" spc="0" strike="noStrike" sz="1800" u="none" kumimoji="0" normalizeH="0">
+      <a:defRPr kumimoji="0" sz="1800" b="0" i="0" u="none" strike="noStrike" cap="none" spc="0" normalizeH="0" baseline="0">
         <a:ln>
           <a:noFill/>
         </a:ln>
@@ -272,7 +272,7 @@
       <a:buFontTx/>
       <a:buNone/>
       <a:tabLst/>
-      <a:defRPr b="0" baseline="0" cap="none" i="0" spc="0" strike="noStrike" sz="1800" u="none" kumimoji="0" normalizeH="0">
+      <a:defRPr kumimoji="0" sz="1800" b="0" i="0" u="none" strike="noStrike" cap="none" spc="0" normalizeH="0" baseline="0">
         <a:ln>
           <a:noFill/>
         </a:ln>
@@ -302,7 +302,7 @@
       <a:buFontTx/>
       <a:buNone/>
       <a:tabLst/>
-      <a:defRPr b="0" baseline="0" cap="none" i="0" spc="0" strike="noStrike" sz="1800" u="none" kumimoji="0" normalizeH="0">
+      <a:defRPr kumimoji="0" sz="1800" b="0" i="0" u="none" strike="noStrike" cap="none" spc="0" normalizeH="0" baseline="0">
         <a:ln>
           <a:noFill/>
         </a:ln>
@@ -321,13 +321,14 @@
 </p:presentation>
 </file>
 
-<file path=ppt/commentAuthors.xml><?xml version="1.0" encoding="utf-8"?>
-<p:cmAuthorLst xmlns:a="http://schemas.openxmlformats.org/drawingml/2006/main" xmlns:r="http://schemas.openxmlformats.org/officeDocument/2006/relationships" xmlns:p="http://schemas.openxmlformats.org/presentationml/2006/main" xmlns:m="http://schemas.openxmlformats.org/officeDocument/2006/math" xmlns:a14="http://schemas.microsoft.com/office/drawing/2010/main"/>
-</file>
-
 <file path=ppt/notesMasters/notesMaster1.xml><?xml version="1.0" encoding="utf-8"?>
-<p:notesMaster xmlns:a="http://schemas.openxmlformats.org/drawingml/2006/main" xmlns:r="http://schemas.openxmlformats.org/officeDocument/2006/relationships" xmlns:p="http://schemas.openxmlformats.org/presentationml/2006/main" xmlns:m="http://schemas.openxmlformats.org/officeDocument/2006/math" xmlns:a14="http://schemas.microsoft.com/office/drawing/2010/main">
+<p:notesMaster xmlns:a="http://schemas.openxmlformats.org/drawingml/2006/main" xmlns:r="http://schemas.openxmlformats.org/officeDocument/2006/relationships" xmlns:p="http://schemas.openxmlformats.org/presentationml/2006/main">
   <p:cSld>
+    <p:bg>
+      <p:bgRef idx="1001">
+        <a:schemeClr val="bg1"/>
+      </p:bgRef>
+    </p:bg>
     <p:spTree>
       <p:nvGrpSpPr>
         <p:cNvPr id="1" name=""/>
@@ -345,7 +346,9 @@
       <p:sp>
         <p:nvSpPr>
           <p:cNvPr id="125" name="Shape 125"/>
-          <p:cNvSpPr/>
+          <p:cNvSpPr>
+            <a:spLocks noGrp="1" noRot="1" noChangeAspect="1"/>
+          </p:cNvSpPr>
           <p:nvPr>
             <p:ph type="sldImg"/>
           </p:nvPr>
@@ -363,14 +366,16 @@
           <a:bodyPr/>
           <a:lstStyle/>
           <a:p>
-            <a:pPr/>
+            <a:endParaRPr/>
           </a:p>
         </p:txBody>
       </p:sp>
       <p:sp>
         <p:nvSpPr>
           <p:cNvPr id="126" name="Shape 126"/>
-          <p:cNvSpPr/>
+          <p:cNvSpPr>
+            <a:spLocks noGrp="1"/>
+          </p:cNvSpPr>
           <p:nvPr>
             <p:ph type="body" sz="quarter" idx="1"/>
           </p:nvPr>
@@ -388,7 +393,7 @@
           <a:bodyPr/>
           <a:lstStyle/>
           <a:p>
-            <a:pPr/>
+            <a:endParaRPr/>
           </a:p>
         </p:txBody>
       </p:sp>
@@ -473,13 +478,14 @@
 </file>
 
 <file path=ppt/slideLayouts/slideLayout1.xml><?xml version="1.0" encoding="utf-8"?>
-<p:sldLayout xmlns:a="http://schemas.openxmlformats.org/drawingml/2006/main" xmlns:r="http://schemas.openxmlformats.org/officeDocument/2006/relationships" xmlns:p="http://schemas.openxmlformats.org/presentationml/2006/main" xmlns:m="http://schemas.openxmlformats.org/officeDocument/2006/math" xmlns:a14="http://schemas.microsoft.com/office/drawing/2010/main" type="title" showMasterSp="0" showMasterPhAnim="1">
+<p:sldLayout xmlns:a="http://schemas.openxmlformats.org/drawingml/2006/main" xmlns:r="http://schemas.openxmlformats.org/officeDocument/2006/relationships" xmlns:p="http://schemas.openxmlformats.org/presentationml/2006/main" showMasterSp="0" type="title">
   <p:cSld name="Title Slide">
     <p:bg>
       <p:bgPr>
         <a:solidFill>
           <a:srgbClr val="775F55"/>
         </a:solidFill>
+        <a:effectLst/>
       </p:bgPr>
     </p:bg>
     <p:spTree>
@@ -528,6 +534,7 @@
                 </a:solidFill>
               </a:defRPr>
             </a:pPr>
+            <a:endParaRPr/>
           </a:p>
         </p:txBody>
       </p:sp>
@@ -563,6 +570,7 @@
                 </a:solidFill>
               </a:defRPr>
             </a:pPr>
+            <a:endParaRPr/>
           </a:p>
         </p:txBody>
       </p:sp>
@@ -598,13 +606,16 @@
                 </a:solidFill>
               </a:defRPr>
             </a:pPr>
+            <a:endParaRPr/>
           </a:p>
         </p:txBody>
       </p:sp>
       <p:sp>
         <p:nvSpPr>
           <p:cNvPr id="17" name="Titeltext"/>
-          <p:cNvSpPr txBox="1"/>
+          <p:cNvSpPr txBox="1">
+            <a:spLocks noGrp="1"/>
+          </p:cNvSpPr>
           <p:nvPr>
             <p:ph type="title"/>
           </p:nvPr>
@@ -630,7 +641,6 @@
             </a:lvl1pPr>
           </a:lstStyle>
           <a:p>
-            <a:pPr/>
             <a:r>
               <a:t>Titeltext</a:t>
             </a:r>
@@ -640,7 +650,9 @@
       <p:sp>
         <p:nvSpPr>
           <p:cNvPr id="18" name="Textebene 1…"/>
-          <p:cNvSpPr txBox="1"/>
+          <p:cNvSpPr txBox="1">
+            <a:spLocks noGrp="1"/>
+          </p:cNvSpPr>
           <p:nvPr>
             <p:ph type="body" sz="quarter" idx="1"/>
           </p:nvPr>
@@ -709,7 +721,6 @@
             </a:lvl5pPr>
           </a:lstStyle>
           <a:p>
-            <a:pPr/>
             <a:r>
               <a:t>Textebene 1</a:t>
             </a:r>
@@ -743,7 +754,9 @@
       <p:sp>
         <p:nvSpPr>
           <p:cNvPr id="19" name="Foliennummer"/>
-          <p:cNvSpPr txBox="1"/>
+          <p:cNvSpPr txBox="1">
+            <a:spLocks noGrp="1"/>
+          </p:cNvSpPr>
           <p:nvPr>
             <p:ph type="sldNum" sz="quarter" idx="2"/>
           </p:nvPr>
@@ -769,8 +782,10 @@
             </a:lvl1pPr>
           </a:lstStyle>
           <a:p>
-            <a:pPr/>
-            <a:fld id="{86CB4B4D-7CA3-9044-876B-883B54F8677D}" type="slidenum"/>
+            <a:fld id="{86CB4B4D-7CA3-9044-876B-883B54F8677D}" type="slidenum">
+              <a:t>‹Nr.›</a:t>
+            </a:fld>
+            <a:endParaRPr/>
           </a:p>
         </p:txBody>
       </p:sp>
@@ -779,12 +794,12 @@
   <p:clrMapOvr>
     <a:masterClrMapping/>
   </p:clrMapOvr>
-  <p:transition xmlns:p14="http://schemas.microsoft.com/office/powerpoint/2010/main" spd="med" advClick="1"/>
+  <p:transition spd="med"/>
 </p:sldLayout>
 </file>
 
 <file path=ppt/slideLayouts/slideLayout10.xml><?xml version="1.0" encoding="utf-8"?>
-<p:sldLayout xmlns:a="http://schemas.openxmlformats.org/drawingml/2006/main" xmlns:r="http://schemas.openxmlformats.org/officeDocument/2006/relationships" xmlns:p="http://schemas.openxmlformats.org/presentationml/2006/main" xmlns:m="http://schemas.openxmlformats.org/officeDocument/2006/math" xmlns:a14="http://schemas.microsoft.com/office/drawing/2010/main" type="tx" showMasterSp="1" showMasterPhAnim="1">
+<p:sldLayout xmlns:a="http://schemas.openxmlformats.org/drawingml/2006/main" xmlns:r="http://schemas.openxmlformats.org/officeDocument/2006/relationships" xmlns:p="http://schemas.openxmlformats.org/presentationml/2006/main" type="tx">
   <p:cSld name="Title and Vertical Text">
     <p:spTree>
       <p:nvGrpSpPr>
@@ -803,7 +818,9 @@
       <p:sp>
         <p:nvSpPr>
           <p:cNvPr id="105" name="Titeltext"/>
-          <p:cNvSpPr txBox="1"/>
+          <p:cNvSpPr txBox="1">
+            <a:spLocks noGrp="1"/>
+          </p:cNvSpPr>
           <p:nvPr>
             <p:ph type="title"/>
           </p:nvPr>
@@ -821,7 +838,6 @@
           <a:bodyPr/>
           <a:lstStyle/>
           <a:p>
-            <a:pPr/>
             <a:r>
               <a:t>Titeltext</a:t>
             </a:r>
@@ -831,7 +847,9 @@
       <p:sp>
         <p:nvSpPr>
           <p:cNvPr id="106" name="Textebene 1…"/>
-          <p:cNvSpPr txBox="1"/>
+          <p:cNvSpPr txBox="1">
+            <a:spLocks noGrp="1"/>
+          </p:cNvSpPr>
           <p:nvPr>
             <p:ph type="body" idx="1"/>
           </p:nvPr>
@@ -849,7 +867,6 @@
           <a:bodyPr/>
           <a:lstStyle/>
           <a:p>
-            <a:pPr/>
             <a:r>
               <a:t>Textebene 1</a:t>
             </a:r>
@@ -883,7 +900,9 @@
       <p:sp>
         <p:nvSpPr>
           <p:cNvPr id="107" name="Foliennummer"/>
-          <p:cNvSpPr txBox="1"/>
+          <p:cNvSpPr txBox="1">
+            <a:spLocks noGrp="1"/>
+          </p:cNvSpPr>
           <p:nvPr>
             <p:ph type="sldNum" sz="quarter" idx="2"/>
           </p:nvPr>
@@ -897,8 +916,10 @@
           <a:bodyPr/>
           <a:lstStyle/>
           <a:p>
-            <a:pPr/>
-            <a:fld id="{86CB4B4D-7CA3-9044-876B-883B54F8677D}" type="slidenum"/>
+            <a:fld id="{86CB4B4D-7CA3-9044-876B-883B54F8677D}" type="slidenum">
+              <a:t>‹Nr.›</a:t>
+            </a:fld>
+            <a:endParaRPr/>
           </a:p>
         </p:txBody>
       </p:sp>
@@ -907,12 +928,12 @@
   <p:clrMapOvr>
     <a:masterClrMapping/>
   </p:clrMapOvr>
-  <p:transition xmlns:p14="http://schemas.microsoft.com/office/powerpoint/2010/main" spd="med" advClick="1"/>
+  <p:transition spd="med"/>
 </p:sldLayout>
 </file>
 
 <file path=ppt/slideLayouts/slideLayout11.xml><?xml version="1.0" encoding="utf-8"?>
-<p:sldLayout xmlns:a="http://schemas.openxmlformats.org/drawingml/2006/main" xmlns:r="http://schemas.openxmlformats.org/officeDocument/2006/relationships" xmlns:p="http://schemas.openxmlformats.org/presentationml/2006/main" xmlns:m="http://schemas.openxmlformats.org/officeDocument/2006/math" xmlns:a14="http://schemas.microsoft.com/office/drawing/2010/main" type="tx" showMasterSp="0" showMasterPhAnim="1">
+<p:sldLayout xmlns:a="http://schemas.openxmlformats.org/drawingml/2006/main" xmlns:r="http://schemas.openxmlformats.org/officeDocument/2006/relationships" xmlns:p="http://schemas.openxmlformats.org/presentationml/2006/main" showMasterSp="0" type="tx">
   <p:cSld name="Vertical Title and Text">
     <p:spTree>
       <p:nvGrpSpPr>
@@ -931,7 +952,9 @@
       <p:sp>
         <p:nvSpPr>
           <p:cNvPr id="114" name="Titeltext"/>
-          <p:cNvSpPr txBox="1"/>
+          <p:cNvSpPr txBox="1">
+            <a:spLocks noGrp="1"/>
+          </p:cNvSpPr>
           <p:nvPr>
             <p:ph type="title"/>
           </p:nvPr>
@@ -949,7 +972,6 @@
           <a:bodyPr/>
           <a:lstStyle/>
           <a:p>
-            <a:pPr/>
             <a:r>
               <a:t>Titeltext</a:t>
             </a:r>
@@ -959,7 +981,9 @@
       <p:sp>
         <p:nvSpPr>
           <p:cNvPr id="115" name="Textebene 1…"/>
-          <p:cNvSpPr txBox="1"/>
+          <p:cNvSpPr txBox="1">
+            <a:spLocks noGrp="1"/>
+          </p:cNvSpPr>
           <p:nvPr>
             <p:ph type="body" idx="1"/>
           </p:nvPr>
@@ -977,7 +1001,6 @@
           <a:bodyPr/>
           <a:lstStyle/>
           <a:p>
-            <a:pPr/>
             <a:r>
               <a:t>Textebene 1</a:t>
             </a:r>
@@ -1040,6 +1063,7 @@
                 </a:solidFill>
               </a:defRPr>
             </a:pPr>
+            <a:endParaRPr/>
           </a:p>
         </p:txBody>
       </p:sp>
@@ -1075,6 +1099,7 @@
                 </a:solidFill>
               </a:defRPr>
             </a:pPr>
+            <a:endParaRPr/>
           </a:p>
         </p:txBody>
       </p:sp>
@@ -1110,13 +1135,16 @@
                 </a:solidFill>
               </a:defRPr>
             </a:pPr>
+            <a:endParaRPr/>
           </a:p>
         </p:txBody>
       </p:sp>
       <p:sp>
         <p:nvSpPr>
           <p:cNvPr id="119" name="Foliennummer"/>
-          <p:cNvSpPr txBox="1"/>
+          <p:cNvSpPr txBox="1">
+            <a:spLocks noGrp="1"/>
+          </p:cNvSpPr>
           <p:nvPr>
             <p:ph type="sldNum" sz="quarter" idx="2"/>
           </p:nvPr>
@@ -1134,8 +1162,10 @@
           <a:bodyPr/>
           <a:lstStyle/>
           <a:p>
-            <a:pPr/>
-            <a:fld id="{86CB4B4D-7CA3-9044-876B-883B54F8677D}" type="slidenum"/>
+            <a:fld id="{86CB4B4D-7CA3-9044-876B-883B54F8677D}" type="slidenum">
+              <a:t>‹Nr.›</a:t>
+            </a:fld>
+            <a:endParaRPr/>
           </a:p>
         </p:txBody>
       </p:sp>
@@ -1144,12 +1174,12 @@
   <p:clrMapOvr>
     <a:masterClrMapping/>
   </p:clrMapOvr>
-  <p:transition xmlns:p14="http://schemas.microsoft.com/office/powerpoint/2010/main" spd="med" advClick="1"/>
+  <p:transition spd="med"/>
 </p:sldLayout>
 </file>
 
 <file path=ppt/slideLayouts/slideLayout2.xml><?xml version="1.0" encoding="utf-8"?>
-<p:sldLayout xmlns:a="http://schemas.openxmlformats.org/drawingml/2006/main" xmlns:r="http://schemas.openxmlformats.org/officeDocument/2006/relationships" xmlns:p="http://schemas.openxmlformats.org/presentationml/2006/main" xmlns:m="http://schemas.openxmlformats.org/officeDocument/2006/math" xmlns:a14="http://schemas.microsoft.com/office/drawing/2010/main" type="tx" showMasterSp="1" showMasterPhAnim="1">
+<p:sldLayout xmlns:a="http://schemas.openxmlformats.org/drawingml/2006/main" xmlns:r="http://schemas.openxmlformats.org/officeDocument/2006/relationships" xmlns:p="http://schemas.openxmlformats.org/presentationml/2006/main" type="tx">
   <p:cSld name="Title and Content">
     <p:spTree>
       <p:nvGrpSpPr>
@@ -1168,7 +1198,9 @@
       <p:sp>
         <p:nvSpPr>
           <p:cNvPr id="26" name="Titeltext"/>
-          <p:cNvSpPr txBox="1"/>
+          <p:cNvSpPr txBox="1">
+            <a:spLocks noGrp="1"/>
+          </p:cNvSpPr>
           <p:nvPr>
             <p:ph type="title"/>
           </p:nvPr>
@@ -1182,7 +1214,6 @@
           <a:bodyPr/>
           <a:lstStyle/>
           <a:p>
-            <a:pPr/>
             <a:r>
               <a:t>Titeltext</a:t>
             </a:r>
@@ -1192,7 +1223,9 @@
       <p:sp>
         <p:nvSpPr>
           <p:cNvPr id="27" name="Textebene 1…"/>
-          <p:cNvSpPr txBox="1"/>
+          <p:cNvSpPr txBox="1">
+            <a:spLocks noGrp="1"/>
+          </p:cNvSpPr>
           <p:nvPr>
             <p:ph type="body" idx="1"/>
           </p:nvPr>
@@ -1206,7 +1239,6 @@
           <a:bodyPr/>
           <a:lstStyle/>
           <a:p>
-            <a:pPr/>
             <a:r>
               <a:t>Textebene 1</a:t>
             </a:r>
@@ -1240,7 +1272,9 @@
       <p:sp>
         <p:nvSpPr>
           <p:cNvPr id="28" name="Foliennummer"/>
-          <p:cNvSpPr txBox="1"/>
+          <p:cNvSpPr txBox="1">
+            <a:spLocks noGrp="1"/>
+          </p:cNvSpPr>
           <p:nvPr>
             <p:ph type="sldNum" sz="quarter" idx="2"/>
           </p:nvPr>
@@ -1254,8 +1288,10 @@
           <a:bodyPr/>
           <a:lstStyle/>
           <a:p>
-            <a:pPr/>
-            <a:fld id="{86CB4B4D-7CA3-9044-876B-883B54F8677D}" type="slidenum"/>
+            <a:fld id="{86CB4B4D-7CA3-9044-876B-883B54F8677D}" type="slidenum">
+              <a:t>‹Nr.›</a:t>
+            </a:fld>
+            <a:endParaRPr/>
           </a:p>
         </p:txBody>
       </p:sp>
@@ -1264,20 +1300,21 @@
   <p:clrMapOvr>
     <a:masterClrMapping/>
   </p:clrMapOvr>
-  <p:transition xmlns:p14="http://schemas.microsoft.com/office/powerpoint/2010/main" spd="med" advClick="1"/>
+  <p:transition spd="med"/>
 </p:sldLayout>
 </file>
 
 <file path=ppt/slideLayouts/slideLayout3.xml><?xml version="1.0" encoding="utf-8"?>
-<p:sldLayout xmlns:a="http://schemas.openxmlformats.org/drawingml/2006/main" xmlns:r="http://schemas.openxmlformats.org/officeDocument/2006/relationships" xmlns:p="http://schemas.openxmlformats.org/presentationml/2006/main" xmlns:m="http://schemas.openxmlformats.org/officeDocument/2006/math" xmlns:a14="http://schemas.microsoft.com/office/drawing/2010/main" type="tx" showMasterSp="0" showMasterPhAnim="1">
+<p:sldLayout xmlns:a="http://schemas.openxmlformats.org/drawingml/2006/main" xmlns:r="http://schemas.openxmlformats.org/officeDocument/2006/relationships" xmlns:p="http://schemas.openxmlformats.org/presentationml/2006/main" showMasterSp="0" type="tx">
   <p:cSld name="Section Header">
     <p:bg>
       <p:bgPr>
         <a:blipFill rotWithShape="1">
           <a:blip r:embed="rId2"/>
-          <a:srcRect l="0" t="0" r="0" b="0"/>
+          <a:srcRect/>
           <a:tile tx="0" ty="0" sx="100000" sy="100000" flip="none" algn="tl"/>
         </a:blipFill>
+        <a:effectLst/>
       </p:bgPr>
     </p:bg>
     <p:spTree>
@@ -1297,7 +1334,9 @@
       <p:sp>
         <p:nvSpPr>
           <p:cNvPr id="35" name="Textebene 1…"/>
-          <p:cNvSpPr txBox="1"/>
+          <p:cNvSpPr txBox="1">
+            <a:spLocks noGrp="1"/>
+          </p:cNvSpPr>
           <p:nvPr>
             <p:ph type="body" sz="quarter" idx="1"/>
           </p:nvPr>
@@ -1366,7 +1405,6 @@
             </a:lvl5pPr>
           </a:lstStyle>
           <a:p>
-            <a:pPr/>
             <a:r>
               <a:t>Textebene 1</a:t>
             </a:r>
@@ -1429,6 +1467,7 @@
                 </a:solidFill>
               </a:defRPr>
             </a:pPr>
+            <a:endParaRPr/>
           </a:p>
         </p:txBody>
       </p:sp>
@@ -1464,6 +1503,7 @@
                 </a:solidFill>
               </a:defRPr>
             </a:pPr>
+            <a:endParaRPr/>
           </a:p>
         </p:txBody>
       </p:sp>
@@ -1499,13 +1539,16 @@
                 </a:solidFill>
               </a:defRPr>
             </a:pPr>
+            <a:endParaRPr/>
           </a:p>
         </p:txBody>
       </p:sp>
       <p:sp>
         <p:nvSpPr>
           <p:cNvPr id="39" name="Titeltext"/>
-          <p:cNvSpPr txBox="1"/>
+          <p:cNvSpPr txBox="1">
+            <a:spLocks noGrp="1"/>
+          </p:cNvSpPr>
           <p:nvPr>
             <p:ph type="title"/>
           </p:nvPr>
@@ -1531,7 +1574,6 @@
             </a:lvl1pPr>
           </a:lstStyle>
           <a:p>
-            <a:pPr/>
             <a:r>
               <a:t>Titeltext</a:t>
             </a:r>
@@ -1541,7 +1583,9 @@
       <p:sp>
         <p:nvSpPr>
           <p:cNvPr id="40" name="Foliennummer"/>
-          <p:cNvSpPr txBox="1"/>
+          <p:cNvSpPr txBox="1">
+            <a:spLocks noGrp="1"/>
+          </p:cNvSpPr>
           <p:nvPr>
             <p:ph type="sldNum" sz="quarter" idx="2"/>
           </p:nvPr>
@@ -1565,8 +1609,10 @@
             </a:lvl1pPr>
           </a:lstStyle>
           <a:p>
-            <a:pPr/>
-            <a:fld id="{86CB4B4D-7CA3-9044-876B-883B54F8677D}" type="slidenum"/>
+            <a:fld id="{86CB4B4D-7CA3-9044-876B-883B54F8677D}" type="slidenum">
+              <a:t>‹Nr.›</a:t>
+            </a:fld>
+            <a:endParaRPr/>
           </a:p>
         </p:txBody>
       </p:sp>
@@ -1575,12 +1621,12 @@
   <p:clrMapOvr>
     <a:masterClrMapping/>
   </p:clrMapOvr>
-  <p:transition xmlns:p14="http://schemas.microsoft.com/office/powerpoint/2010/main" spd="med" advClick="1"/>
+  <p:transition spd="med"/>
 </p:sldLayout>
 </file>
 
 <file path=ppt/slideLayouts/slideLayout4.xml><?xml version="1.0" encoding="utf-8"?>
-<p:sldLayout xmlns:a="http://schemas.openxmlformats.org/drawingml/2006/main" xmlns:r="http://schemas.openxmlformats.org/officeDocument/2006/relationships" xmlns:p="http://schemas.openxmlformats.org/presentationml/2006/main" xmlns:m="http://schemas.openxmlformats.org/officeDocument/2006/math" xmlns:a14="http://schemas.microsoft.com/office/drawing/2010/main" type="tx" showMasterSp="1" showMasterPhAnim="1">
+<p:sldLayout xmlns:a="http://schemas.openxmlformats.org/drawingml/2006/main" xmlns:r="http://schemas.openxmlformats.org/officeDocument/2006/relationships" xmlns:p="http://schemas.openxmlformats.org/presentationml/2006/main" type="tx">
   <p:cSld name="Two Content">
     <p:spTree>
       <p:nvGrpSpPr>
@@ -1599,7 +1645,9 @@
       <p:sp>
         <p:nvSpPr>
           <p:cNvPr id="47" name="Titeltext"/>
-          <p:cNvSpPr txBox="1"/>
+          <p:cNvSpPr txBox="1">
+            <a:spLocks noGrp="1"/>
+          </p:cNvSpPr>
           <p:nvPr>
             <p:ph type="title"/>
           </p:nvPr>
@@ -1617,7 +1665,6 @@
           <a:bodyPr/>
           <a:lstStyle/>
           <a:p>
-            <a:pPr/>
             <a:r>
               <a:t>Titeltext</a:t>
             </a:r>
@@ -1627,7 +1674,9 @@
       <p:sp>
         <p:nvSpPr>
           <p:cNvPr id="48" name="Textebene 1…"/>
-          <p:cNvSpPr txBox="1"/>
+          <p:cNvSpPr txBox="1">
+            <a:spLocks noGrp="1"/>
+          </p:cNvSpPr>
           <p:nvPr>
             <p:ph type="body" sz="half" idx="1"/>
           </p:nvPr>
@@ -1645,7 +1694,6 @@
           <a:bodyPr/>
           <a:lstStyle/>
           <a:p>
-            <a:pPr/>
             <a:r>
               <a:t>Textebene 1</a:t>
             </a:r>
@@ -1679,7 +1727,9 @@
       <p:sp>
         <p:nvSpPr>
           <p:cNvPr id="49" name="Foliennummer"/>
-          <p:cNvSpPr txBox="1"/>
+          <p:cNvSpPr txBox="1">
+            <a:spLocks noGrp="1"/>
+          </p:cNvSpPr>
           <p:nvPr>
             <p:ph type="sldNum" sz="quarter" idx="2"/>
           </p:nvPr>
@@ -1693,8 +1743,10 @@
           <a:bodyPr/>
           <a:lstStyle/>
           <a:p>
-            <a:pPr/>
-            <a:fld id="{86CB4B4D-7CA3-9044-876B-883B54F8677D}" type="slidenum"/>
+            <a:fld id="{86CB4B4D-7CA3-9044-876B-883B54F8677D}" type="slidenum">
+              <a:t>‹Nr.›</a:t>
+            </a:fld>
+            <a:endParaRPr/>
           </a:p>
         </p:txBody>
       </p:sp>
@@ -1703,12 +1755,12 @@
   <p:clrMapOvr>
     <a:masterClrMapping/>
   </p:clrMapOvr>
-  <p:transition xmlns:p14="http://schemas.microsoft.com/office/powerpoint/2010/main" spd="med" advClick="1"/>
+  <p:transition spd="med"/>
 </p:sldLayout>
 </file>
 
 <file path=ppt/slideLayouts/slideLayout5.xml><?xml version="1.0" encoding="utf-8"?>
-<p:sldLayout xmlns:a="http://schemas.openxmlformats.org/drawingml/2006/main" xmlns:r="http://schemas.openxmlformats.org/officeDocument/2006/relationships" xmlns:p="http://schemas.openxmlformats.org/presentationml/2006/main" xmlns:m="http://schemas.openxmlformats.org/officeDocument/2006/math" xmlns:a14="http://schemas.microsoft.com/office/drawing/2010/main" type="tx" showMasterSp="1" showMasterPhAnim="1">
+<p:sldLayout xmlns:a="http://schemas.openxmlformats.org/drawingml/2006/main" xmlns:r="http://schemas.openxmlformats.org/officeDocument/2006/relationships" xmlns:p="http://schemas.openxmlformats.org/presentationml/2006/main" type="tx">
   <p:cSld name="Comparison">
     <p:spTree>
       <p:nvGrpSpPr>
@@ -1727,7 +1779,9 @@
       <p:sp>
         <p:nvSpPr>
           <p:cNvPr id="56" name="Titeltext"/>
-          <p:cNvSpPr txBox="1"/>
+          <p:cNvSpPr txBox="1">
+            <a:spLocks noGrp="1"/>
+          </p:cNvSpPr>
           <p:nvPr>
             <p:ph type="title"/>
           </p:nvPr>
@@ -1745,7 +1799,6 @@
           <a:bodyPr/>
           <a:lstStyle/>
           <a:p>
-            <a:pPr/>
             <a:r>
               <a:t>Titeltext</a:t>
             </a:r>
@@ -1755,7 +1808,9 @@
       <p:sp>
         <p:nvSpPr>
           <p:cNvPr id="57" name="Textebene 1…"/>
-          <p:cNvSpPr txBox="1"/>
+          <p:cNvSpPr txBox="1">
+            <a:spLocks noGrp="1"/>
+          </p:cNvSpPr>
           <p:nvPr>
             <p:ph type="body" sz="half" idx="1"/>
           </p:nvPr>
@@ -1773,7 +1828,6 @@
           <a:bodyPr/>
           <a:lstStyle/>
           <a:p>
-            <a:pPr/>
             <a:r>
               <a:t>Textebene 1</a:t>
             </a:r>
@@ -1807,7 +1861,9 @@
       <p:sp>
         <p:nvSpPr>
           <p:cNvPr id="58" name="Text Placeholder 15"/>
-          <p:cNvSpPr/>
+          <p:cNvSpPr>
+            <a:spLocks noGrp="1"/>
+          </p:cNvSpPr>
           <p:nvPr>
             <p:ph type="body" sz="quarter" idx="13"/>
           </p:nvPr>
@@ -1832,19 +1888,22 @@
               <a:buClrTx/>
               <a:buSzTx/>
               <a:buNone/>
-              <a:defRPr b="1" sz="2000">
+              <a:defRPr sz="2000" b="1">
                 <a:solidFill>
                   <a:srgbClr val="FFFFFF"/>
                 </a:solidFill>
               </a:defRPr>
             </a:pPr>
+            <a:endParaRPr/>
           </a:p>
         </p:txBody>
       </p:sp>
       <p:sp>
         <p:nvSpPr>
           <p:cNvPr id="59" name="Text Placeholder 14"/>
-          <p:cNvSpPr/>
+          <p:cNvSpPr>
+            <a:spLocks noGrp="1"/>
+          </p:cNvSpPr>
           <p:nvPr>
             <p:ph type="body" sz="quarter" idx="14"/>
           </p:nvPr>
@@ -1869,19 +1928,22 @@
               <a:buClrTx/>
               <a:buSzTx/>
               <a:buNone/>
-              <a:defRPr b="1" sz="2000">
+              <a:defRPr sz="2000" b="1">
                 <a:solidFill>
                   <a:srgbClr val="FFFFFF"/>
                 </a:solidFill>
               </a:defRPr>
             </a:pPr>
+            <a:endParaRPr/>
           </a:p>
         </p:txBody>
       </p:sp>
       <p:sp>
         <p:nvSpPr>
           <p:cNvPr id="60" name="Foliennummer"/>
-          <p:cNvSpPr txBox="1"/>
+          <p:cNvSpPr txBox="1">
+            <a:spLocks noGrp="1"/>
+          </p:cNvSpPr>
           <p:nvPr>
             <p:ph type="sldNum" sz="quarter" idx="2"/>
           </p:nvPr>
@@ -1895,8 +1957,10 @@
           <a:bodyPr/>
           <a:lstStyle/>
           <a:p>
-            <a:pPr/>
-            <a:fld id="{86CB4B4D-7CA3-9044-876B-883B54F8677D}" type="slidenum"/>
+            <a:fld id="{86CB4B4D-7CA3-9044-876B-883B54F8677D}" type="slidenum">
+              <a:t>‹Nr.›</a:t>
+            </a:fld>
+            <a:endParaRPr/>
           </a:p>
         </p:txBody>
       </p:sp>
@@ -1905,12 +1969,12 @@
   <p:clrMapOvr>
     <a:masterClrMapping/>
   </p:clrMapOvr>
-  <p:transition xmlns:p14="http://schemas.microsoft.com/office/powerpoint/2010/main" spd="med" advClick="1"/>
+  <p:transition spd="med"/>
 </p:sldLayout>
 </file>
 
 <file path=ppt/slideLayouts/slideLayout6.xml><?xml version="1.0" encoding="utf-8"?>
-<p:sldLayout xmlns:a="http://schemas.openxmlformats.org/drawingml/2006/main" xmlns:r="http://schemas.openxmlformats.org/officeDocument/2006/relationships" xmlns:p="http://schemas.openxmlformats.org/presentationml/2006/main" xmlns:m="http://schemas.openxmlformats.org/officeDocument/2006/math" xmlns:a14="http://schemas.microsoft.com/office/drawing/2010/main" type="tx" showMasterSp="1" showMasterPhAnim="1">
+<p:sldLayout xmlns:a="http://schemas.openxmlformats.org/drawingml/2006/main" xmlns:r="http://schemas.openxmlformats.org/officeDocument/2006/relationships" xmlns:p="http://schemas.openxmlformats.org/presentationml/2006/main" type="tx">
   <p:cSld name="Title Only">
     <p:spTree>
       <p:nvGrpSpPr>
@@ -1929,7 +1993,9 @@
       <p:sp>
         <p:nvSpPr>
           <p:cNvPr id="67" name="Titeltext"/>
-          <p:cNvSpPr txBox="1"/>
+          <p:cNvSpPr txBox="1">
+            <a:spLocks noGrp="1"/>
+          </p:cNvSpPr>
           <p:nvPr>
             <p:ph type="title"/>
           </p:nvPr>
@@ -1947,7 +2013,6 @@
           <a:bodyPr/>
           <a:lstStyle/>
           <a:p>
-            <a:pPr/>
             <a:r>
               <a:t>Titeltext</a:t>
             </a:r>
@@ -1957,7 +2022,9 @@
       <p:sp>
         <p:nvSpPr>
           <p:cNvPr id="68" name="Foliennummer"/>
-          <p:cNvSpPr txBox="1"/>
+          <p:cNvSpPr txBox="1">
+            <a:spLocks noGrp="1"/>
+          </p:cNvSpPr>
           <p:nvPr>
             <p:ph type="sldNum" sz="quarter" idx="2"/>
           </p:nvPr>
@@ -1971,8 +2038,10 @@
           <a:bodyPr/>
           <a:lstStyle/>
           <a:p>
-            <a:pPr/>
-            <a:fld id="{86CB4B4D-7CA3-9044-876B-883B54F8677D}" type="slidenum"/>
+            <a:fld id="{86CB4B4D-7CA3-9044-876B-883B54F8677D}" type="slidenum">
+              <a:t>‹Nr.›</a:t>
+            </a:fld>
+            <a:endParaRPr/>
           </a:p>
         </p:txBody>
       </p:sp>
@@ -1981,12 +2050,12 @@
   <p:clrMapOvr>
     <a:masterClrMapping/>
   </p:clrMapOvr>
-  <p:transition xmlns:p14="http://schemas.microsoft.com/office/powerpoint/2010/main" spd="med" advClick="1"/>
+  <p:transition spd="med"/>
 </p:sldLayout>
 </file>
 
 <file path=ppt/slideLayouts/slideLayout7.xml><?xml version="1.0" encoding="utf-8"?>
-<p:sldLayout xmlns:a="http://schemas.openxmlformats.org/drawingml/2006/main" xmlns:r="http://schemas.openxmlformats.org/officeDocument/2006/relationships" xmlns:p="http://schemas.openxmlformats.org/presentationml/2006/main" xmlns:m="http://schemas.openxmlformats.org/officeDocument/2006/math" xmlns:a14="http://schemas.microsoft.com/office/drawing/2010/main" type="tx" showMasterSp="0" showMasterPhAnim="1">
+<p:sldLayout xmlns:a="http://schemas.openxmlformats.org/drawingml/2006/main" xmlns:r="http://schemas.openxmlformats.org/officeDocument/2006/relationships" xmlns:p="http://schemas.openxmlformats.org/presentationml/2006/main" showMasterSp="0" type="tx">
   <p:cSld name="Blank">
     <p:spTree>
       <p:nvGrpSpPr>
@@ -2005,7 +2074,9 @@
       <p:sp>
         <p:nvSpPr>
           <p:cNvPr id="75" name="Foliennummer"/>
-          <p:cNvSpPr txBox="1"/>
+          <p:cNvSpPr txBox="1">
+            <a:spLocks noGrp="1"/>
+          </p:cNvSpPr>
           <p:nvPr>
             <p:ph type="sldNum" sz="quarter" idx="2"/>
           </p:nvPr>
@@ -2031,8 +2102,10 @@
             </a:lvl1pPr>
           </a:lstStyle>
           <a:p>
-            <a:pPr/>
-            <a:fld id="{86CB4B4D-7CA3-9044-876B-883B54F8677D}" type="slidenum"/>
+            <a:fld id="{86CB4B4D-7CA3-9044-876B-883B54F8677D}" type="slidenum">
+              <a:t>‹Nr.›</a:t>
+            </a:fld>
+            <a:endParaRPr/>
           </a:p>
         </p:txBody>
       </p:sp>
@@ -2041,12 +2114,12 @@
   <p:clrMapOvr>
     <a:masterClrMapping/>
   </p:clrMapOvr>
-  <p:transition xmlns:p14="http://schemas.microsoft.com/office/powerpoint/2010/main" spd="med" advClick="1"/>
+  <p:transition spd="med"/>
 </p:sldLayout>
 </file>
 
 <file path=ppt/slideLayouts/slideLayout8.xml><?xml version="1.0" encoding="utf-8"?>
-<p:sldLayout xmlns:a="http://schemas.openxmlformats.org/drawingml/2006/main" xmlns:r="http://schemas.openxmlformats.org/officeDocument/2006/relationships" xmlns:p="http://schemas.openxmlformats.org/presentationml/2006/main" xmlns:m="http://schemas.openxmlformats.org/officeDocument/2006/math" xmlns:a14="http://schemas.microsoft.com/office/drawing/2010/main" type="tx" showMasterSp="1" showMasterPhAnim="1">
+<p:sldLayout xmlns:a="http://schemas.openxmlformats.org/drawingml/2006/main" xmlns:r="http://schemas.openxmlformats.org/officeDocument/2006/relationships" xmlns:p="http://schemas.openxmlformats.org/presentationml/2006/main" type="tx">
   <p:cSld name="Content with Caption">
     <p:spTree>
       <p:nvGrpSpPr>
@@ -2065,7 +2138,9 @@
       <p:sp>
         <p:nvSpPr>
           <p:cNvPr id="82" name="Titeltext"/>
-          <p:cNvSpPr txBox="1"/>
+          <p:cNvSpPr txBox="1">
+            <a:spLocks noGrp="1"/>
+          </p:cNvSpPr>
           <p:nvPr>
             <p:ph type="title"/>
           </p:nvPr>
@@ -2083,7 +2158,6 @@
           <a:bodyPr/>
           <a:lstStyle/>
           <a:p>
-            <a:pPr/>
             <a:r>
               <a:t>Titeltext</a:t>
             </a:r>
@@ -2093,7 +2167,9 @@
       <p:sp>
         <p:nvSpPr>
           <p:cNvPr id="83" name="Textebene 1…"/>
-          <p:cNvSpPr txBox="1"/>
+          <p:cNvSpPr txBox="1">
+            <a:spLocks noGrp="1"/>
+          </p:cNvSpPr>
           <p:nvPr>
             <p:ph type="body" sz="quarter" idx="1"/>
           </p:nvPr>
@@ -2186,7 +2262,6 @@
             </a:lvl5pPr>
           </a:lstStyle>
           <a:p>
-            <a:pPr/>
             <a:r>
               <a:t>Textebene 1</a:t>
             </a:r>
@@ -2220,7 +2295,9 @@
       <p:sp>
         <p:nvSpPr>
           <p:cNvPr id="84" name="Foliennummer"/>
-          <p:cNvSpPr txBox="1"/>
+          <p:cNvSpPr txBox="1">
+            <a:spLocks noGrp="1"/>
+          </p:cNvSpPr>
           <p:nvPr>
             <p:ph type="sldNum" sz="quarter" idx="2"/>
           </p:nvPr>
@@ -2234,8 +2311,10 @@
           <a:bodyPr/>
           <a:lstStyle/>
           <a:p>
-            <a:pPr/>
-            <a:fld id="{86CB4B4D-7CA3-9044-876B-883B54F8677D}" type="slidenum"/>
+            <a:fld id="{86CB4B4D-7CA3-9044-876B-883B54F8677D}" type="slidenum">
+              <a:t>‹Nr.›</a:t>
+            </a:fld>
+            <a:endParaRPr/>
           </a:p>
         </p:txBody>
       </p:sp>
@@ -2244,20 +2323,21 @@
   <p:clrMapOvr>
     <a:masterClrMapping/>
   </p:clrMapOvr>
-  <p:transition xmlns:p14="http://schemas.microsoft.com/office/powerpoint/2010/main" spd="med" advClick="1"/>
+  <p:transition spd="med"/>
 </p:sldLayout>
 </file>
 
 <file path=ppt/slideLayouts/slideLayout9.xml><?xml version="1.0" encoding="utf-8"?>
-<p:sldLayout xmlns:a="http://schemas.openxmlformats.org/drawingml/2006/main" xmlns:r="http://schemas.openxmlformats.org/officeDocument/2006/relationships" xmlns:p="http://schemas.openxmlformats.org/presentationml/2006/main" xmlns:m="http://schemas.openxmlformats.org/officeDocument/2006/math" xmlns:a14="http://schemas.microsoft.com/office/drawing/2010/main" type="tx" showMasterSp="0" showMasterPhAnim="1">
+<p:sldLayout xmlns:a="http://schemas.openxmlformats.org/drawingml/2006/main" xmlns:r="http://schemas.openxmlformats.org/officeDocument/2006/relationships" xmlns:p="http://schemas.openxmlformats.org/presentationml/2006/main" showMasterSp="0" type="tx">
   <p:cSld name="Picture with Caption">
     <p:bg>
       <p:bgPr>
         <a:blipFill rotWithShape="1">
           <a:blip r:embed="rId2"/>
-          <a:srcRect l="0" t="0" r="0" b="0"/>
+          <a:srcRect/>
           <a:tile tx="0" ty="0" sx="100000" sy="100000" flip="none" algn="tl"/>
         </a:blipFill>
+        <a:effectLst/>
       </p:bgPr>
     </p:bg>
     <p:spTree>
@@ -2277,7 +2357,9 @@
       <p:sp>
         <p:nvSpPr>
           <p:cNvPr id="91" name="Textebene 1…"/>
-          <p:cNvSpPr txBox="1"/>
+          <p:cNvSpPr txBox="1">
+            <a:spLocks noGrp="1"/>
+          </p:cNvSpPr>
           <p:nvPr>
             <p:ph type="body" sz="quarter" idx="1"/>
           </p:nvPr>
@@ -2326,7 +2408,6 @@
             </a:lvl5pPr>
           </a:lstStyle>
           <a:p>
-            <a:pPr/>
             <a:r>
               <a:t>Textebene 1</a:t>
             </a:r>
@@ -2389,6 +2470,7 @@
                 </a:solidFill>
               </a:defRPr>
             </a:pPr>
+            <a:endParaRPr/>
           </a:p>
         </p:txBody>
       </p:sp>
@@ -2424,6 +2506,7 @@
                 </a:solidFill>
               </a:defRPr>
             </a:pPr>
+            <a:endParaRPr/>
           </a:p>
         </p:txBody>
       </p:sp>
@@ -2459,13 +2542,16 @@
                 </a:solidFill>
               </a:defRPr>
             </a:pPr>
+            <a:endParaRPr/>
           </a:p>
         </p:txBody>
       </p:sp>
       <p:sp>
         <p:nvSpPr>
           <p:cNvPr id="95" name="Titeltext"/>
-          <p:cNvSpPr txBox="1"/>
+          <p:cNvSpPr txBox="1">
+            <a:spLocks noGrp="1"/>
+          </p:cNvSpPr>
           <p:nvPr>
             <p:ph type="title"/>
           </p:nvPr>
@@ -2491,7 +2577,6 @@
             </a:lvl1pPr>
           </a:lstStyle>
           <a:p>
-            <a:pPr/>
             <a:r>
               <a:t>Titeltext</a:t>
             </a:r>
@@ -2530,13 +2615,16 @@
                 </a:solidFill>
               </a:defRPr>
             </a:pPr>
+            <a:endParaRPr/>
           </a:p>
         </p:txBody>
       </p:sp>
       <p:sp>
         <p:nvSpPr>
           <p:cNvPr id="97" name="Picture Placeholder 2"/>
-          <p:cNvSpPr/>
+          <p:cNvSpPr>
+            <a:spLocks noGrp="1"/>
+          </p:cNvSpPr>
           <p:nvPr>
             <p:ph type="pic" idx="13"/>
           </p:nvPr>
@@ -2556,14 +2644,16 @@
           </a:bodyPr>
           <a:lstStyle/>
           <a:p>
-            <a:pPr/>
+            <a:endParaRPr/>
           </a:p>
         </p:txBody>
       </p:sp>
       <p:sp>
         <p:nvSpPr>
           <p:cNvPr id="98" name="Foliennummer"/>
-          <p:cNvSpPr txBox="1"/>
+          <p:cNvSpPr txBox="1">
+            <a:spLocks noGrp="1"/>
+          </p:cNvSpPr>
           <p:nvPr>
             <p:ph type="sldNum" sz="quarter" idx="2"/>
           </p:nvPr>
@@ -2585,8 +2675,10 @@
             </a:lvl1pPr>
           </a:lstStyle>
           <a:p>
-            <a:pPr/>
-            <a:fld id="{86CB4B4D-7CA3-9044-876B-883B54F8677D}" type="slidenum"/>
+            <a:fld id="{86CB4B4D-7CA3-9044-876B-883B54F8677D}" type="slidenum">
+              <a:t>‹Nr.›</a:t>
+            </a:fld>
+            <a:endParaRPr/>
           </a:p>
         </p:txBody>
       </p:sp>
@@ -2595,18 +2687,19 @@
   <p:clrMapOvr>
     <a:masterClrMapping/>
   </p:clrMapOvr>
-  <p:transition xmlns:p14="http://schemas.microsoft.com/office/powerpoint/2010/main" spd="med" advClick="1"/>
+  <p:transition spd="med"/>
 </p:sldLayout>
 </file>
 
 <file path=ppt/slideMasters/slideMaster1.xml><?xml version="1.0" encoding="utf-8"?>
-<p:sldMaster xmlns:a="http://schemas.openxmlformats.org/drawingml/2006/main" xmlns:r="http://schemas.openxmlformats.org/officeDocument/2006/relationships" xmlns:p="http://schemas.openxmlformats.org/presentationml/2006/main" xmlns:m="http://schemas.openxmlformats.org/officeDocument/2006/math" xmlns:a14="http://schemas.microsoft.com/office/drawing/2010/main">
+<p:sldMaster xmlns:a="http://schemas.openxmlformats.org/drawingml/2006/main" xmlns:r="http://schemas.openxmlformats.org/officeDocument/2006/relationships" xmlns:p="http://schemas.openxmlformats.org/presentationml/2006/main">
   <p:cSld>
     <p:bg>
       <p:bgPr>
         <a:solidFill>
           <a:srgbClr val="FFFFFF"/>
         </a:solidFill>
+        <a:effectLst/>
       </p:bgPr>
     </p:bg>
     <p:spTree>
@@ -2655,6 +2748,7 @@
                 </a:solidFill>
               </a:defRPr>
             </a:pPr>
+            <a:endParaRPr/>
           </a:p>
         </p:txBody>
       </p:sp>
@@ -2690,6 +2784,7 @@
                 </a:solidFill>
               </a:defRPr>
             </a:pPr>
+            <a:endParaRPr/>
           </a:p>
         </p:txBody>
       </p:sp>
@@ -2725,13 +2820,16 @@
                 </a:solidFill>
               </a:defRPr>
             </a:pPr>
+            <a:endParaRPr/>
           </a:p>
         </p:txBody>
       </p:sp>
       <p:sp>
         <p:nvSpPr>
           <p:cNvPr id="5" name="Titeltext"/>
-          <p:cNvSpPr txBox="1"/>
+          <p:cNvSpPr txBox="1">
+            <a:spLocks noGrp="1"/>
+          </p:cNvSpPr>
           <p:nvPr>
             <p:ph type="title"/>
           </p:nvPr>
@@ -2749,17 +2847,16 @@
           </a:ln>
           <a:extLst>
             <a:ext uri="{C572A759-6A51-4108-AA02-DFA0A04FC94B}">
-              <ma14:wrappingTextBoxFlag xmlns:ma14="http://schemas.microsoft.com/office/mac/drawingml/2011/main" val="1"/>
+              <ma14:wrappingTextBoxFlag xmlns:ma14="http://schemas.microsoft.com/office/mac/drawingml/2011/main" xmlns:a14="http://schemas.microsoft.com/office/drawing/2010/main" xmlns:m="http://schemas.openxmlformats.org/officeDocument/2006/math" xmlns="" val="1"/>
             </a:ext>
           </a:extLst>
         </p:spPr>
         <p:txBody>
           <a:bodyPr lIns="45719" rIns="45719" anchor="ctr">
-            <a:normAutofit fontScale="100000" lnSpcReduction="0"/>
+            <a:normAutofit/>
           </a:bodyPr>
           <a:lstStyle/>
           <a:p>
-            <a:pPr/>
             <a:r>
               <a:t>Titeltext</a:t>
             </a:r>
@@ -2769,7 +2866,9 @@
       <p:sp>
         <p:nvSpPr>
           <p:cNvPr id="6" name="Textebene 1…"/>
-          <p:cNvSpPr txBox="1"/>
+          <p:cNvSpPr txBox="1">
+            <a:spLocks noGrp="1"/>
+          </p:cNvSpPr>
           <p:nvPr>
             <p:ph type="body" idx="1"/>
           </p:nvPr>
@@ -2787,17 +2886,16 @@
           </a:ln>
           <a:extLst>
             <a:ext uri="{C572A759-6A51-4108-AA02-DFA0A04FC94B}">
-              <ma14:wrappingTextBoxFlag xmlns:ma14="http://schemas.microsoft.com/office/mac/drawingml/2011/main" val="1"/>
+              <ma14:wrappingTextBoxFlag xmlns:ma14="http://schemas.microsoft.com/office/mac/drawingml/2011/main" xmlns:a14="http://schemas.microsoft.com/office/drawing/2010/main" xmlns:m="http://schemas.openxmlformats.org/officeDocument/2006/math" xmlns="" val="1"/>
             </a:ext>
           </a:extLst>
         </p:spPr>
         <p:txBody>
           <a:bodyPr lIns="45719" rIns="45719">
-            <a:normAutofit fontScale="100000" lnSpcReduction="0"/>
+            <a:normAutofit/>
           </a:bodyPr>
           <a:lstStyle/>
           <a:p>
-            <a:pPr/>
             <a:r>
               <a:t>Textebene 1</a:t>
             </a:r>
@@ -2831,7 +2929,9 @@
       <p:sp>
         <p:nvSpPr>
           <p:cNvPr id="7" name="Foliennummer"/>
-          <p:cNvSpPr txBox="1"/>
+          <p:cNvSpPr txBox="1">
+            <a:spLocks noGrp="1"/>
+          </p:cNvSpPr>
           <p:nvPr>
             <p:ph type="sldNum" sz="quarter" idx="2"/>
           </p:nvPr>
@@ -2850,11 +2950,11 @@
         </p:spPr>
         <p:txBody>
           <a:bodyPr wrap="none" lIns="45719" rIns="45719" anchor="ctr">
-            <a:normAutofit fontScale="100000" lnSpcReduction="0"/>
+            <a:normAutofit/>
           </a:bodyPr>
           <a:lstStyle>
             <a:lvl1pPr algn="ctr">
-              <a:defRPr b="1" sz="1400">
+              <a:defRPr sz="1400" b="1">
                 <a:solidFill>
                   <a:srgbClr val="FFFFFF"/>
                 </a:solidFill>
@@ -2862,8 +2962,10 @@
             </a:lvl1pPr>
           </a:lstStyle>
           <a:p>
-            <a:pPr/>
-            <a:fld id="{86CB4B4D-7CA3-9044-876B-883B54F8677D}" type="slidenum"/>
+            <a:fld id="{86CB4B4D-7CA3-9044-876B-883B54F8677D}" type="slidenum">
+              <a:t>‹Nr.›</a:t>
+            </a:fld>
+            <a:endParaRPr/>
           </a:p>
         </p:txBody>
       </p:sp>
@@ -2871,19 +2973,19 @@
   </p:cSld>
   <p:clrMap bg1="lt1" tx1="dk1" bg2="lt2" tx2="dk2" accent1="accent1" accent2="accent2" accent3="accent3" accent4="accent4" accent5="accent5" accent6="accent6" hlink="hlink" folHlink="folHlink"/>
   <p:sldLayoutIdLst>
-    <p:sldLayoutId id="2147483649" r:id="rId2"/>
-    <p:sldLayoutId id="2147483650" r:id="rId3"/>
-    <p:sldLayoutId id="2147483651" r:id="rId4"/>
-    <p:sldLayoutId id="2147483652" r:id="rId5"/>
-    <p:sldLayoutId id="2147483653" r:id="rId6"/>
-    <p:sldLayoutId id="2147483654" r:id="rId7"/>
-    <p:sldLayoutId id="2147483655" r:id="rId8"/>
-    <p:sldLayoutId id="2147483656" r:id="rId9"/>
-    <p:sldLayoutId id="2147483657" r:id="rId10"/>
-    <p:sldLayoutId id="2147483658" r:id="rId11"/>
-    <p:sldLayoutId id="2147483659" r:id="rId12"/>
+    <p:sldLayoutId id="2147483649" r:id="rId1"/>
+    <p:sldLayoutId id="2147483650" r:id="rId2"/>
+    <p:sldLayoutId id="2147483651" r:id="rId3"/>
+    <p:sldLayoutId id="2147483652" r:id="rId4"/>
+    <p:sldLayoutId id="2147483653" r:id="rId5"/>
+    <p:sldLayoutId id="2147483654" r:id="rId6"/>
+    <p:sldLayoutId id="2147483655" r:id="rId7"/>
+    <p:sldLayoutId id="2147483656" r:id="rId8"/>
+    <p:sldLayoutId id="2147483657" r:id="rId9"/>
+    <p:sldLayoutId id="2147483658" r:id="rId10"/>
+    <p:sldLayoutId id="2147483659" r:id="rId11"/>
   </p:sldLayoutIdLst>
-  <p:transition xmlns:p14="http://schemas.microsoft.com/office/powerpoint/2010/main" spd="med" advClick="1"/>
+  <p:transition spd="med"/>
   <p:txStyles>
     <p:titleStyle>
       <a:lvl1pPr marL="0" marR="0" indent="0" algn="l" defTabSz="914400" rtl="0" latinLnBrk="0">
@@ -2901,7 +3003,7 @@
         <a:buFontTx/>
         <a:buNone/>
         <a:tabLst/>
-        <a:defRPr b="0" baseline="0" cap="none" i="0" spc="0" strike="noStrike" sz="4400" u="none">
+        <a:defRPr sz="4400" b="0" i="0" u="none" strike="noStrike" cap="none" spc="0" baseline="0">
           <a:ln>
             <a:noFill/>
           </a:ln>
@@ -2930,7 +3032,7 @@
         <a:buFontTx/>
         <a:buNone/>
         <a:tabLst/>
-        <a:defRPr b="0" baseline="0" cap="none" i="0" spc="0" strike="noStrike" sz="4400" u="none">
+        <a:defRPr sz="4400" b="0" i="0" u="none" strike="noStrike" cap="none" spc="0" baseline="0">
           <a:ln>
             <a:noFill/>
           </a:ln>
@@ -2959,7 +3061,7 @@
         <a:buFontTx/>
         <a:buNone/>
         <a:tabLst/>
-        <a:defRPr b="0" baseline="0" cap="none" i="0" spc="0" strike="noStrike" sz="4400" u="none">
+        <a:defRPr sz="4400" b="0" i="0" u="none" strike="noStrike" cap="none" spc="0" baseline="0">
           <a:ln>
             <a:noFill/>
           </a:ln>
@@ -2988,7 +3090,7 @@
         <a:buFontTx/>
         <a:buNone/>
         <a:tabLst/>
-        <a:defRPr b="0" baseline="0" cap="none" i="0" spc="0" strike="noStrike" sz="4400" u="none">
+        <a:defRPr sz="4400" b="0" i="0" u="none" strike="noStrike" cap="none" spc="0" baseline="0">
           <a:ln>
             <a:noFill/>
           </a:ln>
@@ -3017,7 +3119,7 @@
         <a:buFontTx/>
         <a:buNone/>
         <a:tabLst/>
-        <a:defRPr b="0" baseline="0" cap="none" i="0" spc="0" strike="noStrike" sz="4400" u="none">
+        <a:defRPr sz="4400" b="0" i="0" u="none" strike="noStrike" cap="none" spc="0" baseline="0">
           <a:ln>
             <a:noFill/>
           </a:ln>
@@ -3046,7 +3148,7 @@
         <a:buFontTx/>
         <a:buNone/>
         <a:tabLst/>
-        <a:defRPr b="0" baseline="0" cap="none" i="0" spc="0" strike="noStrike" sz="4400" u="none">
+        <a:defRPr sz="4400" b="0" i="0" u="none" strike="noStrike" cap="none" spc="0" baseline="0">
           <a:ln>
             <a:noFill/>
           </a:ln>
@@ -3075,7 +3177,7 @@
         <a:buFontTx/>
         <a:buNone/>
         <a:tabLst/>
-        <a:defRPr b="0" baseline="0" cap="none" i="0" spc="0" strike="noStrike" sz="4400" u="none">
+        <a:defRPr sz="4400" b="0" i="0" u="none" strike="noStrike" cap="none" spc="0" baseline="0">
           <a:ln>
             <a:noFill/>
           </a:ln>
@@ -3104,7 +3206,7 @@
         <a:buFontTx/>
         <a:buNone/>
         <a:tabLst/>
-        <a:defRPr b="0" baseline="0" cap="none" i="0" spc="0" strike="noStrike" sz="4400" u="none">
+        <a:defRPr sz="4400" b="0" i="0" u="none" strike="noStrike" cap="none" spc="0" baseline="0">
           <a:ln>
             <a:noFill/>
           </a:ln>
@@ -3133,7 +3235,7 @@
         <a:buFontTx/>
         <a:buNone/>
         <a:tabLst/>
-        <a:defRPr b="0" baseline="0" cap="none" i="0" spc="0" strike="noStrike" sz="4400" u="none">
+        <a:defRPr sz="4400" b="0" i="0" u="none" strike="noStrike" cap="none" spc="0" baseline="0">
           <a:ln>
             <a:noFill/>
           </a:ln>
@@ -3166,7 +3268,7 @@
         <a:buFontTx/>
         <a:buChar char="◻"/>
         <a:tabLst/>
-        <a:defRPr b="0" baseline="0" cap="none" i="0" spc="0" strike="noStrike" sz="2900" u="none">
+        <a:defRPr sz="2900" b="0" i="0" u="none" strike="noStrike" cap="none" spc="0" baseline="0">
           <a:ln>
             <a:noFill/>
           </a:ln>
@@ -3197,7 +3299,7 @@
         <a:buFontTx/>
         <a:buChar char=""/>
         <a:tabLst/>
-        <a:defRPr b="0" baseline="0" cap="none" i="0" spc="0" strike="noStrike" sz="2900" u="none">
+        <a:defRPr sz="2900" b="0" i="0" u="none" strike="noStrike" cap="none" spc="0" baseline="0">
           <a:ln>
             <a:noFill/>
           </a:ln>
@@ -3228,7 +3330,7 @@
         <a:buFontTx/>
         <a:buChar char="■"/>
         <a:tabLst/>
-        <a:defRPr b="0" baseline="0" cap="none" i="0" spc="0" strike="noStrike" sz="2900" u="none">
+        <a:defRPr sz="2900" b="0" i="0" u="none" strike="noStrike" cap="none" spc="0" baseline="0">
           <a:ln>
             <a:noFill/>
           </a:ln>
@@ -3259,7 +3361,7 @@
         <a:buFontTx/>
         <a:buChar char="■"/>
         <a:tabLst/>
-        <a:defRPr b="0" baseline="0" cap="none" i="0" spc="0" strike="noStrike" sz="2900" u="none">
+        <a:defRPr sz="2900" b="0" i="0" u="none" strike="noStrike" cap="none" spc="0" baseline="0">
           <a:ln>
             <a:noFill/>
           </a:ln>
@@ -3290,7 +3392,7 @@
         <a:buFontTx/>
         <a:buChar char="■"/>
         <a:tabLst/>
-        <a:defRPr b="0" baseline="0" cap="none" i="0" spc="0" strike="noStrike" sz="2900" u="none">
+        <a:defRPr sz="2900" b="0" i="0" u="none" strike="noStrike" cap="none" spc="0" baseline="0">
           <a:ln>
             <a:noFill/>
           </a:ln>
@@ -3321,7 +3423,7 @@
         <a:buFontTx/>
         <a:buChar char="▪"/>
         <a:tabLst/>
-        <a:defRPr b="0" baseline="0" cap="none" i="0" spc="0" strike="noStrike" sz="2900" u="none">
+        <a:defRPr sz="2900" b="0" i="0" u="none" strike="noStrike" cap="none" spc="0" baseline="0">
           <a:ln>
             <a:noFill/>
           </a:ln>
@@ -3352,7 +3454,7 @@
         <a:buFontTx/>
         <a:buChar char="▪"/>
         <a:tabLst/>
-        <a:defRPr b="0" baseline="0" cap="none" i="0" spc="0" strike="noStrike" sz="2900" u="none">
+        <a:defRPr sz="2900" b="0" i="0" u="none" strike="noStrike" cap="none" spc="0" baseline="0">
           <a:ln>
             <a:noFill/>
           </a:ln>
@@ -3383,7 +3485,7 @@
         <a:buFontTx/>
         <a:buChar char="▪"/>
         <a:tabLst/>
-        <a:defRPr b="0" baseline="0" cap="none" i="0" spc="0" strike="noStrike" sz="2900" u="none">
+        <a:defRPr sz="2900" b="0" i="0" u="none" strike="noStrike" cap="none" spc="0" baseline="0">
           <a:ln>
             <a:noFill/>
           </a:ln>
@@ -3414,7 +3516,7 @@
         <a:buFontTx/>
         <a:buChar char="▪"/>
         <a:tabLst/>
-        <a:defRPr b="0" baseline="0" cap="none" i="0" spc="0" strike="noStrike" sz="2900" u="none">
+        <a:defRPr sz="2900" b="0" i="0" u="none" strike="noStrike" cap="none" spc="0" baseline="0">
           <a:ln>
             <a:noFill/>
           </a:ln>
@@ -3445,7 +3547,7 @@
         <a:buFontTx/>
         <a:buNone/>
         <a:tabLst/>
-        <a:defRPr b="1" baseline="0" cap="none" i="0" spc="0" strike="noStrike" sz="1400" u="none">
+        <a:defRPr sz="1400" b="1" i="0" u="none" strike="noStrike" cap="none" spc="0" baseline="0">
           <a:ln>
             <a:noFill/>
           </a:ln>
@@ -3474,7 +3576,7 @@
         <a:buFontTx/>
         <a:buNone/>
         <a:tabLst/>
-        <a:defRPr b="1" baseline="0" cap="none" i="0" spc="0" strike="noStrike" sz="1400" u="none">
+        <a:defRPr sz="1400" b="1" i="0" u="none" strike="noStrike" cap="none" spc="0" baseline="0">
           <a:ln>
             <a:noFill/>
           </a:ln>
@@ -3503,7 +3605,7 @@
         <a:buFontTx/>
         <a:buNone/>
         <a:tabLst/>
-        <a:defRPr b="1" baseline="0" cap="none" i="0" spc="0" strike="noStrike" sz="1400" u="none">
+        <a:defRPr sz="1400" b="1" i="0" u="none" strike="noStrike" cap="none" spc="0" baseline="0">
           <a:ln>
             <a:noFill/>
           </a:ln>
@@ -3532,7 +3634,7 @@
         <a:buFontTx/>
         <a:buNone/>
         <a:tabLst/>
-        <a:defRPr b="1" baseline="0" cap="none" i="0" spc="0" strike="noStrike" sz="1400" u="none">
+        <a:defRPr sz="1400" b="1" i="0" u="none" strike="noStrike" cap="none" spc="0" baseline="0">
           <a:ln>
             <a:noFill/>
           </a:ln>
@@ -3561,7 +3663,7 @@
         <a:buFontTx/>
         <a:buNone/>
         <a:tabLst/>
-        <a:defRPr b="1" baseline="0" cap="none" i="0" spc="0" strike="noStrike" sz="1400" u="none">
+        <a:defRPr sz="1400" b="1" i="0" u="none" strike="noStrike" cap="none" spc="0" baseline="0">
           <a:ln>
             <a:noFill/>
           </a:ln>
@@ -3590,7 +3692,7 @@
         <a:buFontTx/>
         <a:buNone/>
         <a:tabLst/>
-        <a:defRPr b="1" baseline="0" cap="none" i="0" spc="0" strike="noStrike" sz="1400" u="none">
+        <a:defRPr sz="1400" b="1" i="0" u="none" strike="noStrike" cap="none" spc="0" baseline="0">
           <a:ln>
             <a:noFill/>
           </a:ln>
@@ -3619,7 +3721,7 @@
         <a:buFontTx/>
         <a:buNone/>
         <a:tabLst/>
-        <a:defRPr b="1" baseline="0" cap="none" i="0" spc="0" strike="noStrike" sz="1400" u="none">
+        <a:defRPr sz="1400" b="1" i="0" u="none" strike="noStrike" cap="none" spc="0" baseline="0">
           <a:ln>
             <a:noFill/>
           </a:ln>
@@ -3648,7 +3750,7 @@
         <a:buFontTx/>
         <a:buNone/>
         <a:tabLst/>
-        <a:defRPr b="1" baseline="0" cap="none" i="0" spc="0" strike="noStrike" sz="1400" u="none">
+        <a:defRPr sz="1400" b="1" i="0" u="none" strike="noStrike" cap="none" spc="0" baseline="0">
           <a:ln>
             <a:noFill/>
           </a:ln>
@@ -3677,7 +3779,7 @@
         <a:buFontTx/>
         <a:buNone/>
         <a:tabLst/>
-        <a:defRPr b="1" baseline="0" cap="none" i="0" spc="0" strike="noStrike" sz="1400" u="none">
+        <a:defRPr sz="1400" b="1" i="0" u="none" strike="noStrike" cap="none" spc="0" baseline="0">
           <a:ln>
             <a:noFill/>
           </a:ln>
@@ -3697,7 +3799,7 @@
 </file>
 
 <file path=ppt/slides/slide1.xml><?xml version="1.0" encoding="utf-8"?>
-<p:sld xmlns:a="http://schemas.openxmlformats.org/drawingml/2006/main" xmlns:r="http://schemas.openxmlformats.org/officeDocument/2006/relationships" xmlns:p="http://schemas.openxmlformats.org/presentationml/2006/main" xmlns:m="http://schemas.openxmlformats.org/officeDocument/2006/math" xmlns:a14="http://schemas.microsoft.com/office/drawing/2010/main" showMasterSp="1" showMasterPhAnim="1">
+<p:sld xmlns:a="http://schemas.openxmlformats.org/drawingml/2006/main" xmlns:r="http://schemas.openxmlformats.org/officeDocument/2006/relationships" xmlns:p="http://schemas.openxmlformats.org/presentationml/2006/main">
   <p:cSld>
     <p:spTree>
       <p:nvGrpSpPr>
@@ -3716,7 +3818,9 @@
       <p:sp>
         <p:nvSpPr>
           <p:cNvPr id="128" name="Title 1"/>
-          <p:cNvSpPr txBox="1"/>
+          <p:cNvSpPr txBox="1">
+            <a:spLocks noGrp="1"/>
+          </p:cNvSpPr>
           <p:nvPr>
             <p:ph type="title"/>
           </p:nvPr>
@@ -3739,7 +3843,6 @@
             </a:lvl1pPr>
           </a:lstStyle>
           <a:p>
-            <a:pPr/>
             <a:r>
               <a:t>Prof. Dr. Sergio Marquina</a:t>
             </a:r>
@@ -3754,17 +3857,29 @@
         </p:nvGraphicFramePr>
         <p:xfrm>
           <a:off x="3203848" y="1772816"/>
-          <a:ext cx="5472608" cy="3940400"/>
+          <a:ext cx="5472608" cy="4684936"/>
         </p:xfrm>
-        <a:graphic xmlns:a="http://schemas.openxmlformats.org/drawingml/2006/main">
+        <a:graphic>
           <a:graphicData uri="http://schemas.openxmlformats.org/drawingml/2006/table">
             <a:tbl>
-              <a:tblPr firstCol="0" firstRow="0" lastCol="0" lastRow="0" bandCol="0" bandRow="0" rtl="0">
+              <a:tblPr>
                 <a:tableStyleId>{4C3C2611-4C71-4FC5-86AE-919BDF0F9419}</a:tableStyleId>
               </a:tblPr>
               <a:tblGrid>
-                <a:gridCol w="2736304"/>
-                <a:gridCol w="2736304"/>
+                <a:gridCol w="2736304">
+                  <a:extLst>
+                    <a:ext uri="{9D8B030D-6E8A-4147-A177-3AD203B41FA5}">
+                      <a16:colId xmlns:a16="http://schemas.microsoft.com/office/drawing/2014/main" val="20000"/>
+                    </a:ext>
+                  </a:extLst>
+                </a:gridCol>
+                <a:gridCol w="2736304">
+                  <a:extLst>
+                    <a:ext uri="{9D8B030D-6E8A-4147-A177-3AD203B41FA5}">
+                      <a16:colId xmlns:a16="http://schemas.microsoft.com/office/drawing/2014/main" val="20001"/>
+                    </a:ext>
+                  </a:extLst>
+                </a:gridCol>
               </a:tblGrid>
               <a:tr h="411163">
                 <a:tc>
@@ -3779,7 +3894,7 @@
                         <a:defRPr sz="1800"/>
                       </a:pPr>
                       <a:r>
-                        <a:rPr b="1" sz="1000">
+                        <a:rPr sz="1000" b="1">
                           <a:latin typeface="Arial"/>
                           <a:ea typeface="Arial"/>
                           <a:cs typeface="Arial"/>
@@ -3789,7 +3904,7 @@
                       </a:r>
                     </a:p>
                   </a:txBody>
-                  <a:tcPr marL="44450" marR="44450" marT="44450" marB="44450" anchor="t" anchorCtr="0" horzOverflow="overflow">
+                  <a:tcPr marL="44450" marR="44450" marT="44450" marB="44450" horzOverflow="overflow">
                     <a:lnL w="12700">
                       <a:miter lim="400000"/>
                     </a:lnL>
@@ -3829,7 +3944,7 @@
                       </a:r>
                     </a:p>
                   </a:txBody>
-                  <a:tcPr marL="44450" marR="44450" marT="44450" marB="44450" anchor="t" anchorCtr="0" horzOverflow="overflow">
+                  <a:tcPr marL="44450" marR="44450" marT="44450" marB="44450" horzOverflow="overflow">
                     <a:lnL w="12700">
                       <a:miter lim="400000"/>
                     </a:lnL>
@@ -3847,6 +3962,11 @@
                     <a:noFill/>
                   </a:tcPr>
                 </a:tc>
+                <a:extLst>
+                  <a:ext uri="{0D108BD9-81ED-4DB2-BD59-A6C34878D82A}">
+                    <a16:rowId xmlns:a16="http://schemas.microsoft.com/office/drawing/2014/main" val="10000"/>
+                  </a:ext>
+                </a:extLst>
               </a:tr>
               <a:tr h="496888">
                 <a:tc>
@@ -3861,7 +3981,7 @@
                         <a:defRPr sz="1800"/>
                       </a:pPr>
                       <a:r>
-                        <a:rPr b="1" sz="1000">
+                        <a:rPr sz="1000" b="1">
                           <a:latin typeface="Arial"/>
                           <a:ea typeface="Arial"/>
                           <a:cs typeface="Arial"/>
@@ -3871,7 +3991,7 @@
                       </a:r>
                     </a:p>
                   </a:txBody>
-                  <a:tcPr marL="44450" marR="44450" marT="44450" marB="44450" anchor="t" anchorCtr="0" horzOverflow="overflow">
+                  <a:tcPr marL="44450" marR="44450" marT="44450" marB="44450" horzOverflow="overflow">
                     <a:lnL w="12700">
                       <a:miter lim="400000"/>
                     </a:lnL>
@@ -3913,7 +4033,7 @@
                       </a:r>
                     </a:p>
                   </a:txBody>
-                  <a:tcPr marL="44450" marR="44450" marT="44450" marB="44450" anchor="t" anchorCtr="0" horzOverflow="overflow">
+                  <a:tcPr marL="44450" marR="44450" marT="44450" marB="44450" horzOverflow="overflow">
                     <a:lnL w="12700">
                       <a:miter lim="400000"/>
                     </a:lnL>
@@ -3933,6 +4053,11 @@
                     <a:noFill/>
                   </a:tcPr>
                 </a:tc>
+                <a:extLst>
+                  <a:ext uri="{0D108BD9-81ED-4DB2-BD59-A6C34878D82A}">
+                    <a16:rowId xmlns:a16="http://schemas.microsoft.com/office/drawing/2014/main" val="10001"/>
+                  </a:ext>
+                </a:extLst>
               </a:tr>
               <a:tr h="1324197">
                 <a:tc>
@@ -3947,7 +4072,7 @@
                         <a:defRPr sz="1800"/>
                       </a:pPr>
                       <a:r>
-                        <a:rPr b="1" sz="1000">
+                        <a:rPr sz="1000" b="1">
                           <a:latin typeface="Arial"/>
                           <a:ea typeface="Arial"/>
                           <a:cs typeface="Arial"/>
@@ -3957,7 +4082,7 @@
                       </a:r>
                     </a:p>
                   </a:txBody>
-                  <a:tcPr marL="44450" marR="44450" marT="44450" marB="44450" anchor="t" anchorCtr="0" horzOverflow="overflow">
+                  <a:tcPr marL="44450" marR="44450" marT="44450" marB="44450" horzOverflow="overflow">
                     <a:lnL w="12700">
                       <a:miter lim="400000"/>
                     </a:lnL>
@@ -4024,7 +4149,7 @@
                       </a:r>
                     </a:p>
                   </a:txBody>
-                  <a:tcPr marL="44450" marR="44450" marT="44450" marB="44450" anchor="t" anchorCtr="0" horzOverflow="overflow">
+                  <a:tcPr marL="44450" marR="44450" marT="44450" marB="44450" horzOverflow="overflow">
                     <a:lnL w="12700">
                       <a:miter lim="400000"/>
                     </a:lnL>
@@ -4044,6 +4169,11 @@
                     <a:noFill/>
                   </a:tcPr>
                 </a:tc>
+                <a:extLst>
+                  <a:ext uri="{0D108BD9-81ED-4DB2-BD59-A6C34878D82A}">
+                    <a16:rowId xmlns:a16="http://schemas.microsoft.com/office/drawing/2014/main" val="10002"/>
+                  </a:ext>
+                </a:extLst>
               </a:tr>
               <a:tr h="941388">
                 <a:tc>
@@ -4058,7 +4188,7 @@
                         <a:defRPr sz="1800"/>
                       </a:pPr>
                       <a:r>
-                        <a:rPr b="1" sz="1000">
+                        <a:rPr sz="1000" b="1">
                           <a:latin typeface="Arial"/>
                           <a:ea typeface="Arial"/>
                           <a:cs typeface="Arial"/>
@@ -4068,7 +4198,7 @@
                       </a:r>
                     </a:p>
                   </a:txBody>
-                  <a:tcPr marL="44450" marR="44450" marT="44450" marB="44450" anchor="t" anchorCtr="0" horzOverflow="overflow">
+                  <a:tcPr marL="44450" marR="44450" marT="44450" marB="44450" horzOverflow="overflow">
                     <a:lnL w="12700">
                       <a:miter lim="400000"/>
                     </a:lnL>
@@ -4114,7 +4244,7 @@
                       </a:r>
                     </a:p>
                   </a:txBody>
-                  <a:tcPr marL="44450" marR="44450" marT="44450" marB="44450" anchor="t" anchorCtr="0" horzOverflow="overflow">
+                  <a:tcPr marL="44450" marR="44450" marT="44450" marB="44450" horzOverflow="overflow">
                     <a:lnL w="12700">
                       <a:miter lim="400000"/>
                     </a:lnL>
@@ -4134,6 +4264,11 @@
                     <a:noFill/>
                   </a:tcPr>
                 </a:tc>
+                <a:extLst>
+                  <a:ext uri="{0D108BD9-81ED-4DB2-BD59-A6C34878D82A}">
+                    <a16:rowId xmlns:a16="http://schemas.microsoft.com/office/drawing/2014/main" val="10003"/>
+                  </a:ext>
+                </a:extLst>
               </a:tr>
               <a:tr h="941388">
                 <a:tc>
@@ -4148,7 +4283,7 @@
                         <a:defRPr sz="1800"/>
                       </a:pPr>
                       <a:r>
-                        <a:rPr b="1" sz="1000">
+                        <a:rPr sz="1000" b="1">
                           <a:latin typeface="Arial"/>
                           <a:ea typeface="Arial"/>
                           <a:cs typeface="Arial"/>
@@ -4158,7 +4293,7 @@
                       </a:r>
                     </a:p>
                   </a:txBody>
-                  <a:tcPr marL="44450" marR="44450" marT="44450" marB="44450" anchor="t" anchorCtr="0" horzOverflow="overflow">
+                  <a:tcPr marL="44450" marR="44450" marT="44450" marB="44450" horzOverflow="overflow">
                     <a:lnL w="12700">
                       <a:miter lim="400000"/>
                     </a:lnL>
@@ -4244,7 +4379,7 @@
                       </a:r>
                     </a:p>
                   </a:txBody>
-                  <a:tcPr marL="44450" marR="44450" marT="44450" marB="44450" anchor="t" anchorCtr="0" horzOverflow="overflow">
+                  <a:tcPr marL="44450" marR="44450" marT="44450" marB="44450" horzOverflow="overflow">
                     <a:lnL w="12700">
                       <a:miter lim="400000"/>
                     </a:lnL>
@@ -4262,6 +4397,11 @@
                     <a:noFill/>
                   </a:tcPr>
                 </a:tc>
+                <a:extLst>
+                  <a:ext uri="{0D108BD9-81ED-4DB2-BD59-A6C34878D82A}">
+                    <a16:rowId xmlns:a16="http://schemas.microsoft.com/office/drawing/2014/main" val="10004"/>
+                  </a:ext>
+                </a:extLst>
               </a:tr>
             </a:tbl>
           </a:graphicData>
@@ -4301,12 +4441,12 @@
   <p:clrMapOvr>
     <a:masterClrMapping/>
   </p:clrMapOvr>
-  <p:transition xmlns:p14="http://schemas.microsoft.com/office/powerpoint/2010/main" spd="med" advClick="1"/>
+  <p:transition spd="med"/>
 </p:sld>
 </file>
 
 <file path=ppt/slides/slide2.xml><?xml version="1.0" encoding="utf-8"?>
-<p:sld xmlns:a="http://schemas.openxmlformats.org/drawingml/2006/main" xmlns:r="http://schemas.openxmlformats.org/officeDocument/2006/relationships" xmlns:p="http://schemas.openxmlformats.org/presentationml/2006/main" xmlns:m="http://schemas.openxmlformats.org/officeDocument/2006/math" xmlns:a14="http://schemas.microsoft.com/office/drawing/2010/main" showMasterSp="1" showMasterPhAnim="1">
+<p:sld xmlns:a="http://schemas.openxmlformats.org/drawingml/2006/main" xmlns:r="http://schemas.openxmlformats.org/officeDocument/2006/relationships" xmlns:p="http://schemas.openxmlformats.org/presentationml/2006/main">
   <p:cSld>
     <p:spTree>
       <p:nvGrpSpPr>
@@ -4325,7 +4465,9 @@
       <p:sp>
         <p:nvSpPr>
           <p:cNvPr id="132" name="Title 1"/>
-          <p:cNvSpPr txBox="1"/>
+          <p:cNvSpPr txBox="1">
+            <a:spLocks noGrp="1"/>
+          </p:cNvSpPr>
           <p:nvPr>
             <p:ph type="title"/>
           </p:nvPr>
@@ -4348,7 +4490,6 @@
             </a:lvl1pPr>
           </a:lstStyle>
           <a:p>
-            <a:pPr/>
             <a:r>
               <a:t>Prof. Dr. Sergio Marquina</a:t>
             </a:r>
@@ -4358,7 +4499,9 @@
       <p:sp>
         <p:nvSpPr>
           <p:cNvPr id="133" name="Content Placeholder 2"/>
-          <p:cNvSpPr txBox="1"/>
+          <p:cNvSpPr txBox="1">
+            <a:spLocks noGrp="1"/>
+          </p:cNvSpPr>
           <p:nvPr>
             <p:ph type="body" idx="1"/>
           </p:nvPr>
@@ -4380,7 +4523,72 @@
               <a:defRPr sz="1800"/>
             </a:pPr>
             <a:r>
-              <a:t>Herr Prof. Dr. Marquina ist Dozent der Mathematik (Fakultät Informatik und Mathematik) an einer Hochschule.</a:t>
+              <a:rPr dirty="0"/>
+              <a:t>Herr </a:t>
+            </a:r>
+            <a:r>
+              <a:rPr dirty="0" err="1"/>
+              <a:t>Marquina</a:t>
+            </a:r>
+            <a:r>
+              <a:rPr dirty="0"/>
+              <a:t> </a:t>
+            </a:r>
+            <a:r>
+              <a:rPr dirty="0" err="1"/>
+              <a:t>ist</a:t>
+            </a:r>
+            <a:r>
+              <a:rPr dirty="0"/>
+              <a:t> </a:t>
+            </a:r>
+            <a:r>
+              <a:rPr dirty="0" err="1"/>
+              <a:t>Dozent</a:t>
+            </a:r>
+            <a:r>
+              <a:rPr dirty="0"/>
+              <a:t> der </a:t>
+            </a:r>
+            <a:r>
+              <a:rPr dirty="0" err="1"/>
+              <a:t>Mathematik</a:t>
+            </a:r>
+            <a:r>
+              <a:rPr dirty="0"/>
+              <a:t> (</a:t>
+            </a:r>
+            <a:r>
+              <a:rPr dirty="0" err="1"/>
+              <a:t>Fakultät</a:t>
+            </a:r>
+            <a:r>
+              <a:rPr dirty="0"/>
+              <a:t> </a:t>
+            </a:r>
+            <a:r>
+              <a:rPr dirty="0" err="1"/>
+              <a:t>Informatik</a:t>
+            </a:r>
+            <a:r>
+              <a:rPr dirty="0"/>
+              <a:t> und </a:t>
+            </a:r>
+            <a:r>
+              <a:rPr dirty="0" err="1"/>
+              <a:t>Mathematik</a:t>
+            </a:r>
+            <a:r>
+              <a:rPr dirty="0"/>
+              <a:t>) an </a:t>
+            </a:r>
+            <a:r>
+              <a:rPr dirty="0" err="1"/>
+              <a:t>einer</a:t>
+            </a:r>
+            <a:r>
+              <a:rPr dirty="0"/>
+              <a:t> Hochschule.</a:t>
             </a:r>
           </a:p>
           <a:p>
@@ -4388,7 +4596,44 @@
               <a:defRPr sz="1800"/>
             </a:pPr>
             <a:r>
-              <a:t>Herr Prof. Dr. Marquina ist 35 und er arbeitet seit sieben Jahren an der OTH Regensburg.</a:t>
+              <a:rPr lang="de-DE" dirty="0"/>
+              <a:t>Er</a:t>
+            </a:r>
+            <a:r>
+              <a:rPr dirty="0"/>
+              <a:t> </a:t>
+            </a:r>
+            <a:r>
+              <a:rPr dirty="0" err="1"/>
+              <a:t>ist</a:t>
+            </a:r>
+            <a:r>
+              <a:rPr dirty="0"/>
+              <a:t> 35 und </a:t>
+            </a:r>
+            <a:r>
+              <a:rPr dirty="0" err="1"/>
+              <a:t>arbeitet</a:t>
+            </a:r>
+            <a:r>
+              <a:rPr dirty="0"/>
+              <a:t> </a:t>
+            </a:r>
+            <a:r>
+              <a:rPr dirty="0" err="1"/>
+              <a:t>seit</a:t>
+            </a:r>
+            <a:r>
+              <a:rPr dirty="0"/>
+              <a:t> </a:t>
+            </a:r>
+            <a:r>
+              <a:rPr dirty="0" err="1"/>
+              <a:t>sieben</a:t>
+            </a:r>
+            <a:r>
+              <a:rPr dirty="0"/>
+              <a:t> Jahren an der OTH Regensburg.</a:t>
             </a:r>
           </a:p>
           <a:p>
@@ -4396,7 +4641,72 @@
               <a:defRPr sz="1800"/>
             </a:pPr>
             <a:r>
-              <a:t>Herr Prof. Dr. Marquina hält die Vorlesung Mathematik für verschiedene Studiengänge der Fakultät.</a:t>
+              <a:rPr dirty="0"/>
+              <a:t>Herr </a:t>
+            </a:r>
+            <a:r>
+              <a:rPr dirty="0" err="1"/>
+              <a:t>Marquina</a:t>
+            </a:r>
+            <a:r>
+              <a:rPr dirty="0"/>
+              <a:t> </a:t>
+            </a:r>
+            <a:r>
+              <a:rPr dirty="0" err="1"/>
+              <a:t>hält</a:t>
+            </a:r>
+            <a:r>
+              <a:rPr dirty="0"/>
+              <a:t> die </a:t>
+            </a:r>
+            <a:r>
+              <a:rPr dirty="0" err="1"/>
+              <a:t>Vorlesung</a:t>
+            </a:r>
+            <a:r>
+              <a:rPr dirty="0"/>
+              <a:t> </a:t>
+            </a:r>
+            <a:r>
+              <a:rPr dirty="0" err="1"/>
+              <a:t>Mathematik</a:t>
+            </a:r>
+            <a:r>
+              <a:rPr dirty="0"/>
+              <a:t> </a:t>
+            </a:r>
+            <a:r>
+              <a:rPr dirty="0" err="1"/>
+              <a:t>für</a:t>
+            </a:r>
+            <a:r>
+              <a:rPr dirty="0"/>
+              <a:t> </a:t>
+            </a:r>
+            <a:r>
+              <a:rPr dirty="0" err="1"/>
+              <a:t>verschiedene</a:t>
+            </a:r>
+            <a:r>
+              <a:rPr dirty="0"/>
+              <a:t> </a:t>
+            </a:r>
+            <a:r>
+              <a:rPr dirty="0" err="1"/>
+              <a:t>Studiengänge</a:t>
+            </a:r>
+            <a:r>
+              <a:rPr dirty="0"/>
+              <a:t> der </a:t>
+            </a:r>
+            <a:r>
+              <a:rPr dirty="0" err="1"/>
+              <a:t>Fakultät</a:t>
+            </a:r>
+            <a:r>
+              <a:rPr dirty="0"/>
+              <a:t>.</a:t>
             </a:r>
           </a:p>
           <a:p>
@@ -4404,7 +4714,68 @@
               <a:defRPr sz="1800"/>
             </a:pPr>
             <a:r>
-              <a:t>Er nutzt das qis-System einmal pro Semester um die Noten für Mathematikklausuren einzutragen.</a:t>
+              <a:rPr dirty="0" err="1"/>
+              <a:t>Er</a:t>
+            </a:r>
+            <a:r>
+              <a:rPr dirty="0"/>
+              <a:t> </a:t>
+            </a:r>
+            <a:r>
+              <a:rPr dirty="0" err="1"/>
+              <a:t>nutzt</a:t>
+            </a:r>
+            <a:r>
+              <a:rPr dirty="0"/>
+              <a:t> das </a:t>
+            </a:r>
+            <a:r>
+              <a:rPr dirty="0" err="1"/>
+              <a:t>qis</a:t>
+            </a:r>
+            <a:r>
+              <a:rPr dirty="0"/>
+              <a:t>-System </a:t>
+            </a:r>
+            <a:r>
+              <a:rPr dirty="0" err="1"/>
+              <a:t>einmal</a:t>
+            </a:r>
+            <a:r>
+              <a:rPr dirty="0"/>
+              <a:t> pro Semester um die </a:t>
+            </a:r>
+            <a:r>
+              <a:rPr dirty="0" err="1"/>
+              <a:t>Noten</a:t>
+            </a:r>
+            <a:r>
+              <a:rPr dirty="0"/>
+              <a:t> </a:t>
+            </a:r>
+            <a:r>
+              <a:rPr dirty="0" err="1"/>
+              <a:t>für</a:t>
+            </a:r>
+            <a:r>
+              <a:rPr dirty="0"/>
+              <a:t> </a:t>
+            </a:r>
+            <a:r>
+              <a:rPr dirty="0" err="1"/>
+              <a:t>Mathematikklausuren</a:t>
+            </a:r>
+            <a:r>
+              <a:rPr dirty="0"/>
+              <a:t> </a:t>
+            </a:r>
+            <a:r>
+              <a:rPr dirty="0" err="1"/>
+              <a:t>einzutragen</a:t>
+            </a:r>
+            <a:r>
+              <a:rPr dirty="0"/>
+              <a:t>.</a:t>
             </a:r>
           </a:p>
           <a:p>
@@ -4412,7 +4783,76 @@
               <a:defRPr sz="1800"/>
             </a:pPr>
             <a:r>
-              <a:t>Außerdem betreut er Bacheloranden und muss auch die Noten für die Bachelorarbeiten ins System eintragen.</a:t>
+              <a:rPr dirty="0" err="1"/>
+              <a:t>Außerdem</a:t>
+            </a:r>
+            <a:r>
+              <a:rPr dirty="0"/>
+              <a:t> </a:t>
+            </a:r>
+            <a:r>
+              <a:rPr dirty="0" err="1"/>
+              <a:t>betreut</a:t>
+            </a:r>
+            <a:r>
+              <a:rPr dirty="0"/>
+              <a:t> </a:t>
+            </a:r>
+            <a:r>
+              <a:rPr dirty="0" err="1"/>
+              <a:t>er</a:t>
+            </a:r>
+            <a:r>
+              <a:rPr dirty="0"/>
+              <a:t> </a:t>
+            </a:r>
+            <a:r>
+              <a:rPr dirty="0" err="1"/>
+              <a:t>Bacheloranden</a:t>
+            </a:r>
+            <a:r>
+              <a:rPr dirty="0"/>
+              <a:t> und muss </a:t>
+            </a:r>
+            <a:r>
+              <a:rPr dirty="0" err="1"/>
+              <a:t>auch</a:t>
+            </a:r>
+            <a:r>
+              <a:rPr dirty="0"/>
+              <a:t> die </a:t>
+            </a:r>
+            <a:r>
+              <a:rPr dirty="0" err="1"/>
+              <a:t>Noten</a:t>
+            </a:r>
+            <a:r>
+              <a:rPr dirty="0"/>
+              <a:t> </a:t>
+            </a:r>
+            <a:r>
+              <a:rPr dirty="0" err="1"/>
+              <a:t>für</a:t>
+            </a:r>
+            <a:r>
+              <a:rPr dirty="0"/>
+              <a:t> die </a:t>
+            </a:r>
+            <a:r>
+              <a:rPr dirty="0" err="1"/>
+              <a:t>Bachelorarbeiten</a:t>
+            </a:r>
+            <a:r>
+              <a:rPr dirty="0"/>
+              <a:t> ins System </a:t>
+            </a:r>
+            <a:r>
+              <a:rPr dirty="0" err="1"/>
+              <a:t>eintragen</a:t>
+            </a:r>
+            <a:r>
+              <a:rPr dirty="0"/>
+              <a:t>.</a:t>
             </a:r>
           </a:p>
           <a:p>
@@ -4420,7 +4860,52 @@
               <a:defRPr sz="1800"/>
             </a:pPr>
             <a:r>
-              <a:t>Herr Professor tippt die Noten von seinem vorgefertigten Excel Dokument ins das System ab.</a:t>
+              <a:rPr lang="de-DE" dirty="0"/>
+              <a:t>Der</a:t>
+            </a:r>
+            <a:r>
+              <a:rPr dirty="0"/>
+              <a:t> Professor </a:t>
+            </a:r>
+            <a:r>
+              <a:rPr dirty="0" err="1"/>
+              <a:t>tippt</a:t>
+            </a:r>
+            <a:r>
+              <a:rPr dirty="0"/>
+              <a:t> die </a:t>
+            </a:r>
+            <a:r>
+              <a:rPr dirty="0" err="1"/>
+              <a:t>Noten</a:t>
+            </a:r>
+            <a:r>
+              <a:rPr dirty="0"/>
+              <a:t> von </a:t>
+            </a:r>
+            <a:r>
+              <a:rPr dirty="0" err="1"/>
+              <a:t>seinem</a:t>
+            </a:r>
+            <a:r>
+              <a:rPr dirty="0"/>
+              <a:t> </a:t>
+            </a:r>
+            <a:r>
+              <a:rPr dirty="0" err="1"/>
+              <a:t>vorgefertigten</a:t>
+            </a:r>
+            <a:r>
+              <a:rPr dirty="0"/>
+              <a:t> Excel </a:t>
+            </a:r>
+            <a:r>
+              <a:rPr dirty="0" err="1"/>
+              <a:t>Dokument</a:t>
+            </a:r>
+            <a:r>
+              <a:rPr dirty="0"/>
+              <a:t> ins das System ab.</a:t>
             </a:r>
           </a:p>
         </p:txBody>
@@ -4459,12 +4944,12 @@
   <p:clrMapOvr>
     <a:masterClrMapping/>
   </p:clrMapOvr>
-  <p:transition xmlns:p14="http://schemas.microsoft.com/office/powerpoint/2010/main" spd="med" advClick="1"/>
+  <p:transition spd="med"/>
 </p:sld>
 </file>
 
 <file path=ppt/slides/slide3.xml><?xml version="1.0" encoding="utf-8"?>
-<p:sld xmlns:a="http://schemas.openxmlformats.org/drawingml/2006/main" xmlns:r="http://schemas.openxmlformats.org/officeDocument/2006/relationships" xmlns:p="http://schemas.openxmlformats.org/presentationml/2006/main" xmlns:m="http://schemas.openxmlformats.org/officeDocument/2006/math" xmlns:a14="http://schemas.microsoft.com/office/drawing/2010/main" showMasterSp="1" showMasterPhAnim="1">
+<p:sld xmlns:a="http://schemas.openxmlformats.org/drawingml/2006/main" xmlns:r="http://schemas.openxmlformats.org/officeDocument/2006/relationships" xmlns:p="http://schemas.openxmlformats.org/presentationml/2006/main">
   <p:cSld>
     <p:spTree>
       <p:nvGrpSpPr>
@@ -4483,7 +4968,9 @@
       <p:sp>
         <p:nvSpPr>
           <p:cNvPr id="136" name="Title 1"/>
-          <p:cNvSpPr txBox="1"/>
+          <p:cNvSpPr txBox="1">
+            <a:spLocks noGrp="1"/>
+          </p:cNvSpPr>
           <p:nvPr>
             <p:ph type="title"/>
           </p:nvPr>
@@ -4506,7 +4993,6 @@
             </a:lvl1pPr>
           </a:lstStyle>
           <a:p>
-            <a:pPr/>
             <a:r>
               <a:t>Prof. Dr. Sergio Marquina</a:t>
             </a:r>
@@ -4516,7 +5002,9 @@
       <p:sp>
         <p:nvSpPr>
           <p:cNvPr id="137" name="Content Placeholder 2"/>
-          <p:cNvSpPr txBox="1"/>
+          <p:cNvSpPr txBox="1">
+            <a:spLocks noGrp="1"/>
+          </p:cNvSpPr>
           <p:nvPr>
             <p:ph type="body" idx="1"/>
           </p:nvPr>
@@ -4538,7 +5026,28 @@
               <a:defRPr sz="1800"/>
             </a:pPr>
             <a:r>
-              <a:t>Szenario 1 (Endgültige Speicherung):</a:t>
+              <a:rPr dirty="0" err="1"/>
+              <a:t>Szenario</a:t>
+            </a:r>
+            <a:r>
+              <a:rPr dirty="0"/>
+              <a:t> 1 (</a:t>
+            </a:r>
+            <a:r>
+              <a:rPr dirty="0" err="1"/>
+              <a:t>Endgültige</a:t>
+            </a:r>
+            <a:r>
+              <a:rPr dirty="0"/>
+              <a:t> </a:t>
+            </a:r>
+            <a:r>
+              <a:rPr dirty="0" err="1"/>
+              <a:t>Speicherung</a:t>
+            </a:r>
+            <a:r>
+              <a:rPr dirty="0"/>
+              <a:t>):</a:t>
             </a:r>
           </a:p>
           <a:p>
@@ -4546,7 +5055,532 @@
               <a:defRPr sz="1800"/>
             </a:pPr>
             <a:r>
-              <a:t>Herr Marquina hat den ganzen Tag zahlreiche Mathematik Klausuren korrigiert und bewertet. Er hat alle Noten in eine Excel Datei eingetragen und will sie nun in das qis-System abtippen. Am Ende des Tages ist Herr Professor ziemlich müde und unkonzentriert. Das Abtippen ist ein monotoner Prozess und Herr Professor verrutscht in einer Zeile und trägt die Note an einer falschen Stelle ein und klickt auf den „Speichern“-Knopf. Der Fehler fällt ihm erst nach dem Speichern auf, aber das Speichern ist endgültig und die Eingaben können nicht mehr korrigiert werden. Herr Professor ärgert sich, weil er nun ein Formular ausfüllen und es an das Prüfungsamt schicken muss.</a:t>
+              <a:rPr dirty="0"/>
+              <a:t>Herr </a:t>
+            </a:r>
+            <a:r>
+              <a:rPr dirty="0" err="1"/>
+              <a:t>Marquina</a:t>
+            </a:r>
+            <a:r>
+              <a:rPr dirty="0"/>
+              <a:t> hat den </a:t>
+            </a:r>
+            <a:r>
+              <a:rPr dirty="0" err="1"/>
+              <a:t>ganzen</a:t>
+            </a:r>
+            <a:r>
+              <a:rPr dirty="0"/>
+              <a:t> Tag </a:t>
+            </a:r>
+            <a:r>
+              <a:rPr dirty="0" err="1"/>
+              <a:t>zahlreiche</a:t>
+            </a:r>
+            <a:r>
+              <a:rPr dirty="0"/>
+              <a:t> </a:t>
+            </a:r>
+            <a:r>
+              <a:rPr dirty="0" err="1"/>
+              <a:t>Mathematik</a:t>
+            </a:r>
+            <a:r>
+              <a:rPr dirty="0"/>
+              <a:t> </a:t>
+            </a:r>
+            <a:r>
+              <a:rPr dirty="0" err="1"/>
+              <a:t>Klausuren</a:t>
+            </a:r>
+            <a:r>
+              <a:rPr dirty="0"/>
+              <a:t> </a:t>
+            </a:r>
+            <a:r>
+              <a:rPr dirty="0" err="1"/>
+              <a:t>korrigiert</a:t>
+            </a:r>
+            <a:r>
+              <a:rPr dirty="0"/>
+              <a:t> und </a:t>
+            </a:r>
+            <a:r>
+              <a:rPr dirty="0" err="1"/>
+              <a:t>bewertet</a:t>
+            </a:r>
+            <a:r>
+              <a:rPr dirty="0"/>
+              <a:t>. </a:t>
+            </a:r>
+            <a:r>
+              <a:rPr dirty="0" err="1"/>
+              <a:t>Er</a:t>
+            </a:r>
+            <a:r>
+              <a:rPr dirty="0"/>
+              <a:t> hat </a:t>
+            </a:r>
+            <a:r>
+              <a:rPr dirty="0" err="1"/>
+              <a:t>alle</a:t>
+            </a:r>
+            <a:r>
+              <a:rPr dirty="0"/>
+              <a:t> </a:t>
+            </a:r>
+            <a:r>
+              <a:rPr dirty="0" err="1"/>
+              <a:t>Noten</a:t>
+            </a:r>
+            <a:r>
+              <a:rPr dirty="0"/>
+              <a:t> in </a:t>
+            </a:r>
+            <a:r>
+              <a:rPr dirty="0" err="1"/>
+              <a:t>eine</a:t>
+            </a:r>
+            <a:r>
+              <a:rPr dirty="0"/>
+              <a:t> Excel </a:t>
+            </a:r>
+            <a:r>
+              <a:rPr dirty="0" err="1"/>
+              <a:t>Datei</a:t>
+            </a:r>
+            <a:r>
+              <a:rPr dirty="0"/>
+              <a:t> </a:t>
+            </a:r>
+            <a:r>
+              <a:rPr dirty="0" err="1"/>
+              <a:t>eingetragen</a:t>
+            </a:r>
+            <a:r>
+              <a:rPr dirty="0"/>
+              <a:t> und will </a:t>
+            </a:r>
+            <a:r>
+              <a:rPr dirty="0" err="1"/>
+              <a:t>sie</a:t>
+            </a:r>
+            <a:r>
+              <a:rPr dirty="0"/>
+              <a:t> nun in das </a:t>
+            </a:r>
+            <a:r>
+              <a:rPr dirty="0" err="1"/>
+              <a:t>qis</a:t>
+            </a:r>
+            <a:r>
+              <a:rPr dirty="0"/>
+              <a:t>-System </a:t>
+            </a:r>
+            <a:r>
+              <a:rPr dirty="0" err="1"/>
+              <a:t>abtippen</a:t>
+            </a:r>
+            <a:r>
+              <a:rPr dirty="0"/>
+              <a:t>. Am Ende des </a:t>
+            </a:r>
+            <a:r>
+              <a:rPr dirty="0" err="1"/>
+              <a:t>Tages</a:t>
+            </a:r>
+            <a:r>
+              <a:rPr dirty="0"/>
+              <a:t> </a:t>
+            </a:r>
+            <a:r>
+              <a:rPr dirty="0" err="1"/>
+              <a:t>ist</a:t>
+            </a:r>
+            <a:r>
+              <a:rPr dirty="0"/>
+              <a:t> </a:t>
+            </a:r>
+            <a:r>
+              <a:rPr lang="de-DE" dirty="0"/>
+              <a:t>er </a:t>
+            </a:r>
+            <a:r>
+              <a:rPr dirty="0" err="1"/>
+              <a:t>ziemlich</a:t>
+            </a:r>
+            <a:r>
+              <a:rPr dirty="0"/>
+              <a:t> </a:t>
+            </a:r>
+            <a:r>
+              <a:rPr dirty="0" err="1"/>
+              <a:t>müde</a:t>
+            </a:r>
+            <a:r>
+              <a:rPr dirty="0"/>
+              <a:t> und </a:t>
+            </a:r>
+            <a:r>
+              <a:rPr dirty="0" err="1"/>
+              <a:t>unkonzentriert</a:t>
+            </a:r>
+            <a:r>
+              <a:rPr dirty="0"/>
+              <a:t>. Das </a:t>
+            </a:r>
+            <a:r>
+              <a:rPr dirty="0" err="1"/>
+              <a:t>Abtippen</a:t>
+            </a:r>
+            <a:r>
+              <a:rPr dirty="0"/>
+              <a:t> </a:t>
+            </a:r>
+            <a:r>
+              <a:rPr dirty="0" err="1"/>
+              <a:t>ist</a:t>
+            </a:r>
+            <a:r>
+              <a:rPr dirty="0"/>
+              <a:t> </a:t>
+            </a:r>
+            <a:r>
+              <a:rPr dirty="0" err="1"/>
+              <a:t>ein</a:t>
+            </a:r>
+            <a:r>
+              <a:rPr dirty="0"/>
+              <a:t> </a:t>
+            </a:r>
+            <a:r>
+              <a:rPr dirty="0" err="1"/>
+              <a:t>monotoner</a:t>
+            </a:r>
+            <a:r>
+              <a:rPr dirty="0"/>
+              <a:t> </a:t>
+            </a:r>
+            <a:r>
+              <a:rPr dirty="0" err="1"/>
+              <a:t>Prozess</a:t>
+            </a:r>
+            <a:r>
+              <a:rPr dirty="0"/>
+              <a:t> und </a:t>
+            </a:r>
+            <a:r>
+              <a:rPr lang="de-DE" dirty="0"/>
+              <a:t>der</a:t>
+            </a:r>
+            <a:r>
+              <a:rPr dirty="0"/>
+              <a:t> Professor </a:t>
+            </a:r>
+            <a:r>
+              <a:rPr dirty="0" err="1"/>
+              <a:t>verrutscht</a:t>
+            </a:r>
+            <a:r>
+              <a:rPr dirty="0"/>
+              <a:t> in </a:t>
+            </a:r>
+            <a:r>
+              <a:rPr dirty="0" err="1"/>
+              <a:t>einer</a:t>
+            </a:r>
+            <a:r>
+              <a:rPr dirty="0"/>
+              <a:t> </a:t>
+            </a:r>
+            <a:r>
+              <a:rPr dirty="0" err="1"/>
+              <a:t>Zeile</a:t>
+            </a:r>
+            <a:r>
+              <a:rPr dirty="0"/>
+              <a:t> und </a:t>
+            </a:r>
+            <a:r>
+              <a:rPr dirty="0" err="1"/>
+              <a:t>trägt</a:t>
+            </a:r>
+            <a:r>
+              <a:rPr dirty="0"/>
+              <a:t> die Note an </a:t>
+            </a:r>
+            <a:r>
+              <a:rPr dirty="0" err="1"/>
+              <a:t>einer</a:t>
+            </a:r>
+            <a:r>
+              <a:rPr dirty="0"/>
+              <a:t> </a:t>
+            </a:r>
+            <a:r>
+              <a:rPr dirty="0" err="1"/>
+              <a:t>falschen</a:t>
+            </a:r>
+            <a:r>
+              <a:rPr dirty="0"/>
+              <a:t> </a:t>
+            </a:r>
+            <a:r>
+              <a:rPr dirty="0" err="1"/>
+              <a:t>Stelle</a:t>
+            </a:r>
+            <a:r>
+              <a:rPr dirty="0"/>
+              <a:t> </a:t>
+            </a:r>
+            <a:r>
+              <a:rPr dirty="0" err="1"/>
+              <a:t>ein</a:t>
+            </a:r>
+            <a:r>
+              <a:rPr dirty="0"/>
+              <a:t> und </a:t>
+            </a:r>
+            <a:r>
+              <a:rPr dirty="0" err="1"/>
+              <a:t>klickt</a:t>
+            </a:r>
+            <a:r>
+              <a:rPr dirty="0"/>
+              <a:t> auf den „</a:t>
+            </a:r>
+            <a:r>
+              <a:rPr dirty="0" err="1"/>
+              <a:t>Speichern</a:t>
+            </a:r>
+            <a:r>
+              <a:rPr dirty="0"/>
+              <a:t>“-Knopf. Der </a:t>
+            </a:r>
+            <a:r>
+              <a:rPr dirty="0" err="1"/>
+              <a:t>Fehler</a:t>
+            </a:r>
+            <a:r>
+              <a:rPr dirty="0"/>
+              <a:t> </a:t>
+            </a:r>
+            <a:r>
+              <a:rPr dirty="0" err="1"/>
+              <a:t>fällt</a:t>
+            </a:r>
+            <a:r>
+              <a:rPr dirty="0"/>
+              <a:t> </a:t>
+            </a:r>
+            <a:r>
+              <a:rPr dirty="0" err="1"/>
+              <a:t>ihm</a:t>
+            </a:r>
+            <a:r>
+              <a:rPr dirty="0"/>
+              <a:t> </a:t>
+            </a:r>
+            <a:r>
+              <a:rPr dirty="0" err="1"/>
+              <a:t>erst</a:t>
+            </a:r>
+            <a:r>
+              <a:rPr dirty="0"/>
+              <a:t> </a:t>
+            </a:r>
+            <a:r>
+              <a:rPr dirty="0" err="1"/>
+              <a:t>nach</a:t>
+            </a:r>
+            <a:r>
+              <a:rPr dirty="0"/>
+              <a:t> </a:t>
+            </a:r>
+            <a:r>
+              <a:rPr dirty="0" err="1"/>
+              <a:t>dem</a:t>
+            </a:r>
+            <a:r>
+              <a:rPr dirty="0"/>
+              <a:t> </a:t>
+            </a:r>
+            <a:r>
+              <a:rPr dirty="0" err="1"/>
+              <a:t>Speichern</a:t>
+            </a:r>
+            <a:r>
+              <a:rPr dirty="0"/>
+              <a:t> auf, </a:t>
+            </a:r>
+            <a:r>
+              <a:rPr dirty="0" err="1"/>
+              <a:t>aber</a:t>
+            </a:r>
+            <a:r>
+              <a:rPr dirty="0"/>
+              <a:t> das </a:t>
+            </a:r>
+            <a:r>
+              <a:rPr dirty="0" err="1"/>
+              <a:t>Speichern</a:t>
+            </a:r>
+            <a:r>
+              <a:rPr dirty="0"/>
+              <a:t> </a:t>
+            </a:r>
+            <a:r>
+              <a:rPr dirty="0" err="1"/>
+              <a:t>ist</a:t>
+            </a:r>
+            <a:r>
+              <a:rPr dirty="0"/>
+              <a:t> </a:t>
+            </a:r>
+            <a:r>
+              <a:rPr dirty="0" err="1"/>
+              <a:t>endgültig</a:t>
+            </a:r>
+            <a:r>
+              <a:rPr dirty="0"/>
+              <a:t> und die </a:t>
+            </a:r>
+            <a:r>
+              <a:rPr dirty="0" err="1"/>
+              <a:t>Eingaben</a:t>
+            </a:r>
+            <a:r>
+              <a:rPr dirty="0"/>
+              <a:t> </a:t>
+            </a:r>
+            <a:r>
+              <a:rPr dirty="0" err="1"/>
+              <a:t>können</a:t>
+            </a:r>
+            <a:r>
+              <a:rPr dirty="0"/>
+              <a:t> </a:t>
+            </a:r>
+            <a:r>
+              <a:rPr dirty="0" err="1"/>
+              <a:t>nicht</a:t>
+            </a:r>
+            <a:r>
+              <a:rPr dirty="0"/>
+              <a:t> </a:t>
+            </a:r>
+            <a:r>
+              <a:rPr dirty="0" err="1"/>
+              <a:t>mehr</a:t>
+            </a:r>
+            <a:r>
+              <a:rPr dirty="0"/>
+              <a:t> </a:t>
+            </a:r>
+            <a:r>
+              <a:rPr dirty="0" err="1"/>
+              <a:t>korrigiert</a:t>
+            </a:r>
+            <a:r>
+              <a:rPr dirty="0"/>
+              <a:t> </a:t>
+            </a:r>
+            <a:r>
+              <a:rPr dirty="0" err="1"/>
+              <a:t>werden</a:t>
+            </a:r>
+            <a:r>
+              <a:rPr dirty="0"/>
+              <a:t>. </a:t>
+            </a:r>
+            <a:r>
+              <a:rPr lang="de-DE" dirty="0"/>
+              <a:t>Der</a:t>
+            </a:r>
+            <a:r>
+              <a:rPr dirty="0"/>
+              <a:t> Professor </a:t>
+            </a:r>
+            <a:r>
+              <a:rPr dirty="0" err="1"/>
+              <a:t>ärgert</a:t>
+            </a:r>
+            <a:r>
+              <a:rPr dirty="0"/>
+              <a:t> </a:t>
+            </a:r>
+            <a:r>
+              <a:rPr dirty="0" err="1"/>
+              <a:t>sich</a:t>
+            </a:r>
+            <a:r>
+              <a:rPr dirty="0"/>
+              <a:t>, </a:t>
+            </a:r>
+            <a:r>
+              <a:rPr dirty="0" err="1"/>
+              <a:t>weil</a:t>
+            </a:r>
+            <a:r>
+              <a:rPr dirty="0"/>
+              <a:t> </a:t>
+            </a:r>
+            <a:r>
+              <a:rPr dirty="0" err="1"/>
+              <a:t>er</a:t>
+            </a:r>
+            <a:r>
+              <a:rPr dirty="0"/>
+              <a:t> nun </a:t>
+            </a:r>
+            <a:r>
+              <a:rPr dirty="0" err="1"/>
+              <a:t>ein</a:t>
+            </a:r>
+            <a:r>
+              <a:rPr dirty="0"/>
+              <a:t> </a:t>
+            </a:r>
+            <a:r>
+              <a:rPr dirty="0" err="1"/>
+              <a:t>Formular</a:t>
+            </a:r>
+            <a:r>
+              <a:rPr dirty="0"/>
+              <a:t> </a:t>
+            </a:r>
+            <a:r>
+              <a:rPr dirty="0" err="1"/>
+              <a:t>ausfüllen</a:t>
+            </a:r>
+            <a:r>
+              <a:rPr dirty="0"/>
+              <a:t> und </a:t>
+            </a:r>
+            <a:r>
+              <a:rPr dirty="0" err="1"/>
+              <a:t>es</a:t>
+            </a:r>
+            <a:r>
+              <a:rPr dirty="0"/>
+              <a:t> an das </a:t>
+            </a:r>
+            <a:r>
+              <a:rPr dirty="0" err="1"/>
+              <a:t>Prüfungsamt</a:t>
+            </a:r>
+            <a:r>
+              <a:rPr dirty="0"/>
+              <a:t> </a:t>
+            </a:r>
+            <a:r>
+              <a:rPr dirty="0" err="1"/>
+              <a:t>schicken</a:t>
+            </a:r>
+            <a:r>
+              <a:rPr dirty="0"/>
+              <a:t> muss.</a:t>
             </a:r>
           </a:p>
         </p:txBody>
@@ -4585,12 +5619,12 @@
   <p:clrMapOvr>
     <a:masterClrMapping/>
   </p:clrMapOvr>
-  <p:transition xmlns:p14="http://schemas.microsoft.com/office/powerpoint/2010/main" spd="med" advClick="1"/>
+  <p:transition spd="med"/>
 </p:sld>
 </file>
 
 <file path=ppt/slides/slide4.xml><?xml version="1.0" encoding="utf-8"?>
-<p:sld xmlns:a="http://schemas.openxmlformats.org/drawingml/2006/main" xmlns:r="http://schemas.openxmlformats.org/officeDocument/2006/relationships" xmlns:p="http://schemas.openxmlformats.org/presentationml/2006/main" xmlns:m="http://schemas.openxmlformats.org/officeDocument/2006/math" xmlns:a14="http://schemas.microsoft.com/office/drawing/2010/main" showMasterSp="1" showMasterPhAnim="1">
+<p:sld xmlns:a="http://schemas.openxmlformats.org/drawingml/2006/main" xmlns:r="http://schemas.openxmlformats.org/officeDocument/2006/relationships" xmlns:p="http://schemas.openxmlformats.org/presentationml/2006/main">
   <p:cSld>
     <p:spTree>
       <p:nvGrpSpPr>
@@ -4609,7 +5643,9 @@
       <p:sp>
         <p:nvSpPr>
           <p:cNvPr id="140" name="Title 1"/>
-          <p:cNvSpPr txBox="1"/>
+          <p:cNvSpPr txBox="1">
+            <a:spLocks noGrp="1"/>
+          </p:cNvSpPr>
           <p:nvPr>
             <p:ph type="title"/>
           </p:nvPr>
@@ -4632,7 +5668,6 @@
             </a:lvl1pPr>
           </a:lstStyle>
           <a:p>
-            <a:pPr/>
             <a:r>
               <a:t>Prof. Dr. Sergio Marquina</a:t>
             </a:r>
@@ -4642,7 +5677,9 @@
       <p:sp>
         <p:nvSpPr>
           <p:cNvPr id="141" name="Content Placeholder 2"/>
-          <p:cNvSpPr txBox="1"/>
+          <p:cNvSpPr txBox="1">
+            <a:spLocks noGrp="1"/>
+          </p:cNvSpPr>
           <p:nvPr>
             <p:ph type="body" idx="1"/>
           </p:nvPr>
@@ -4664,7 +5701,28 @@
               <a:defRPr sz="1800"/>
             </a:pPr>
             <a:r>
-              <a:t>Szenario 2 (Gruppierung der Prüfungen):</a:t>
+              <a:rPr dirty="0" err="1"/>
+              <a:t>Szenario</a:t>
+            </a:r>
+            <a:r>
+              <a:rPr dirty="0"/>
+              <a:t> 2 (</a:t>
+            </a:r>
+            <a:r>
+              <a:rPr dirty="0" err="1"/>
+              <a:t>Gruppierung</a:t>
+            </a:r>
+            <a:r>
+              <a:rPr dirty="0"/>
+              <a:t> der </a:t>
+            </a:r>
+            <a:r>
+              <a:rPr dirty="0" err="1"/>
+              <a:t>Prüfungen</a:t>
+            </a:r>
+            <a:r>
+              <a:rPr dirty="0"/>
+              <a:t>):</a:t>
             </a:r>
           </a:p>
           <a:p>
@@ -4672,7 +5730,464 @@
               <a:defRPr sz="1800"/>
             </a:pPr>
             <a:r>
-              <a:t>Herr Marquina hält die Vorlesung Mathematik für verschiedene Studiengange seiner Fakultät (Mathematik, Allgemeine Informatik, Technische Informatik, Medizinische Informatik und Wirtschaftsinformatik) und noch ein paar andere Fächer. Nach der Korrektur aller Matheklausuren möchte er gerne die Noten in das qis-System eintragen. Die Mathe Prüfung für hat eine eigene ID für jeden Studiengang und ist ein eigener Eintrag in der Prüfungsliste. Herr Professor öffnet die Liste mit allen Prüfungen, bei den er angemeldet ist und muss alle Matheprüfungen einzeln suchen.</a:t>
+              <a:rPr dirty="0"/>
+              <a:t>Herr </a:t>
+            </a:r>
+            <a:r>
+              <a:rPr dirty="0" err="1"/>
+              <a:t>Marquina</a:t>
+            </a:r>
+            <a:r>
+              <a:rPr dirty="0"/>
+              <a:t> </a:t>
+            </a:r>
+            <a:r>
+              <a:rPr dirty="0" err="1"/>
+              <a:t>hält</a:t>
+            </a:r>
+            <a:r>
+              <a:rPr dirty="0"/>
+              <a:t> die </a:t>
+            </a:r>
+            <a:r>
+              <a:rPr dirty="0" err="1"/>
+              <a:t>Vorlesung</a:t>
+            </a:r>
+            <a:r>
+              <a:rPr dirty="0"/>
+              <a:t> </a:t>
+            </a:r>
+            <a:r>
+              <a:rPr dirty="0" err="1"/>
+              <a:t>Mathematik</a:t>
+            </a:r>
+            <a:r>
+              <a:rPr dirty="0"/>
+              <a:t> </a:t>
+            </a:r>
+            <a:r>
+              <a:rPr dirty="0" err="1"/>
+              <a:t>für</a:t>
+            </a:r>
+            <a:r>
+              <a:rPr dirty="0"/>
+              <a:t> </a:t>
+            </a:r>
+            <a:r>
+              <a:rPr dirty="0" err="1"/>
+              <a:t>verschiedene</a:t>
+            </a:r>
+            <a:r>
+              <a:rPr dirty="0"/>
+              <a:t> </a:t>
+            </a:r>
+            <a:r>
+              <a:rPr dirty="0" err="1"/>
+              <a:t>Studiengange</a:t>
+            </a:r>
+            <a:r>
+              <a:rPr dirty="0"/>
+              <a:t> seiner </a:t>
+            </a:r>
+            <a:r>
+              <a:rPr dirty="0" err="1"/>
+              <a:t>Fakultät</a:t>
+            </a:r>
+            <a:r>
+              <a:rPr dirty="0"/>
+              <a:t> (</a:t>
+            </a:r>
+            <a:r>
+              <a:rPr dirty="0" err="1"/>
+              <a:t>Mathematik</a:t>
+            </a:r>
+            <a:r>
+              <a:rPr dirty="0"/>
+              <a:t>, Allgemeine </a:t>
+            </a:r>
+            <a:r>
+              <a:rPr dirty="0" err="1"/>
+              <a:t>Informatik</a:t>
+            </a:r>
+            <a:r>
+              <a:rPr dirty="0"/>
+              <a:t>, </a:t>
+            </a:r>
+            <a:r>
+              <a:rPr dirty="0" err="1"/>
+              <a:t>Technische</a:t>
+            </a:r>
+            <a:r>
+              <a:rPr dirty="0"/>
+              <a:t> </a:t>
+            </a:r>
+            <a:r>
+              <a:rPr dirty="0" err="1"/>
+              <a:t>Informatik</a:t>
+            </a:r>
+            <a:r>
+              <a:rPr dirty="0"/>
+              <a:t>, </a:t>
+            </a:r>
+            <a:r>
+              <a:rPr dirty="0" err="1"/>
+              <a:t>Medizinische</a:t>
+            </a:r>
+            <a:r>
+              <a:rPr dirty="0"/>
+              <a:t> </a:t>
+            </a:r>
+            <a:r>
+              <a:rPr dirty="0" err="1"/>
+              <a:t>Informatik</a:t>
+            </a:r>
+            <a:r>
+              <a:rPr dirty="0"/>
+              <a:t> und </a:t>
+            </a:r>
+            <a:r>
+              <a:rPr dirty="0" err="1"/>
+              <a:t>Wirtschaftsinformatik</a:t>
+            </a:r>
+            <a:r>
+              <a:rPr dirty="0"/>
+              <a:t>) und </a:t>
+            </a:r>
+            <a:r>
+              <a:rPr dirty="0" err="1"/>
+              <a:t>noch</a:t>
+            </a:r>
+            <a:r>
+              <a:rPr dirty="0"/>
+              <a:t> </a:t>
+            </a:r>
+            <a:r>
+              <a:rPr dirty="0" err="1"/>
+              <a:t>ein</a:t>
+            </a:r>
+            <a:r>
+              <a:rPr dirty="0"/>
+              <a:t> </a:t>
+            </a:r>
+            <a:r>
+              <a:rPr dirty="0" err="1"/>
+              <a:t>paar</a:t>
+            </a:r>
+            <a:r>
+              <a:rPr dirty="0"/>
+              <a:t> </a:t>
+            </a:r>
+            <a:r>
+              <a:rPr dirty="0" err="1"/>
+              <a:t>andere</a:t>
+            </a:r>
+            <a:r>
+              <a:rPr dirty="0"/>
+              <a:t> </a:t>
+            </a:r>
+            <a:r>
+              <a:rPr dirty="0" err="1"/>
+              <a:t>Fächer</a:t>
+            </a:r>
+            <a:r>
+              <a:rPr dirty="0"/>
+              <a:t>. </a:t>
+            </a:r>
+            <a:r>
+              <a:rPr dirty="0" err="1"/>
+              <a:t>Nach</a:t>
+            </a:r>
+            <a:r>
+              <a:rPr dirty="0"/>
+              <a:t> der </a:t>
+            </a:r>
+            <a:r>
+              <a:rPr dirty="0" err="1"/>
+              <a:t>Korrektur</a:t>
+            </a:r>
+            <a:r>
+              <a:rPr dirty="0"/>
+              <a:t> </a:t>
+            </a:r>
+            <a:r>
+              <a:rPr dirty="0" err="1"/>
+              <a:t>aller</a:t>
+            </a:r>
+            <a:r>
+              <a:rPr dirty="0"/>
+              <a:t> </a:t>
+            </a:r>
+            <a:r>
+              <a:rPr dirty="0" err="1"/>
+              <a:t>Matheklausuren</a:t>
+            </a:r>
+            <a:r>
+              <a:rPr dirty="0"/>
+              <a:t> </a:t>
+            </a:r>
+            <a:r>
+              <a:rPr dirty="0" err="1"/>
+              <a:t>möchte</a:t>
+            </a:r>
+            <a:r>
+              <a:rPr dirty="0"/>
+              <a:t> </a:t>
+            </a:r>
+            <a:r>
+              <a:rPr dirty="0" err="1"/>
+              <a:t>er</a:t>
+            </a:r>
+            <a:r>
+              <a:rPr dirty="0"/>
+              <a:t> </a:t>
+            </a:r>
+            <a:r>
+              <a:rPr dirty="0" err="1"/>
+              <a:t>gerne</a:t>
+            </a:r>
+            <a:r>
+              <a:rPr dirty="0"/>
+              <a:t> die </a:t>
+            </a:r>
+            <a:r>
+              <a:rPr dirty="0" err="1"/>
+              <a:t>Noten</a:t>
+            </a:r>
+            <a:r>
+              <a:rPr dirty="0"/>
+              <a:t> in das </a:t>
+            </a:r>
+            <a:r>
+              <a:rPr dirty="0" err="1"/>
+              <a:t>qis</a:t>
+            </a:r>
+            <a:r>
+              <a:rPr dirty="0"/>
+              <a:t>-System </a:t>
+            </a:r>
+            <a:r>
+              <a:rPr dirty="0" err="1"/>
+              <a:t>eintragen</a:t>
+            </a:r>
+            <a:r>
+              <a:rPr dirty="0"/>
+              <a:t>. Die </a:t>
+            </a:r>
+            <a:r>
+              <a:rPr dirty="0" err="1"/>
+              <a:t>Mathe</a:t>
+            </a:r>
+            <a:r>
+              <a:rPr dirty="0"/>
+              <a:t> </a:t>
+            </a:r>
+            <a:r>
+              <a:rPr dirty="0" err="1"/>
+              <a:t>Prüfung</a:t>
+            </a:r>
+            <a:r>
+              <a:rPr dirty="0"/>
+              <a:t> </a:t>
+            </a:r>
+            <a:r>
+              <a:rPr dirty="0" err="1"/>
+              <a:t>für</a:t>
+            </a:r>
+            <a:r>
+              <a:rPr dirty="0"/>
+              <a:t> hat </a:t>
+            </a:r>
+            <a:r>
+              <a:rPr dirty="0" err="1"/>
+              <a:t>eine</a:t>
+            </a:r>
+            <a:r>
+              <a:rPr dirty="0"/>
+              <a:t> </a:t>
+            </a:r>
+            <a:r>
+              <a:rPr dirty="0" err="1"/>
+              <a:t>eigene</a:t>
+            </a:r>
+            <a:r>
+              <a:rPr dirty="0"/>
+              <a:t> ID </a:t>
+            </a:r>
+            <a:r>
+              <a:rPr dirty="0" err="1"/>
+              <a:t>für</a:t>
+            </a:r>
+            <a:r>
+              <a:rPr dirty="0"/>
+              <a:t> </a:t>
+            </a:r>
+            <a:r>
+              <a:rPr dirty="0" err="1"/>
+              <a:t>jeden</a:t>
+            </a:r>
+            <a:r>
+              <a:rPr dirty="0"/>
+              <a:t> </a:t>
+            </a:r>
+            <a:r>
+              <a:rPr dirty="0" err="1"/>
+              <a:t>Studiengang</a:t>
+            </a:r>
+            <a:r>
+              <a:rPr dirty="0"/>
+              <a:t> und </a:t>
+            </a:r>
+            <a:r>
+              <a:rPr dirty="0" err="1"/>
+              <a:t>ist</a:t>
+            </a:r>
+            <a:r>
+              <a:rPr dirty="0"/>
+              <a:t> </a:t>
+            </a:r>
+            <a:r>
+              <a:rPr dirty="0" err="1"/>
+              <a:t>ein</a:t>
+            </a:r>
+            <a:r>
+              <a:rPr dirty="0"/>
+              <a:t> </a:t>
+            </a:r>
+            <a:r>
+              <a:rPr dirty="0" err="1"/>
+              <a:t>eigener</a:t>
+            </a:r>
+            <a:r>
+              <a:rPr dirty="0"/>
+              <a:t> </a:t>
+            </a:r>
+            <a:r>
+              <a:rPr dirty="0" err="1"/>
+              <a:t>Eintrag</a:t>
+            </a:r>
+            <a:r>
+              <a:rPr dirty="0"/>
+              <a:t> in der </a:t>
+            </a:r>
+            <a:r>
+              <a:rPr dirty="0" err="1"/>
+              <a:t>Prüfungsliste</a:t>
+            </a:r>
+            <a:r>
+              <a:rPr dirty="0"/>
+              <a:t>. </a:t>
+            </a:r>
+            <a:r>
+              <a:rPr lang="de-DE" dirty="0"/>
+              <a:t>Der</a:t>
+            </a:r>
+            <a:r>
+              <a:rPr dirty="0"/>
+              <a:t> Professor </a:t>
+            </a:r>
+            <a:r>
+              <a:rPr dirty="0" err="1"/>
+              <a:t>öffnet</a:t>
+            </a:r>
+            <a:r>
+              <a:rPr dirty="0"/>
+              <a:t> die </a:t>
+            </a:r>
+            <a:r>
+              <a:rPr dirty="0" err="1"/>
+              <a:t>Liste</a:t>
+            </a:r>
+            <a:r>
+              <a:rPr dirty="0"/>
+              <a:t> </a:t>
+            </a:r>
+            <a:r>
+              <a:rPr dirty="0" err="1"/>
+              <a:t>mit</a:t>
+            </a:r>
+            <a:r>
+              <a:rPr dirty="0"/>
+              <a:t> </a:t>
+            </a:r>
+            <a:r>
+              <a:rPr dirty="0" err="1"/>
+              <a:t>allen</a:t>
+            </a:r>
+            <a:r>
+              <a:rPr dirty="0"/>
+              <a:t> </a:t>
+            </a:r>
+            <a:r>
+              <a:rPr dirty="0" err="1"/>
+              <a:t>Prüfungen</a:t>
+            </a:r>
+            <a:r>
+              <a:rPr dirty="0"/>
+              <a:t>, </a:t>
+            </a:r>
+            <a:r>
+              <a:rPr dirty="0" err="1"/>
+              <a:t>bei</a:t>
+            </a:r>
+            <a:r>
+              <a:rPr dirty="0"/>
+              <a:t> den </a:t>
+            </a:r>
+            <a:r>
+              <a:rPr dirty="0" err="1"/>
+              <a:t>er</a:t>
+            </a:r>
+            <a:r>
+              <a:rPr dirty="0"/>
+              <a:t> </a:t>
+            </a:r>
+            <a:r>
+              <a:rPr dirty="0" err="1"/>
+              <a:t>angemeldet</a:t>
+            </a:r>
+            <a:r>
+              <a:rPr dirty="0"/>
+              <a:t> </a:t>
+            </a:r>
+            <a:r>
+              <a:rPr dirty="0" err="1"/>
+              <a:t>ist</a:t>
+            </a:r>
+            <a:r>
+              <a:rPr dirty="0"/>
+              <a:t> und muss </a:t>
+            </a:r>
+            <a:r>
+              <a:rPr dirty="0" err="1"/>
+              <a:t>alle</a:t>
+            </a:r>
+            <a:r>
+              <a:rPr dirty="0"/>
+              <a:t> </a:t>
+            </a:r>
+            <a:r>
+              <a:rPr dirty="0" err="1"/>
+              <a:t>Matheprüfungen</a:t>
+            </a:r>
+            <a:r>
+              <a:rPr dirty="0"/>
+              <a:t> </a:t>
+            </a:r>
+            <a:r>
+              <a:rPr dirty="0" err="1"/>
+              <a:t>einzeln</a:t>
+            </a:r>
+            <a:r>
+              <a:rPr dirty="0"/>
+              <a:t> </a:t>
+            </a:r>
+            <a:r>
+              <a:rPr dirty="0" err="1"/>
+              <a:t>suchen</a:t>
+            </a:r>
+            <a:r>
+              <a:rPr dirty="0"/>
+              <a:t>.</a:t>
             </a:r>
           </a:p>
         </p:txBody>
@@ -4711,12 +6226,12 @@
   <p:clrMapOvr>
     <a:masterClrMapping/>
   </p:clrMapOvr>
-  <p:transition xmlns:p14="http://schemas.microsoft.com/office/powerpoint/2010/main" spd="med" advClick="1"/>
+  <p:transition spd="med"/>
 </p:sld>
 </file>
 
 <file path=ppt/slides/slide5.xml><?xml version="1.0" encoding="utf-8"?>
-<p:sld xmlns:a="http://schemas.openxmlformats.org/drawingml/2006/main" xmlns:r="http://schemas.openxmlformats.org/officeDocument/2006/relationships" xmlns:p="http://schemas.openxmlformats.org/presentationml/2006/main" xmlns:m="http://schemas.openxmlformats.org/officeDocument/2006/math" xmlns:a14="http://schemas.microsoft.com/office/drawing/2010/main" showMasterSp="1" showMasterPhAnim="1">
+<p:sld xmlns:a="http://schemas.openxmlformats.org/drawingml/2006/main" xmlns:r="http://schemas.openxmlformats.org/officeDocument/2006/relationships" xmlns:p="http://schemas.openxmlformats.org/presentationml/2006/main">
   <p:cSld>
     <p:spTree>
       <p:nvGrpSpPr>
@@ -4735,7 +6250,9 @@
       <p:sp>
         <p:nvSpPr>
           <p:cNvPr id="144" name="Title 1"/>
-          <p:cNvSpPr txBox="1"/>
+          <p:cNvSpPr txBox="1">
+            <a:spLocks noGrp="1"/>
+          </p:cNvSpPr>
           <p:nvPr>
             <p:ph type="title"/>
           </p:nvPr>
@@ -4758,7 +6275,6 @@
             </a:lvl1pPr>
           </a:lstStyle>
           <a:p>
-            <a:pPr/>
             <a:r>
               <a:t>Prof. Dr. Sergio Marquina</a:t>
             </a:r>
@@ -4768,7 +6284,9 @@
       <p:sp>
         <p:nvSpPr>
           <p:cNvPr id="145" name="Content Placeholder 2"/>
-          <p:cNvSpPr txBox="1"/>
+          <p:cNvSpPr txBox="1">
+            <a:spLocks noGrp="1"/>
+          </p:cNvSpPr>
           <p:nvPr>
             <p:ph type="body" idx="1"/>
           </p:nvPr>
@@ -4790,7 +6308,20 @@
               <a:defRPr sz="1800"/>
             </a:pPr>
             <a:r>
-              <a:t>Szenario 3 (Notenformat):</a:t>
+              <a:rPr dirty="0" err="1"/>
+              <a:t>Szenario</a:t>
+            </a:r>
+            <a:r>
+              <a:rPr dirty="0"/>
+              <a:t> 3 (</a:t>
+            </a:r>
+            <a:r>
+              <a:rPr dirty="0" err="1"/>
+              <a:t>Notenformat</a:t>
+            </a:r>
+            <a:r>
+              <a:rPr dirty="0"/>
+              <a:t>):</a:t>
             </a:r>
           </a:p>
           <a:p>
@@ -4798,7 +6329,203 @@
               <a:defRPr sz="1800"/>
             </a:pPr>
             <a:r>
-              <a:t>Herrn Marquita ist bewusst, dass Fehler auf der Seite langwierige Bürokratie zufolge hat und muss jedes Mal beim Noteneintragen im Kopf behalten, dass er die Noten in einem bestimmten Format eintragen muss (1.0 = 100, 1.7 = 170 usw).</a:t>
+              <a:rPr dirty="0" err="1"/>
+              <a:t>Herrn</a:t>
+            </a:r>
+            <a:r>
+              <a:rPr dirty="0"/>
+              <a:t> </a:t>
+            </a:r>
+            <a:r>
+              <a:rPr dirty="0" err="1"/>
+              <a:t>Marqui</a:t>
+            </a:r>
+            <a:r>
+              <a:rPr lang="de-DE" dirty="0"/>
+              <a:t>n</a:t>
+            </a:r>
+            <a:r>
+              <a:rPr dirty="0"/>
+              <a:t>a </a:t>
+            </a:r>
+            <a:r>
+              <a:rPr dirty="0" err="1"/>
+              <a:t>ist</a:t>
+            </a:r>
+            <a:r>
+              <a:rPr dirty="0"/>
+              <a:t> </a:t>
+            </a:r>
+            <a:r>
+              <a:rPr lang="de-DE" dirty="0"/>
+              <a:t>es </a:t>
+            </a:r>
+            <a:r>
+              <a:rPr dirty="0" err="1"/>
+              <a:t>bewusst</a:t>
+            </a:r>
+            <a:r>
+              <a:rPr dirty="0"/>
+              <a:t>, </a:t>
+            </a:r>
+            <a:r>
+              <a:rPr dirty="0" err="1"/>
+              <a:t>dass</a:t>
+            </a:r>
+            <a:r>
+              <a:rPr dirty="0"/>
+              <a:t> </a:t>
+            </a:r>
+            <a:r>
+              <a:rPr dirty="0" err="1"/>
+              <a:t>Fehler</a:t>
+            </a:r>
+            <a:r>
+              <a:rPr dirty="0"/>
+              <a:t> auf der </a:t>
+            </a:r>
+            <a:r>
+              <a:rPr dirty="0" err="1"/>
+              <a:t>Seite</a:t>
+            </a:r>
+            <a:r>
+              <a:rPr dirty="0"/>
+              <a:t> </a:t>
+            </a:r>
+            <a:r>
+              <a:rPr dirty="0" err="1"/>
+              <a:t>langwi</a:t>
+            </a:r>
+            <a:r>
+              <a:rPr lang="de-DE" dirty="0"/>
+              <a:t>e</a:t>
+            </a:r>
+            <a:r>
+              <a:rPr dirty="0" err="1"/>
+              <a:t>rige</a:t>
+            </a:r>
+            <a:r>
+              <a:rPr dirty="0"/>
+              <a:t> </a:t>
+            </a:r>
+            <a:r>
+              <a:rPr dirty="0" err="1"/>
+              <a:t>Bürokratie</a:t>
+            </a:r>
+            <a:r>
+              <a:rPr dirty="0"/>
+              <a:t> </a:t>
+            </a:r>
+            <a:r>
+              <a:rPr dirty="0" err="1"/>
+              <a:t>zufolge</a:t>
+            </a:r>
+            <a:r>
+              <a:rPr dirty="0"/>
+              <a:t> ha</a:t>
+            </a:r>
+            <a:r>
+              <a:rPr lang="de-DE" dirty="0" err="1"/>
+              <a:t>ben</a:t>
+            </a:r>
+            <a:r>
+              <a:rPr dirty="0"/>
+              <a:t> und muss</a:t>
+            </a:r>
+            <a:r>
+              <a:rPr lang="de-DE" dirty="0"/>
+              <a:t> sich</a:t>
+            </a:r>
+            <a:r>
+              <a:rPr dirty="0"/>
+              <a:t> </a:t>
+            </a:r>
+            <a:r>
+              <a:rPr dirty="0" err="1"/>
+              <a:t>jedes</a:t>
+            </a:r>
+            <a:r>
+              <a:rPr dirty="0"/>
+              <a:t> Mal </a:t>
+            </a:r>
+            <a:r>
+              <a:rPr dirty="0" err="1"/>
+              <a:t>beim</a:t>
+            </a:r>
+            <a:r>
+              <a:rPr dirty="0"/>
+              <a:t> </a:t>
+            </a:r>
+            <a:r>
+              <a:rPr dirty="0" err="1"/>
+              <a:t>Noteneintragen</a:t>
+            </a:r>
+            <a:r>
+              <a:rPr dirty="0"/>
+              <a:t> </a:t>
+            </a:r>
+            <a:r>
+              <a:rPr lang="de-DE"/>
+              <a:t>daran erinnern</a:t>
+            </a:r>
+            <a:r>
+              <a:t>, </a:t>
+            </a:r>
+            <a:r>
+              <a:rPr dirty="0" err="1"/>
+              <a:t>dass</a:t>
+            </a:r>
+            <a:r>
+              <a:rPr dirty="0"/>
+              <a:t> </a:t>
+            </a:r>
+            <a:r>
+              <a:rPr dirty="0" err="1"/>
+              <a:t>er</a:t>
+            </a:r>
+            <a:r>
+              <a:rPr dirty="0"/>
+              <a:t> die </a:t>
+            </a:r>
+            <a:r>
+              <a:rPr dirty="0" err="1"/>
+              <a:t>Noten</a:t>
+            </a:r>
+            <a:r>
+              <a:rPr dirty="0"/>
+              <a:t> in </a:t>
+            </a:r>
+            <a:r>
+              <a:rPr dirty="0" err="1"/>
+              <a:t>einem</a:t>
+            </a:r>
+            <a:r>
+              <a:rPr dirty="0"/>
+              <a:t> </a:t>
+            </a:r>
+            <a:r>
+              <a:rPr dirty="0" err="1"/>
+              <a:t>bestimmten</a:t>
+            </a:r>
+            <a:r>
+              <a:rPr dirty="0"/>
+              <a:t> Format </a:t>
+            </a:r>
+            <a:r>
+              <a:rPr dirty="0" err="1"/>
+              <a:t>eintragen</a:t>
+            </a:r>
+            <a:r>
+              <a:rPr dirty="0"/>
+              <a:t> muss (1.0 = 100, 1.7 = 170 </a:t>
+            </a:r>
+            <a:r>
+              <a:rPr dirty="0" err="1"/>
+              <a:t>usw</a:t>
+            </a:r>
+            <a:r>
+              <a:rPr dirty="0"/>
+              <a:t>).</a:t>
             </a:r>
           </a:p>
         </p:txBody>
@@ -4837,12 +6564,12 @@
   <p:clrMapOvr>
     <a:masterClrMapping/>
   </p:clrMapOvr>
-  <p:transition xmlns:p14="http://schemas.microsoft.com/office/powerpoint/2010/main" spd="med" advClick="1"/>
+  <p:transition spd="med"/>
 </p:sld>
 </file>
 
 <file path=ppt/slides/slide6.xml><?xml version="1.0" encoding="utf-8"?>
-<p:sld xmlns:a="http://schemas.openxmlformats.org/drawingml/2006/main" xmlns:r="http://schemas.openxmlformats.org/officeDocument/2006/relationships" xmlns:p="http://schemas.openxmlformats.org/presentationml/2006/main" xmlns:m="http://schemas.openxmlformats.org/officeDocument/2006/math" xmlns:a14="http://schemas.microsoft.com/office/drawing/2010/main" showMasterSp="1" showMasterPhAnim="1">
+<p:sld xmlns:a="http://schemas.openxmlformats.org/drawingml/2006/main" xmlns:r="http://schemas.openxmlformats.org/officeDocument/2006/relationships" xmlns:p="http://schemas.openxmlformats.org/presentationml/2006/main">
   <p:cSld>
     <p:spTree>
       <p:nvGrpSpPr>
@@ -4861,7 +6588,9 @@
       <p:sp>
         <p:nvSpPr>
           <p:cNvPr id="148" name="Title 1"/>
-          <p:cNvSpPr txBox="1"/>
+          <p:cNvSpPr txBox="1">
+            <a:spLocks noGrp="1"/>
+          </p:cNvSpPr>
           <p:nvPr>
             <p:ph type="title"/>
           </p:nvPr>
@@ -4914,15 +6643,27 @@
           <a:off x="3203848" y="1772816"/>
           <a:ext cx="5472608" cy="3940400"/>
         </p:xfrm>
-        <a:graphic xmlns:a="http://schemas.openxmlformats.org/drawingml/2006/main">
+        <a:graphic>
           <a:graphicData uri="http://schemas.openxmlformats.org/drawingml/2006/table">
             <a:tbl>
-              <a:tblPr firstCol="0" firstRow="0" lastCol="0" lastRow="0" bandCol="0" bandRow="0" rtl="0">
+              <a:tblPr>
                 <a:tableStyleId>{4C3C2611-4C71-4FC5-86AE-919BDF0F9419}</a:tableStyleId>
               </a:tblPr>
               <a:tblGrid>
-                <a:gridCol w="2736304"/>
-                <a:gridCol w="2736304"/>
+                <a:gridCol w="2736304">
+                  <a:extLst>
+                    <a:ext uri="{9D8B030D-6E8A-4147-A177-3AD203B41FA5}">
+                      <a16:colId xmlns:a16="http://schemas.microsoft.com/office/drawing/2014/main" val="20000"/>
+                    </a:ext>
+                  </a:extLst>
+                </a:gridCol>
+                <a:gridCol w="2736304">
+                  <a:extLst>
+                    <a:ext uri="{9D8B030D-6E8A-4147-A177-3AD203B41FA5}">
+                      <a16:colId xmlns:a16="http://schemas.microsoft.com/office/drawing/2014/main" val="20001"/>
+                    </a:ext>
+                  </a:extLst>
+                </a:gridCol>
               </a:tblGrid>
               <a:tr h="411163">
                 <a:tc>
@@ -4937,7 +6678,7 @@
                         <a:defRPr sz="1800"/>
                       </a:pPr>
                       <a:r>
-                        <a:rPr b="1" sz="1000">
+                        <a:rPr sz="1000" b="1">
                           <a:latin typeface="Arial"/>
                           <a:ea typeface="Arial"/>
                           <a:cs typeface="Arial"/>
@@ -4947,7 +6688,7 @@
                       </a:r>
                     </a:p>
                   </a:txBody>
-                  <a:tcPr marL="44450" marR="44450" marT="44450" marB="44450" anchor="t" anchorCtr="0" horzOverflow="overflow">
+                  <a:tcPr marL="44450" marR="44450" marT="44450" marB="44450" horzOverflow="overflow">
                     <a:lnL w="12700">
                       <a:miter lim="400000"/>
                     </a:lnL>
@@ -4987,7 +6728,7 @@
                       </a:r>
                     </a:p>
                   </a:txBody>
-                  <a:tcPr marL="44450" marR="44450" marT="44450" marB="44450" anchor="t" anchorCtr="0" horzOverflow="overflow">
+                  <a:tcPr marL="44450" marR="44450" marT="44450" marB="44450" horzOverflow="overflow">
                     <a:lnL w="12700">
                       <a:miter lim="400000"/>
                     </a:lnL>
@@ -5005,6 +6746,11 @@
                     <a:noFill/>
                   </a:tcPr>
                 </a:tc>
+                <a:extLst>
+                  <a:ext uri="{0D108BD9-81ED-4DB2-BD59-A6C34878D82A}">
+                    <a16:rowId xmlns:a16="http://schemas.microsoft.com/office/drawing/2014/main" val="10000"/>
+                  </a:ext>
+                </a:extLst>
               </a:tr>
               <a:tr h="496888">
                 <a:tc>
@@ -5019,7 +6765,7 @@
                         <a:defRPr sz="1800"/>
                       </a:pPr>
                       <a:r>
-                        <a:rPr b="1" sz="1000">
+                        <a:rPr sz="1000" b="1">
                           <a:latin typeface="Arial"/>
                           <a:ea typeface="Arial"/>
                           <a:cs typeface="Arial"/>
@@ -5029,7 +6775,7 @@
                       </a:r>
                     </a:p>
                   </a:txBody>
-                  <a:tcPr marL="44450" marR="44450" marT="44450" marB="44450" anchor="t" anchorCtr="0" horzOverflow="overflow">
+                  <a:tcPr marL="44450" marR="44450" marT="44450" marB="44450" horzOverflow="overflow">
                     <a:lnL w="12700">
                       <a:miter lim="400000"/>
                     </a:lnL>
@@ -5071,7 +6817,7 @@
                       </a:r>
                     </a:p>
                   </a:txBody>
-                  <a:tcPr marL="44450" marR="44450" marT="44450" marB="44450" anchor="t" anchorCtr="0" horzOverflow="overflow">
+                  <a:tcPr marL="44450" marR="44450" marT="44450" marB="44450" horzOverflow="overflow">
                     <a:lnL w="12700">
                       <a:miter lim="400000"/>
                     </a:lnL>
@@ -5091,6 +6837,11 @@
                     <a:noFill/>
                   </a:tcPr>
                 </a:tc>
+                <a:extLst>
+                  <a:ext uri="{0D108BD9-81ED-4DB2-BD59-A6C34878D82A}">
+                    <a16:rowId xmlns:a16="http://schemas.microsoft.com/office/drawing/2014/main" val="10001"/>
+                  </a:ext>
+                </a:extLst>
               </a:tr>
               <a:tr h="1324197">
                 <a:tc>
@@ -5105,7 +6856,7 @@
                         <a:defRPr sz="1800"/>
                       </a:pPr>
                       <a:r>
-                        <a:rPr b="1" sz="1000">
+                        <a:rPr sz="1000" b="1">
                           <a:latin typeface="Arial"/>
                           <a:ea typeface="Arial"/>
                           <a:cs typeface="Arial"/>
@@ -5115,7 +6866,7 @@
                       </a:r>
                     </a:p>
                   </a:txBody>
-                  <a:tcPr marL="44450" marR="44450" marT="44450" marB="44450" anchor="t" anchorCtr="0" horzOverflow="overflow">
+                  <a:tcPr marL="44450" marR="44450" marT="44450" marB="44450" horzOverflow="overflow">
                     <a:lnL w="12700">
                       <a:miter lim="400000"/>
                     </a:lnL>
@@ -5203,7 +6954,7 @@
                       </a:r>
                     </a:p>
                   </a:txBody>
-                  <a:tcPr marL="44450" marR="44450" marT="44450" marB="44450" anchor="t" anchorCtr="0" horzOverflow="overflow">
+                  <a:tcPr marL="44450" marR="44450" marT="44450" marB="44450" horzOverflow="overflow">
                     <a:lnL w="12700">
                       <a:miter lim="400000"/>
                     </a:lnL>
@@ -5223,6 +6974,11 @@
                     <a:noFill/>
                   </a:tcPr>
                 </a:tc>
+                <a:extLst>
+                  <a:ext uri="{0D108BD9-81ED-4DB2-BD59-A6C34878D82A}">
+                    <a16:rowId xmlns:a16="http://schemas.microsoft.com/office/drawing/2014/main" val="10002"/>
+                  </a:ext>
+                </a:extLst>
               </a:tr>
               <a:tr h="941388">
                 <a:tc>
@@ -5237,7 +6993,7 @@
                         <a:defRPr sz="1800"/>
                       </a:pPr>
                       <a:r>
-                        <a:rPr b="1" sz="1000">
+                        <a:rPr sz="1000" b="1">
                           <a:latin typeface="Arial"/>
                           <a:ea typeface="Arial"/>
                           <a:cs typeface="Arial"/>
@@ -5247,7 +7003,7 @@
                       </a:r>
                     </a:p>
                   </a:txBody>
-                  <a:tcPr marL="44450" marR="44450" marT="44450" marB="44450" anchor="t" anchorCtr="0" horzOverflow="overflow">
+                  <a:tcPr marL="44450" marR="44450" marT="44450" marB="44450" horzOverflow="overflow">
                     <a:lnL w="12700">
                       <a:miter lim="400000"/>
                     </a:lnL>
@@ -5293,7 +7049,7 @@
                       </a:r>
                     </a:p>
                   </a:txBody>
-                  <a:tcPr marL="44450" marR="44450" marT="44450" marB="44450" anchor="t" anchorCtr="0" horzOverflow="overflow">
+                  <a:tcPr marL="44450" marR="44450" marT="44450" marB="44450" horzOverflow="overflow">
                     <a:lnL w="12700">
                       <a:miter lim="400000"/>
                     </a:lnL>
@@ -5313,6 +7069,11 @@
                     <a:noFill/>
                   </a:tcPr>
                 </a:tc>
+                <a:extLst>
+                  <a:ext uri="{0D108BD9-81ED-4DB2-BD59-A6C34878D82A}">
+                    <a16:rowId xmlns:a16="http://schemas.microsoft.com/office/drawing/2014/main" val="10003"/>
+                  </a:ext>
+                </a:extLst>
               </a:tr>
               <a:tr h="941388">
                 <a:tc>
@@ -5327,7 +7088,7 @@
                         <a:defRPr sz="1800"/>
                       </a:pPr>
                       <a:r>
-                        <a:rPr b="1" sz="1000">
+                        <a:rPr sz="1000" b="1">
                           <a:latin typeface="Arial"/>
                           <a:ea typeface="Arial"/>
                           <a:cs typeface="Arial"/>
@@ -5337,7 +7098,7 @@
                       </a:r>
                     </a:p>
                   </a:txBody>
-                  <a:tcPr marL="44450" marR="44450" marT="44450" marB="44450" anchor="t" anchorCtr="0" horzOverflow="overflow">
+                  <a:tcPr marL="44450" marR="44450" marT="44450" marB="44450" horzOverflow="overflow">
                     <a:lnL w="12700">
                       <a:miter lim="400000"/>
                     </a:lnL>
@@ -5465,7 +7226,7 @@
                       </a:r>
                     </a:p>
                   </a:txBody>
-                  <a:tcPr marL="44450" marR="44450" marT="44450" marB="44450" anchor="t" anchorCtr="0" horzOverflow="overflow">
+                  <a:tcPr marL="44450" marR="44450" marT="44450" marB="44450" horzOverflow="overflow">
                     <a:lnL w="12700">
                       <a:miter lim="400000"/>
                     </a:lnL>
@@ -5483,6 +7244,11 @@
                     <a:noFill/>
                   </a:tcPr>
                 </a:tc>
+                <a:extLst>
+                  <a:ext uri="{0D108BD9-81ED-4DB2-BD59-A6C34878D82A}">
+                    <a16:rowId xmlns:a16="http://schemas.microsoft.com/office/drawing/2014/main" val="10004"/>
+                  </a:ext>
+                </a:extLst>
               </a:tr>
             </a:tbl>
           </a:graphicData>
@@ -5522,12 +7288,12 @@
   <p:clrMapOvr>
     <a:masterClrMapping/>
   </p:clrMapOvr>
-  <p:transition xmlns:p14="http://schemas.microsoft.com/office/powerpoint/2010/main" spd="med" advClick="1"/>
+  <p:transition spd="med"/>
 </p:sld>
 </file>
 
 <file path=ppt/slides/slide7.xml><?xml version="1.0" encoding="utf-8"?>
-<p:sld xmlns:a="http://schemas.openxmlformats.org/drawingml/2006/main" xmlns:r="http://schemas.openxmlformats.org/officeDocument/2006/relationships" xmlns:p="http://schemas.openxmlformats.org/presentationml/2006/main" xmlns:m="http://schemas.openxmlformats.org/officeDocument/2006/math" xmlns:a14="http://schemas.microsoft.com/office/drawing/2010/main" showMasterSp="1" showMasterPhAnim="1">
+<p:sld xmlns:a="http://schemas.openxmlformats.org/drawingml/2006/main" xmlns:r="http://schemas.openxmlformats.org/officeDocument/2006/relationships" xmlns:p="http://schemas.openxmlformats.org/presentationml/2006/main">
   <p:cSld>
     <p:spTree>
       <p:nvGrpSpPr>
@@ -5546,7 +7312,9 @@
       <p:sp>
         <p:nvSpPr>
           <p:cNvPr id="152" name="Title 1"/>
-          <p:cNvSpPr txBox="1"/>
+          <p:cNvSpPr txBox="1">
+            <a:spLocks noGrp="1"/>
+          </p:cNvSpPr>
           <p:nvPr>
             <p:ph type="title"/>
           </p:nvPr>
@@ -5569,7 +7337,6 @@
             </a:lvl1pPr>
           </a:lstStyle>
           <a:p>
-            <a:pPr/>
             <a:r>
               <a:t>Frau Freundlich</a:t>
             </a:r>
@@ -5579,7 +7346,9 @@
       <p:sp>
         <p:nvSpPr>
           <p:cNvPr id="153" name="Content Placeholder 2"/>
-          <p:cNvSpPr txBox="1"/>
+          <p:cNvSpPr txBox="1">
+            <a:spLocks noGrp="1"/>
+          </p:cNvSpPr>
           <p:nvPr>
             <p:ph type="body" idx="1"/>
           </p:nvPr>
@@ -5601,7 +7370,6 @@
             </a:lvl1pPr>
           </a:lstStyle>
           <a:p>
-            <a:pPr/>
             <a:r>
               <a:t>Frau Freundlich ist Sachbearbeiterin an der Fakultät Informatik und Mathematik an der OTH Regensburg.</a:t>
             </a:r>
@@ -5642,12 +7410,12 @@
   <p:clrMapOvr>
     <a:masterClrMapping/>
   </p:clrMapOvr>
-  <p:transition xmlns:p14="http://schemas.microsoft.com/office/powerpoint/2010/main" spd="med" advClick="1"/>
+  <p:transition spd="med"/>
 </p:sld>
 </file>
 
 <file path=ppt/slides/slide8.xml><?xml version="1.0" encoding="utf-8"?>
-<p:sld xmlns:a="http://schemas.openxmlformats.org/drawingml/2006/main" xmlns:r="http://schemas.openxmlformats.org/officeDocument/2006/relationships" xmlns:p="http://schemas.openxmlformats.org/presentationml/2006/main" xmlns:m="http://schemas.openxmlformats.org/officeDocument/2006/math" xmlns:a14="http://schemas.microsoft.com/office/drawing/2010/main" showMasterSp="1" showMasterPhAnim="1">
+<p:sld xmlns:a="http://schemas.openxmlformats.org/drawingml/2006/main" xmlns:r="http://schemas.openxmlformats.org/officeDocument/2006/relationships" xmlns:p="http://schemas.openxmlformats.org/presentationml/2006/main">
   <p:cSld>
     <p:spTree>
       <p:nvGrpSpPr>
@@ -5666,7 +7434,9 @@
       <p:sp>
         <p:nvSpPr>
           <p:cNvPr id="156" name="Title 1"/>
-          <p:cNvSpPr txBox="1"/>
+          <p:cNvSpPr txBox="1">
+            <a:spLocks noGrp="1"/>
+          </p:cNvSpPr>
           <p:nvPr>
             <p:ph type="title"/>
           </p:nvPr>
@@ -5689,7 +7459,6 @@
             </a:lvl1pPr>
           </a:lstStyle>
           <a:p>
-            <a:pPr/>
             <a:r>
               <a:t>Frau Freundlich </a:t>
             </a:r>
@@ -5699,7 +7468,9 @@
       <p:sp>
         <p:nvSpPr>
           <p:cNvPr id="157" name="Content Placeholder 2"/>
-          <p:cNvSpPr txBox="1"/>
+          <p:cNvSpPr txBox="1">
+            <a:spLocks noGrp="1"/>
+          </p:cNvSpPr>
           <p:nvPr>
             <p:ph type="body" idx="1"/>
           </p:nvPr>
@@ -5768,12 +7539,12 @@
   <p:clrMapOvr>
     <a:masterClrMapping/>
   </p:clrMapOvr>
-  <p:transition xmlns:p14="http://schemas.microsoft.com/office/powerpoint/2010/main" spd="med" advClick="1"/>
+  <p:transition spd="med"/>
 </p:sld>
 </file>
 
 <file path=ppt/slides/slide9.xml><?xml version="1.0" encoding="utf-8"?>
-<p:sld xmlns:a="http://schemas.openxmlformats.org/drawingml/2006/main" xmlns:r="http://schemas.openxmlformats.org/officeDocument/2006/relationships" xmlns:p="http://schemas.openxmlformats.org/presentationml/2006/main" xmlns:m="http://schemas.openxmlformats.org/officeDocument/2006/math" xmlns:a14="http://schemas.microsoft.com/office/drawing/2010/main" showMasterSp="1" showMasterPhAnim="1">
+<p:sld xmlns:a="http://schemas.openxmlformats.org/drawingml/2006/main" xmlns:r="http://schemas.openxmlformats.org/officeDocument/2006/relationships" xmlns:p="http://schemas.openxmlformats.org/presentationml/2006/main">
   <p:cSld>
     <p:spTree>
       <p:nvGrpSpPr>
@@ -5792,7 +7563,9 @@
       <p:sp>
         <p:nvSpPr>
           <p:cNvPr id="160" name="Title 1"/>
-          <p:cNvSpPr txBox="1"/>
+          <p:cNvSpPr txBox="1">
+            <a:spLocks noGrp="1"/>
+          </p:cNvSpPr>
           <p:nvPr>
             <p:ph type="title"/>
           </p:nvPr>
@@ -5815,7 +7588,6 @@
             </a:lvl1pPr>
           </a:lstStyle>
           <a:p>
-            <a:pPr/>
             <a:r>
               <a:t>Frau Freundlich</a:t>
             </a:r>
@@ -5825,7 +7597,9 @@
       <p:sp>
         <p:nvSpPr>
           <p:cNvPr id="161" name="Content Placeholder 2"/>
-          <p:cNvSpPr txBox="1"/>
+          <p:cNvSpPr txBox="1">
+            <a:spLocks noGrp="1"/>
+          </p:cNvSpPr>
           <p:nvPr>
             <p:ph type="body" idx="1"/>
           </p:nvPr>
@@ -5894,12 +7668,12 @@
   <p:clrMapOvr>
     <a:masterClrMapping/>
   </p:clrMapOvr>
-  <p:transition xmlns:p14="http://schemas.microsoft.com/office/powerpoint/2010/main" spd="med" advClick="1"/>
+  <p:transition spd="med"/>
 </p:sld>
 </file>
 
 <file path=ppt/theme/theme1.xml><?xml version="1.0" encoding="utf-8"?>
-<a:theme xmlns:a="http://schemas.openxmlformats.org/drawingml/2006/main" xmlns:r="http://schemas.openxmlformats.org/officeDocument/2006/relationships" name="Median">
+<a:theme xmlns:a="http://schemas.openxmlformats.org/drawingml/2006/main" name="Median">
   <a:themeElements>
     <a:clrScheme name="Median">
       <a:dk1>
@@ -6025,7 +7799,7 @@
       <a:effectStyleLst>
         <a:effectStyle>
           <a:effectLst>
-            <a:outerShdw sx="100000" sy="100000" kx="0" ky="0" algn="b" rotWithShape="0" blurRad="38100" dist="30000" dir="5400000">
+            <a:outerShdw blurRad="38100" dist="30000" dir="5400000" rotWithShape="0">
               <a:srgbClr val="000000">
                 <a:alpha val="45000"/>
               </a:srgbClr>
@@ -6034,7 +7808,7 @@
         </a:effectStyle>
         <a:effectStyle>
           <a:effectLst>
-            <a:outerShdw sx="100000" sy="100000" kx="0" ky="0" algn="b" rotWithShape="0" blurRad="38100" dist="30000" dir="5400000">
+            <a:outerShdw blurRad="38100" dist="30000" dir="5400000" rotWithShape="0">
               <a:srgbClr val="000000">
                 <a:alpha val="45000"/>
               </a:srgbClr>
@@ -6043,7 +7817,7 @@
         </a:effectStyle>
         <a:effectStyle>
           <a:effectLst>
-            <a:outerShdw sx="100000" sy="100000" kx="0" ky="0" algn="b" rotWithShape="0" blurRad="38100" dist="30000" dir="5400000">
+            <a:outerShdw blurRad="38100" dist="30000" dir="5400000" rotWithShape="0">
               <a:srgbClr val="000000">
                 <a:alpha val="45000"/>
               </a:srgbClr>
@@ -6117,7 +7891,7 @@
           <a:round/>
         </a:ln>
         <a:effectLst>
-          <a:outerShdw sx="100000" sy="100000" kx="0" ky="0" algn="b" rotWithShape="0" blurRad="38100" dist="30000" dir="5400000">
+          <a:outerShdw blurRad="38100" dist="30000" dir="5400000" rotWithShape="0">
             <a:srgbClr val="000000">
               <a:alpha val="45000"/>
             </a:srgbClr>
@@ -6125,7 +7899,7 @@
         </a:effectLst>
         <a:sp3d/>
       </a:spPr>
-      <a:bodyPr rot="0" spcFirstLastPara="1" vertOverflow="overflow" horzOverflow="overflow" vert="horz" wrap="square" lIns="45719" tIns="45719" rIns="45719" bIns="45719" numCol="1" spcCol="38100" rtlCol="0" anchor="ctr" upright="0">
+      <a:bodyPr rot="0" spcFirstLastPara="1" vertOverflow="overflow" horzOverflow="overflow" vert="horz" wrap="square" lIns="45719" tIns="45719" rIns="45719" bIns="45719" numCol="1" spcCol="38100" rtlCol="0" anchor="ctr">
         <a:spAutoFit/>
       </a:bodyPr>
       <a:lstStyle>
@@ -6144,7 +7918,7 @@
           <a:buFontTx/>
           <a:buNone/>
           <a:tabLst/>
-          <a:defRPr b="0" baseline="0" cap="none" i="0" spc="0" strike="noStrike" sz="1800" u="none" kumimoji="0" normalizeH="0">
+          <a:defRPr kumimoji="0" sz="1800" b="0" i="0" u="none" strike="noStrike" cap="none" spc="0" normalizeH="0" baseline="0">
             <a:ln>
               <a:noFill/>
             </a:ln>
@@ -6174,7 +7948,7 @@
           <a:buFontTx/>
           <a:buNone/>
           <a:tabLst/>
-          <a:defRPr b="0" baseline="0" cap="none" i="0" spc="0" strike="noStrike" sz="1800" u="none" kumimoji="0" normalizeH="0">
+          <a:defRPr kumimoji="0" sz="1800" b="0" i="0" u="none" strike="noStrike" cap="none" spc="0" normalizeH="0" baseline="0">
             <a:ln>
               <a:noFill/>
             </a:ln>
@@ -6200,7 +7974,7 @@
           <a:buFontTx/>
           <a:buNone/>
           <a:tabLst/>
-          <a:defRPr b="0" baseline="0" cap="none" i="0" spc="0" strike="noStrike" sz="1800" u="none" kumimoji="0" normalizeH="0">
+          <a:defRPr kumimoji="0" sz="1800" b="0" i="0" u="none" strike="noStrike" cap="none" spc="0" normalizeH="0" baseline="0">
             <a:ln>
               <a:noFill/>
             </a:ln>
@@ -6226,7 +8000,7 @@
           <a:buFontTx/>
           <a:buNone/>
           <a:tabLst/>
-          <a:defRPr b="0" baseline="0" cap="none" i="0" spc="0" strike="noStrike" sz="1800" u="none" kumimoji="0" normalizeH="0">
+          <a:defRPr kumimoji="0" sz="1800" b="0" i="0" u="none" strike="noStrike" cap="none" spc="0" normalizeH="0" baseline="0">
             <a:ln>
               <a:noFill/>
             </a:ln>
@@ -6252,7 +8026,7 @@
           <a:buFontTx/>
           <a:buNone/>
           <a:tabLst/>
-          <a:defRPr b="0" baseline="0" cap="none" i="0" spc="0" strike="noStrike" sz="1800" u="none" kumimoji="0" normalizeH="0">
+          <a:defRPr kumimoji="0" sz="1800" b="0" i="0" u="none" strike="noStrike" cap="none" spc="0" normalizeH="0" baseline="0">
             <a:ln>
               <a:noFill/>
             </a:ln>
@@ -6278,7 +8052,7 @@
           <a:buFontTx/>
           <a:buNone/>
           <a:tabLst/>
-          <a:defRPr b="0" baseline="0" cap="none" i="0" spc="0" strike="noStrike" sz="1800" u="none" kumimoji="0" normalizeH="0">
+          <a:defRPr kumimoji="0" sz="1800" b="0" i="0" u="none" strike="noStrike" cap="none" spc="0" normalizeH="0" baseline="0">
             <a:ln>
               <a:noFill/>
             </a:ln>
@@ -6304,7 +8078,7 @@
           <a:buFontTx/>
           <a:buNone/>
           <a:tabLst/>
-          <a:defRPr b="0" baseline="0" cap="none" i="0" spc="0" strike="noStrike" sz="1800" u="none" kumimoji="0" normalizeH="0">
+          <a:defRPr kumimoji="0" sz="1800" b="0" i="0" u="none" strike="noStrike" cap="none" spc="0" normalizeH="0" baseline="0">
             <a:ln>
               <a:noFill/>
             </a:ln>
@@ -6330,7 +8104,7 @@
           <a:buFontTx/>
           <a:buNone/>
           <a:tabLst/>
-          <a:defRPr b="0" baseline="0" cap="none" i="0" spc="0" strike="noStrike" sz="1800" u="none" kumimoji="0" normalizeH="0">
+          <a:defRPr kumimoji="0" sz="1800" b="0" i="0" u="none" strike="noStrike" cap="none" spc="0" normalizeH="0" baseline="0">
             <a:ln>
               <a:noFill/>
             </a:ln>
@@ -6356,7 +8130,7 @@
           <a:buFontTx/>
           <a:buNone/>
           <a:tabLst/>
-          <a:defRPr b="0" baseline="0" cap="none" i="0" spc="0" strike="noStrike" sz="1800" u="none" kumimoji="0" normalizeH="0">
+          <a:defRPr kumimoji="0" sz="1800" b="0" i="0" u="none" strike="noStrike" cap="none" spc="0" normalizeH="0" baseline="0">
             <a:ln>
               <a:noFill/>
             </a:ln>
@@ -6382,7 +8156,7 @@
           <a:buFontTx/>
           <a:buNone/>
           <a:tabLst/>
-          <a:defRPr b="0" baseline="0" cap="none" i="0" spc="0" strike="noStrike" sz="1800" u="none" kumimoji="0" normalizeH="0">
+          <a:defRPr kumimoji="0" sz="1800" b="0" i="0" u="none" strike="noStrike" cap="none" spc="0" normalizeH="0" baseline="0">
             <a:ln>
               <a:noFill/>
             </a:ln>
@@ -6395,9 +8169,15 @@
         </a:lvl9pPr>
       </a:lstStyle>
       <a:style>
-        <a:lnRef idx="0"/>
-        <a:fillRef idx="0"/>
-        <a:effectRef idx="0"/>
+        <a:lnRef idx="0">
+          <a:scrgbClr r="0" g="0" b="0"/>
+        </a:lnRef>
+        <a:fillRef idx="0">
+          <a:scrgbClr r="0" g="0" b="0"/>
+        </a:fillRef>
+        <a:effectRef idx="0">
+          <a:scrgbClr r="0" g="0" b="0"/>
+        </a:effectRef>
         <a:fontRef idx="none"/>
       </a:style>
     </a:spDef>
@@ -6412,7 +8192,7 @@
           <a:round/>
         </a:ln>
         <a:effectLst>
-          <a:outerShdw sx="100000" sy="100000" kx="0" ky="0" algn="b" rotWithShape="0" blurRad="38100" dist="30000" dir="5400000">
+          <a:outerShdw blurRad="38100" dist="30000" dir="5400000" rotWithShape="0">
             <a:srgbClr val="000000">
               <a:alpha val="45000"/>
             </a:srgbClr>
@@ -6420,7 +8200,7 @@
         </a:effectLst>
         <a:sp3d/>
       </a:spPr>
-      <a:bodyPr rot="0" spcFirstLastPara="1" vertOverflow="overflow" horzOverflow="overflow" vert="horz" wrap="square" lIns="91439" tIns="45719" rIns="91439" bIns="45719" numCol="1" spcCol="38100" rtlCol="0" anchor="t" upright="0">
+      <a:bodyPr rot="0" spcFirstLastPara="1" vertOverflow="overflow" horzOverflow="overflow" vert="horz" wrap="square" lIns="91439" tIns="45719" rIns="91439" bIns="45719" numCol="1" spcCol="38100" rtlCol="0" anchor="t">
         <a:noAutofit/>
       </a:bodyPr>
       <a:lstStyle>
@@ -6439,7 +8219,7 @@
           <a:buFontTx/>
           <a:buNone/>
           <a:tabLst/>
-          <a:defRPr b="0" baseline="0" cap="none" i="0" spc="0" strike="noStrike" sz="1800" u="none" kumimoji="0" normalizeH="0">
+          <a:defRPr kumimoji="0" sz="1800" b="0" i="0" u="none" strike="noStrike" cap="none" spc="0" normalizeH="0" baseline="0">
             <a:ln>
               <a:noFill/>
             </a:ln>
@@ -6465,7 +8245,7 @@
           <a:buFontTx/>
           <a:buNone/>
           <a:tabLst/>
-          <a:defRPr b="0" baseline="0" cap="none" i="0" spc="0" strike="noStrike" sz="1800" u="none" kumimoji="0" normalizeH="0">
+          <a:defRPr kumimoji="0" sz="1800" b="0" i="0" u="none" strike="noStrike" cap="none" spc="0" normalizeH="0" baseline="0">
             <a:ln>
               <a:noFill/>
             </a:ln>
@@ -6491,7 +8271,7 @@
           <a:buFontTx/>
           <a:buNone/>
           <a:tabLst/>
-          <a:defRPr b="0" baseline="0" cap="none" i="0" spc="0" strike="noStrike" sz="1800" u="none" kumimoji="0" normalizeH="0">
+          <a:defRPr kumimoji="0" sz="1800" b="0" i="0" u="none" strike="noStrike" cap="none" spc="0" normalizeH="0" baseline="0">
             <a:ln>
               <a:noFill/>
             </a:ln>
@@ -6517,7 +8297,7 @@
           <a:buFontTx/>
           <a:buNone/>
           <a:tabLst/>
-          <a:defRPr b="0" baseline="0" cap="none" i="0" spc="0" strike="noStrike" sz="1800" u="none" kumimoji="0" normalizeH="0">
+          <a:defRPr kumimoji="0" sz="1800" b="0" i="0" u="none" strike="noStrike" cap="none" spc="0" normalizeH="0" baseline="0">
             <a:ln>
               <a:noFill/>
             </a:ln>
@@ -6543,7 +8323,7 @@
           <a:buFontTx/>
           <a:buNone/>
           <a:tabLst/>
-          <a:defRPr b="0" baseline="0" cap="none" i="0" spc="0" strike="noStrike" sz="1800" u="none" kumimoji="0" normalizeH="0">
+          <a:defRPr kumimoji="0" sz="1800" b="0" i="0" u="none" strike="noStrike" cap="none" spc="0" normalizeH="0" baseline="0">
             <a:ln>
               <a:noFill/>
             </a:ln>
@@ -6569,7 +8349,7 @@
           <a:buFontTx/>
           <a:buNone/>
           <a:tabLst/>
-          <a:defRPr b="0" baseline="0" cap="none" i="0" spc="0" strike="noStrike" sz="1800" u="none" kumimoji="0" normalizeH="0">
+          <a:defRPr kumimoji="0" sz="1800" b="0" i="0" u="none" strike="noStrike" cap="none" spc="0" normalizeH="0" baseline="0">
             <a:ln>
               <a:noFill/>
             </a:ln>
@@ -6595,7 +8375,7 @@
           <a:buFontTx/>
           <a:buNone/>
           <a:tabLst/>
-          <a:defRPr b="0" baseline="0" cap="none" i="0" spc="0" strike="noStrike" sz="1800" u="none" kumimoji="0" normalizeH="0">
+          <a:defRPr kumimoji="0" sz="1800" b="0" i="0" u="none" strike="noStrike" cap="none" spc="0" normalizeH="0" baseline="0">
             <a:ln>
               <a:noFill/>
             </a:ln>
@@ -6621,7 +8401,7 @@
           <a:buFontTx/>
           <a:buNone/>
           <a:tabLst/>
-          <a:defRPr b="0" baseline="0" cap="none" i="0" spc="0" strike="noStrike" sz="1800" u="none" kumimoji="0" normalizeH="0">
+          <a:defRPr kumimoji="0" sz="1800" b="0" i="0" u="none" strike="noStrike" cap="none" spc="0" normalizeH="0" baseline="0">
             <a:ln>
               <a:noFill/>
             </a:ln>
@@ -6647,7 +8427,7 @@
           <a:buFontTx/>
           <a:buNone/>
           <a:tabLst/>
-          <a:defRPr b="0" baseline="0" cap="none" i="0" spc="0" strike="noStrike" sz="1800" u="none" kumimoji="0" normalizeH="0">
+          <a:defRPr kumimoji="0" sz="1800" b="0" i="0" u="none" strike="noStrike" cap="none" spc="0" normalizeH="0" baseline="0">
             <a:ln>
               <a:noFill/>
             </a:ln>
@@ -6673,7 +8453,7 @@
           <a:buFontTx/>
           <a:buNone/>
           <a:tabLst/>
-          <a:defRPr b="0" baseline="0" cap="none" i="0" spc="0" strike="noStrike" sz="1800" u="none" kumimoji="0" normalizeH="0">
+          <a:defRPr kumimoji="0" sz="1800" b="0" i="0" u="none" strike="noStrike" cap="none" spc="0" normalizeH="0" baseline="0">
             <a:ln>
               <a:noFill/>
             </a:ln>
@@ -6686,9 +8466,15 @@
         </a:lvl9pPr>
       </a:lstStyle>
       <a:style>
-        <a:lnRef idx="0"/>
-        <a:fillRef idx="0"/>
-        <a:effectRef idx="0"/>
+        <a:lnRef idx="0">
+          <a:scrgbClr r="0" g="0" b="0"/>
+        </a:lnRef>
+        <a:fillRef idx="0">
+          <a:scrgbClr r="0" g="0" b="0"/>
+        </a:fillRef>
+        <a:effectRef idx="0">
+          <a:scrgbClr r="0" g="0" b="0"/>
+        </a:effectRef>
         <a:fontRef idx="none"/>
       </a:style>
     </a:lnDef>
@@ -6702,7 +8488,7 @@
         <a:effectLst/>
         <a:sp3d/>
       </a:spPr>
-      <a:bodyPr rot="0" spcFirstLastPara="1" vertOverflow="overflow" horzOverflow="overflow" vert="horz" wrap="square" lIns="45719" tIns="45719" rIns="45719" bIns="45719" numCol="1" spcCol="38100" rtlCol="0" anchor="t" upright="0">
+      <a:bodyPr rot="0" spcFirstLastPara="1" vertOverflow="overflow" horzOverflow="overflow" vert="horz" wrap="square" lIns="45719" tIns="45719" rIns="45719" bIns="45719" numCol="1" spcCol="38100" rtlCol="0" anchor="t">
         <a:spAutoFit/>
       </a:bodyPr>
       <a:lstStyle>
@@ -6721,7 +8507,7 @@
           <a:buFontTx/>
           <a:buNone/>
           <a:tabLst/>
-          <a:defRPr b="0" baseline="0" cap="none" i="0" spc="0" strike="noStrike" sz="1800" u="none" kumimoji="0" normalizeH="0">
+          <a:defRPr kumimoji="0" sz="1800" b="0" i="0" u="none" strike="noStrike" cap="none" spc="0" normalizeH="0" baseline="0">
             <a:ln>
               <a:noFill/>
             </a:ln>
@@ -6751,7 +8537,7 @@
           <a:buFontTx/>
           <a:buNone/>
           <a:tabLst/>
-          <a:defRPr b="0" baseline="0" cap="none" i="0" spc="0" strike="noStrike" sz="1800" u="none" kumimoji="0" normalizeH="0">
+          <a:defRPr kumimoji="0" sz="1800" b="0" i="0" u="none" strike="noStrike" cap="none" spc="0" normalizeH="0" baseline="0">
             <a:ln>
               <a:noFill/>
             </a:ln>
@@ -6777,7 +8563,7 @@
           <a:buFontTx/>
           <a:buNone/>
           <a:tabLst/>
-          <a:defRPr b="0" baseline="0" cap="none" i="0" spc="0" strike="noStrike" sz="1800" u="none" kumimoji="0" normalizeH="0">
+          <a:defRPr kumimoji="0" sz="1800" b="0" i="0" u="none" strike="noStrike" cap="none" spc="0" normalizeH="0" baseline="0">
             <a:ln>
               <a:noFill/>
             </a:ln>
@@ -6803,7 +8589,7 @@
           <a:buFontTx/>
           <a:buNone/>
           <a:tabLst/>
-          <a:defRPr b="0" baseline="0" cap="none" i="0" spc="0" strike="noStrike" sz="1800" u="none" kumimoji="0" normalizeH="0">
+          <a:defRPr kumimoji="0" sz="1800" b="0" i="0" u="none" strike="noStrike" cap="none" spc="0" normalizeH="0" baseline="0">
             <a:ln>
               <a:noFill/>
             </a:ln>
@@ -6829,7 +8615,7 @@
           <a:buFontTx/>
           <a:buNone/>
           <a:tabLst/>
-          <a:defRPr b="0" baseline="0" cap="none" i="0" spc="0" strike="noStrike" sz="1800" u="none" kumimoji="0" normalizeH="0">
+          <a:defRPr kumimoji="0" sz="1800" b="0" i="0" u="none" strike="noStrike" cap="none" spc="0" normalizeH="0" baseline="0">
             <a:ln>
               <a:noFill/>
             </a:ln>
@@ -6855,7 +8641,7 @@
           <a:buFontTx/>
           <a:buNone/>
           <a:tabLst/>
-          <a:defRPr b="0" baseline="0" cap="none" i="0" spc="0" strike="noStrike" sz="1800" u="none" kumimoji="0" normalizeH="0">
+          <a:defRPr kumimoji="0" sz="1800" b="0" i="0" u="none" strike="noStrike" cap="none" spc="0" normalizeH="0" baseline="0">
             <a:ln>
               <a:noFill/>
             </a:ln>
@@ -6881,7 +8667,7 @@
           <a:buFontTx/>
           <a:buNone/>
           <a:tabLst/>
-          <a:defRPr b="0" baseline="0" cap="none" i="0" spc="0" strike="noStrike" sz="1800" u="none" kumimoji="0" normalizeH="0">
+          <a:defRPr kumimoji="0" sz="1800" b="0" i="0" u="none" strike="noStrike" cap="none" spc="0" normalizeH="0" baseline="0">
             <a:ln>
               <a:noFill/>
             </a:ln>
@@ -6907,7 +8693,7 @@
           <a:buFontTx/>
           <a:buNone/>
           <a:tabLst/>
-          <a:defRPr b="0" baseline="0" cap="none" i="0" spc="0" strike="noStrike" sz="1800" u="none" kumimoji="0" normalizeH="0">
+          <a:defRPr kumimoji="0" sz="1800" b="0" i="0" u="none" strike="noStrike" cap="none" spc="0" normalizeH="0" baseline="0">
             <a:ln>
               <a:noFill/>
             </a:ln>
@@ -6933,7 +8719,7 @@
           <a:buFontTx/>
           <a:buNone/>
           <a:tabLst/>
-          <a:defRPr b="0" baseline="0" cap="none" i="0" spc="0" strike="noStrike" sz="1800" u="none" kumimoji="0" normalizeH="0">
+          <a:defRPr kumimoji="0" sz="1800" b="0" i="0" u="none" strike="noStrike" cap="none" spc="0" normalizeH="0" baseline="0">
             <a:ln>
               <a:noFill/>
             </a:ln>
@@ -6959,7 +8745,7 @@
           <a:buFontTx/>
           <a:buNone/>
           <a:tabLst/>
-          <a:defRPr b="0" baseline="0" cap="none" i="0" spc="0" strike="noStrike" sz="1800" u="none" kumimoji="0" normalizeH="0">
+          <a:defRPr kumimoji="0" sz="1800" b="0" i="0" u="none" strike="noStrike" cap="none" spc="0" normalizeH="0" baseline="0">
             <a:ln>
               <a:noFill/>
             </a:ln>
@@ -6972,18 +8758,25 @@
         </a:lvl9pPr>
       </a:lstStyle>
       <a:style>
-        <a:lnRef idx="0"/>
-        <a:fillRef idx="0"/>
-        <a:effectRef idx="0"/>
+        <a:lnRef idx="0">
+          <a:scrgbClr r="0" g="0" b="0"/>
+        </a:lnRef>
+        <a:fillRef idx="0">
+          <a:scrgbClr r="0" g="0" b="0"/>
+        </a:fillRef>
+        <a:effectRef idx="0">
+          <a:scrgbClr r="0" g="0" b="0"/>
+        </a:effectRef>
         <a:fontRef idx="none"/>
       </a:style>
     </a:txDef>
   </a:objectDefaults>
+  <a:extraClrSchemeLst/>
 </a:theme>
 </file>
 
 <file path=ppt/theme/theme2.xml><?xml version="1.0" encoding="utf-8"?>
-<a:theme xmlns:a="http://schemas.openxmlformats.org/drawingml/2006/main" xmlns:r="http://schemas.openxmlformats.org/officeDocument/2006/relationships" name="Median">
+<a:theme xmlns:a="http://schemas.openxmlformats.org/drawingml/2006/main" name="Median">
   <a:themeElements>
     <a:clrScheme name="Median">
       <a:dk1>
@@ -7109,7 +8902,7 @@
       <a:effectStyleLst>
         <a:effectStyle>
           <a:effectLst>
-            <a:outerShdw sx="100000" sy="100000" kx="0" ky="0" algn="b" rotWithShape="0" blurRad="38100" dist="30000" dir="5400000">
+            <a:outerShdw blurRad="38100" dist="30000" dir="5400000" rotWithShape="0">
               <a:srgbClr val="000000">
                 <a:alpha val="45000"/>
               </a:srgbClr>
@@ -7118,7 +8911,7 @@
         </a:effectStyle>
         <a:effectStyle>
           <a:effectLst>
-            <a:outerShdw sx="100000" sy="100000" kx="0" ky="0" algn="b" rotWithShape="0" blurRad="38100" dist="30000" dir="5400000">
+            <a:outerShdw blurRad="38100" dist="30000" dir="5400000" rotWithShape="0">
               <a:srgbClr val="000000">
                 <a:alpha val="45000"/>
               </a:srgbClr>
@@ -7127,7 +8920,7 @@
         </a:effectStyle>
         <a:effectStyle>
           <a:effectLst>
-            <a:outerShdw sx="100000" sy="100000" kx="0" ky="0" algn="b" rotWithShape="0" blurRad="38100" dist="30000" dir="5400000">
+            <a:outerShdw blurRad="38100" dist="30000" dir="5400000" rotWithShape="0">
               <a:srgbClr val="000000">
                 <a:alpha val="45000"/>
               </a:srgbClr>
@@ -7201,7 +8994,7 @@
           <a:round/>
         </a:ln>
         <a:effectLst>
-          <a:outerShdw sx="100000" sy="100000" kx="0" ky="0" algn="b" rotWithShape="0" blurRad="38100" dist="30000" dir="5400000">
+          <a:outerShdw blurRad="38100" dist="30000" dir="5400000" rotWithShape="0">
             <a:srgbClr val="000000">
               <a:alpha val="45000"/>
             </a:srgbClr>
@@ -7209,7 +9002,7 @@
         </a:effectLst>
         <a:sp3d/>
       </a:spPr>
-      <a:bodyPr rot="0" spcFirstLastPara="1" vertOverflow="overflow" horzOverflow="overflow" vert="horz" wrap="square" lIns="45719" tIns="45719" rIns="45719" bIns="45719" numCol="1" spcCol="38100" rtlCol="0" anchor="ctr" upright="0">
+      <a:bodyPr rot="0" spcFirstLastPara="1" vertOverflow="overflow" horzOverflow="overflow" vert="horz" wrap="square" lIns="45719" tIns="45719" rIns="45719" bIns="45719" numCol="1" spcCol="38100" rtlCol="0" anchor="ctr">
         <a:spAutoFit/>
       </a:bodyPr>
       <a:lstStyle>
@@ -7228,7 +9021,7 @@
           <a:buFontTx/>
           <a:buNone/>
           <a:tabLst/>
-          <a:defRPr b="0" baseline="0" cap="none" i="0" spc="0" strike="noStrike" sz="1800" u="none" kumimoji="0" normalizeH="0">
+          <a:defRPr kumimoji="0" sz="1800" b="0" i="0" u="none" strike="noStrike" cap="none" spc="0" normalizeH="0" baseline="0">
             <a:ln>
               <a:noFill/>
             </a:ln>
@@ -7258,7 +9051,7 @@
           <a:buFontTx/>
           <a:buNone/>
           <a:tabLst/>
-          <a:defRPr b="0" baseline="0" cap="none" i="0" spc="0" strike="noStrike" sz="1800" u="none" kumimoji="0" normalizeH="0">
+          <a:defRPr kumimoji="0" sz="1800" b="0" i="0" u="none" strike="noStrike" cap="none" spc="0" normalizeH="0" baseline="0">
             <a:ln>
               <a:noFill/>
             </a:ln>
@@ -7284,7 +9077,7 @@
           <a:buFontTx/>
           <a:buNone/>
           <a:tabLst/>
-          <a:defRPr b="0" baseline="0" cap="none" i="0" spc="0" strike="noStrike" sz="1800" u="none" kumimoji="0" normalizeH="0">
+          <a:defRPr kumimoji="0" sz="1800" b="0" i="0" u="none" strike="noStrike" cap="none" spc="0" normalizeH="0" baseline="0">
             <a:ln>
               <a:noFill/>
             </a:ln>
@@ -7310,7 +9103,7 @@
           <a:buFontTx/>
           <a:buNone/>
           <a:tabLst/>
-          <a:defRPr b="0" baseline="0" cap="none" i="0" spc="0" strike="noStrike" sz="1800" u="none" kumimoji="0" normalizeH="0">
+          <a:defRPr kumimoji="0" sz="1800" b="0" i="0" u="none" strike="noStrike" cap="none" spc="0" normalizeH="0" baseline="0">
             <a:ln>
               <a:noFill/>
             </a:ln>
@@ -7336,7 +9129,7 @@
           <a:buFontTx/>
           <a:buNone/>
           <a:tabLst/>
-          <a:defRPr b="0" baseline="0" cap="none" i="0" spc="0" strike="noStrike" sz="1800" u="none" kumimoji="0" normalizeH="0">
+          <a:defRPr kumimoji="0" sz="1800" b="0" i="0" u="none" strike="noStrike" cap="none" spc="0" normalizeH="0" baseline="0">
             <a:ln>
               <a:noFill/>
             </a:ln>
@@ -7362,7 +9155,7 @@
           <a:buFontTx/>
           <a:buNone/>
           <a:tabLst/>
-          <a:defRPr b="0" baseline="0" cap="none" i="0" spc="0" strike="noStrike" sz="1800" u="none" kumimoji="0" normalizeH="0">
+          <a:defRPr kumimoji="0" sz="1800" b="0" i="0" u="none" strike="noStrike" cap="none" spc="0" normalizeH="0" baseline="0">
             <a:ln>
               <a:noFill/>
             </a:ln>
@@ -7388,7 +9181,7 @@
           <a:buFontTx/>
           <a:buNone/>
           <a:tabLst/>
-          <a:defRPr b="0" baseline="0" cap="none" i="0" spc="0" strike="noStrike" sz="1800" u="none" kumimoji="0" normalizeH="0">
+          <a:defRPr kumimoji="0" sz="1800" b="0" i="0" u="none" strike="noStrike" cap="none" spc="0" normalizeH="0" baseline="0">
             <a:ln>
               <a:noFill/>
             </a:ln>
@@ -7414,7 +9207,7 @@
           <a:buFontTx/>
           <a:buNone/>
           <a:tabLst/>
-          <a:defRPr b="0" baseline="0" cap="none" i="0" spc="0" strike="noStrike" sz="1800" u="none" kumimoji="0" normalizeH="0">
+          <a:defRPr kumimoji="0" sz="1800" b="0" i="0" u="none" strike="noStrike" cap="none" spc="0" normalizeH="0" baseline="0">
             <a:ln>
               <a:noFill/>
             </a:ln>
@@ -7440,7 +9233,7 @@
           <a:buFontTx/>
           <a:buNone/>
           <a:tabLst/>
-          <a:defRPr b="0" baseline="0" cap="none" i="0" spc="0" strike="noStrike" sz="1800" u="none" kumimoji="0" normalizeH="0">
+          <a:defRPr kumimoji="0" sz="1800" b="0" i="0" u="none" strike="noStrike" cap="none" spc="0" normalizeH="0" baseline="0">
             <a:ln>
               <a:noFill/>
             </a:ln>
@@ -7466,7 +9259,7 @@
           <a:buFontTx/>
           <a:buNone/>
           <a:tabLst/>
-          <a:defRPr b="0" baseline="0" cap="none" i="0" spc="0" strike="noStrike" sz="1800" u="none" kumimoji="0" normalizeH="0">
+          <a:defRPr kumimoji="0" sz="1800" b="0" i="0" u="none" strike="noStrike" cap="none" spc="0" normalizeH="0" baseline="0">
             <a:ln>
               <a:noFill/>
             </a:ln>
@@ -7479,9 +9272,15 @@
         </a:lvl9pPr>
       </a:lstStyle>
       <a:style>
-        <a:lnRef idx="0"/>
-        <a:fillRef idx="0"/>
-        <a:effectRef idx="0"/>
+        <a:lnRef idx="0">
+          <a:scrgbClr r="0" g="0" b="0"/>
+        </a:lnRef>
+        <a:fillRef idx="0">
+          <a:scrgbClr r="0" g="0" b="0"/>
+        </a:fillRef>
+        <a:effectRef idx="0">
+          <a:scrgbClr r="0" g="0" b="0"/>
+        </a:effectRef>
         <a:fontRef idx="none"/>
       </a:style>
     </a:spDef>
@@ -7496,7 +9295,7 @@
           <a:round/>
         </a:ln>
         <a:effectLst>
-          <a:outerShdw sx="100000" sy="100000" kx="0" ky="0" algn="b" rotWithShape="0" blurRad="38100" dist="30000" dir="5400000">
+          <a:outerShdw blurRad="38100" dist="30000" dir="5400000" rotWithShape="0">
             <a:srgbClr val="000000">
               <a:alpha val="45000"/>
             </a:srgbClr>
@@ -7504,7 +9303,7 @@
         </a:effectLst>
         <a:sp3d/>
       </a:spPr>
-      <a:bodyPr rot="0" spcFirstLastPara="1" vertOverflow="overflow" horzOverflow="overflow" vert="horz" wrap="square" lIns="91439" tIns="45719" rIns="91439" bIns="45719" numCol="1" spcCol="38100" rtlCol="0" anchor="t" upright="0">
+      <a:bodyPr rot="0" spcFirstLastPara="1" vertOverflow="overflow" horzOverflow="overflow" vert="horz" wrap="square" lIns="91439" tIns="45719" rIns="91439" bIns="45719" numCol="1" spcCol="38100" rtlCol="0" anchor="t">
         <a:noAutofit/>
       </a:bodyPr>
       <a:lstStyle>
@@ -7523,7 +9322,7 @@
           <a:buFontTx/>
           <a:buNone/>
           <a:tabLst/>
-          <a:defRPr b="0" baseline="0" cap="none" i="0" spc="0" strike="noStrike" sz="1800" u="none" kumimoji="0" normalizeH="0">
+          <a:defRPr kumimoji="0" sz="1800" b="0" i="0" u="none" strike="noStrike" cap="none" spc="0" normalizeH="0" baseline="0">
             <a:ln>
               <a:noFill/>
             </a:ln>
@@ -7549,7 +9348,7 @@
           <a:buFontTx/>
           <a:buNone/>
           <a:tabLst/>
-          <a:defRPr b="0" baseline="0" cap="none" i="0" spc="0" strike="noStrike" sz="1800" u="none" kumimoji="0" normalizeH="0">
+          <a:defRPr kumimoji="0" sz="1800" b="0" i="0" u="none" strike="noStrike" cap="none" spc="0" normalizeH="0" baseline="0">
             <a:ln>
               <a:noFill/>
             </a:ln>
@@ -7575,7 +9374,7 @@
           <a:buFontTx/>
           <a:buNone/>
           <a:tabLst/>
-          <a:defRPr b="0" baseline="0" cap="none" i="0" spc="0" strike="noStrike" sz="1800" u="none" kumimoji="0" normalizeH="0">
+          <a:defRPr kumimoji="0" sz="1800" b="0" i="0" u="none" strike="noStrike" cap="none" spc="0" normalizeH="0" baseline="0">
             <a:ln>
               <a:noFill/>
             </a:ln>
@@ -7601,7 +9400,7 @@
           <a:buFontTx/>
           <a:buNone/>
           <a:tabLst/>
-          <a:defRPr b="0" baseline="0" cap="none" i="0" spc="0" strike="noStrike" sz="1800" u="none" kumimoji="0" normalizeH="0">
+          <a:defRPr kumimoji="0" sz="1800" b="0" i="0" u="none" strike="noStrike" cap="none" spc="0" normalizeH="0" baseline="0">
             <a:ln>
               <a:noFill/>
             </a:ln>
@@ -7627,7 +9426,7 @@
           <a:buFontTx/>
           <a:buNone/>
           <a:tabLst/>
-          <a:defRPr b="0" baseline="0" cap="none" i="0" spc="0" strike="noStrike" sz="1800" u="none" kumimoji="0" normalizeH="0">
+          <a:defRPr kumimoji="0" sz="1800" b="0" i="0" u="none" strike="noStrike" cap="none" spc="0" normalizeH="0" baseline="0">
             <a:ln>
               <a:noFill/>
             </a:ln>
@@ -7653,7 +9452,7 @@
           <a:buFontTx/>
           <a:buNone/>
           <a:tabLst/>
-          <a:defRPr b="0" baseline="0" cap="none" i="0" spc="0" strike="noStrike" sz="1800" u="none" kumimoji="0" normalizeH="0">
+          <a:defRPr kumimoji="0" sz="1800" b="0" i="0" u="none" strike="noStrike" cap="none" spc="0" normalizeH="0" baseline="0">
             <a:ln>
               <a:noFill/>
             </a:ln>
@@ -7679,7 +9478,7 @@
           <a:buFontTx/>
           <a:buNone/>
           <a:tabLst/>
-          <a:defRPr b="0" baseline="0" cap="none" i="0" spc="0" strike="noStrike" sz="1800" u="none" kumimoji="0" normalizeH="0">
+          <a:defRPr kumimoji="0" sz="1800" b="0" i="0" u="none" strike="noStrike" cap="none" spc="0" normalizeH="0" baseline="0">
             <a:ln>
               <a:noFill/>
             </a:ln>
@@ -7705,7 +9504,7 @@
           <a:buFontTx/>
           <a:buNone/>
           <a:tabLst/>
-          <a:defRPr b="0" baseline="0" cap="none" i="0" spc="0" strike="noStrike" sz="1800" u="none" kumimoji="0" normalizeH="0">
+          <a:defRPr kumimoji="0" sz="1800" b="0" i="0" u="none" strike="noStrike" cap="none" spc="0" normalizeH="0" baseline="0">
             <a:ln>
               <a:noFill/>
             </a:ln>
@@ -7731,7 +9530,7 @@
           <a:buFontTx/>
           <a:buNone/>
           <a:tabLst/>
-          <a:defRPr b="0" baseline="0" cap="none" i="0" spc="0" strike="noStrike" sz="1800" u="none" kumimoji="0" normalizeH="0">
+          <a:defRPr kumimoji="0" sz="1800" b="0" i="0" u="none" strike="noStrike" cap="none" spc="0" normalizeH="0" baseline="0">
             <a:ln>
               <a:noFill/>
             </a:ln>
@@ -7757,7 +9556,7 @@
           <a:buFontTx/>
           <a:buNone/>
           <a:tabLst/>
-          <a:defRPr b="0" baseline="0" cap="none" i="0" spc="0" strike="noStrike" sz="1800" u="none" kumimoji="0" normalizeH="0">
+          <a:defRPr kumimoji="0" sz="1800" b="0" i="0" u="none" strike="noStrike" cap="none" spc="0" normalizeH="0" baseline="0">
             <a:ln>
               <a:noFill/>
             </a:ln>
@@ -7770,9 +9569,15 @@
         </a:lvl9pPr>
       </a:lstStyle>
       <a:style>
-        <a:lnRef idx="0"/>
-        <a:fillRef idx="0"/>
-        <a:effectRef idx="0"/>
+        <a:lnRef idx="0">
+          <a:scrgbClr r="0" g="0" b="0"/>
+        </a:lnRef>
+        <a:fillRef idx="0">
+          <a:scrgbClr r="0" g="0" b="0"/>
+        </a:fillRef>
+        <a:effectRef idx="0">
+          <a:scrgbClr r="0" g="0" b="0"/>
+        </a:effectRef>
         <a:fontRef idx="none"/>
       </a:style>
     </a:lnDef>
@@ -7786,7 +9591,7 @@
         <a:effectLst/>
         <a:sp3d/>
       </a:spPr>
-      <a:bodyPr rot="0" spcFirstLastPara="1" vertOverflow="overflow" horzOverflow="overflow" vert="horz" wrap="square" lIns="45719" tIns="45719" rIns="45719" bIns="45719" numCol="1" spcCol="38100" rtlCol="0" anchor="t" upright="0">
+      <a:bodyPr rot="0" spcFirstLastPara="1" vertOverflow="overflow" horzOverflow="overflow" vert="horz" wrap="square" lIns="45719" tIns="45719" rIns="45719" bIns="45719" numCol="1" spcCol="38100" rtlCol="0" anchor="t">
         <a:spAutoFit/>
       </a:bodyPr>
       <a:lstStyle>
@@ -7805,7 +9610,7 @@
           <a:buFontTx/>
           <a:buNone/>
           <a:tabLst/>
-          <a:defRPr b="0" baseline="0" cap="none" i="0" spc="0" strike="noStrike" sz="1800" u="none" kumimoji="0" normalizeH="0">
+          <a:defRPr kumimoji="0" sz="1800" b="0" i="0" u="none" strike="noStrike" cap="none" spc="0" normalizeH="0" baseline="0">
             <a:ln>
               <a:noFill/>
             </a:ln>
@@ -7835,7 +9640,7 @@
           <a:buFontTx/>
           <a:buNone/>
           <a:tabLst/>
-          <a:defRPr b="0" baseline="0" cap="none" i="0" spc="0" strike="noStrike" sz="1800" u="none" kumimoji="0" normalizeH="0">
+          <a:defRPr kumimoji="0" sz="1800" b="0" i="0" u="none" strike="noStrike" cap="none" spc="0" normalizeH="0" baseline="0">
             <a:ln>
               <a:noFill/>
             </a:ln>
@@ -7861,7 +9666,7 @@
           <a:buFontTx/>
           <a:buNone/>
           <a:tabLst/>
-          <a:defRPr b="0" baseline="0" cap="none" i="0" spc="0" strike="noStrike" sz="1800" u="none" kumimoji="0" normalizeH="0">
+          <a:defRPr kumimoji="0" sz="1800" b="0" i="0" u="none" strike="noStrike" cap="none" spc="0" normalizeH="0" baseline="0">
             <a:ln>
               <a:noFill/>
             </a:ln>
@@ -7887,7 +9692,7 @@
           <a:buFontTx/>
           <a:buNone/>
           <a:tabLst/>
-          <a:defRPr b="0" baseline="0" cap="none" i="0" spc="0" strike="noStrike" sz="1800" u="none" kumimoji="0" normalizeH="0">
+          <a:defRPr kumimoji="0" sz="1800" b="0" i="0" u="none" strike="noStrike" cap="none" spc="0" normalizeH="0" baseline="0">
             <a:ln>
               <a:noFill/>
             </a:ln>
@@ -7913,7 +9718,7 @@
           <a:buFontTx/>
           <a:buNone/>
           <a:tabLst/>
-          <a:defRPr b="0" baseline="0" cap="none" i="0" spc="0" strike="noStrike" sz="1800" u="none" kumimoji="0" normalizeH="0">
+          <a:defRPr kumimoji="0" sz="1800" b="0" i="0" u="none" strike="noStrike" cap="none" spc="0" normalizeH="0" baseline="0">
             <a:ln>
               <a:noFill/>
             </a:ln>
@@ -7939,7 +9744,7 @@
           <a:buFontTx/>
           <a:buNone/>
           <a:tabLst/>
-          <a:defRPr b="0" baseline="0" cap="none" i="0" spc="0" strike="noStrike" sz="1800" u="none" kumimoji="0" normalizeH="0">
+          <a:defRPr kumimoji="0" sz="1800" b="0" i="0" u="none" strike="noStrike" cap="none" spc="0" normalizeH="0" baseline="0">
             <a:ln>
               <a:noFill/>
             </a:ln>
@@ -7965,7 +9770,7 @@
           <a:buFontTx/>
           <a:buNone/>
           <a:tabLst/>
-          <a:defRPr b="0" baseline="0" cap="none" i="0" spc="0" strike="noStrike" sz="1800" u="none" kumimoji="0" normalizeH="0">
+          <a:defRPr kumimoji="0" sz="1800" b="0" i="0" u="none" strike="noStrike" cap="none" spc="0" normalizeH="0" baseline="0">
             <a:ln>
               <a:noFill/>
             </a:ln>
@@ -7991,7 +9796,7 @@
           <a:buFontTx/>
           <a:buNone/>
           <a:tabLst/>
-          <a:defRPr b="0" baseline="0" cap="none" i="0" spc="0" strike="noStrike" sz="1800" u="none" kumimoji="0" normalizeH="0">
+          <a:defRPr kumimoji="0" sz="1800" b="0" i="0" u="none" strike="noStrike" cap="none" spc="0" normalizeH="0" baseline="0">
             <a:ln>
               <a:noFill/>
             </a:ln>
@@ -8017,7 +9822,7 @@
           <a:buFontTx/>
           <a:buNone/>
           <a:tabLst/>
-          <a:defRPr b="0" baseline="0" cap="none" i="0" spc="0" strike="noStrike" sz="1800" u="none" kumimoji="0" normalizeH="0">
+          <a:defRPr kumimoji="0" sz="1800" b="0" i="0" u="none" strike="noStrike" cap="none" spc="0" normalizeH="0" baseline="0">
             <a:ln>
               <a:noFill/>
             </a:ln>
@@ -8043,7 +9848,7 @@
           <a:buFontTx/>
           <a:buNone/>
           <a:tabLst/>
-          <a:defRPr b="0" baseline="0" cap="none" i="0" spc="0" strike="noStrike" sz="1800" u="none" kumimoji="0" normalizeH="0">
+          <a:defRPr kumimoji="0" sz="1800" b="0" i="0" u="none" strike="noStrike" cap="none" spc="0" normalizeH="0" baseline="0">
             <a:ln>
               <a:noFill/>
             </a:ln>
@@ -8056,12 +9861,19 @@
         </a:lvl9pPr>
       </a:lstStyle>
       <a:style>
-        <a:lnRef idx="0"/>
-        <a:fillRef idx="0"/>
-        <a:effectRef idx="0"/>
+        <a:lnRef idx="0">
+          <a:scrgbClr r="0" g="0" b="0"/>
+        </a:lnRef>
+        <a:fillRef idx="0">
+          <a:scrgbClr r="0" g="0" b="0"/>
+        </a:fillRef>
+        <a:effectRef idx="0">
+          <a:scrgbClr r="0" g="0" b="0"/>
+        </a:effectRef>
         <a:fontRef idx="none"/>
       </a:style>
     </a:txDef>
   </a:objectDefaults>
+  <a:extraClrSchemeLst/>
 </a:theme>
 </file>
</xml_diff>